<commit_message>
What does ConEd intend?
</commit_message>
<xml_diff>
--- a/research_showcase/multiPeriodOptimization_aryan_ritwajeet_jha.pptx
+++ b/research_showcase/multiPeriodOptimization_aryan_ritwajeet_jha.pptx
@@ -5,16 +5,17 @@
     <p:sldMasterId id="2147483686" r:id="rId1"/>
   </p:sldMasterIdLst>
   <p:notesMasterIdLst>
-    <p:notesMasterId r:id="rId6"/>
+    <p:notesMasterId r:id="rId7"/>
   </p:notesMasterIdLst>
   <p:handoutMasterIdLst>
-    <p:handoutMasterId r:id="rId7"/>
+    <p:handoutMasterId r:id="rId8"/>
   </p:handoutMasterIdLst>
   <p:sldIdLst>
     <p:sldId id="257" r:id="rId2"/>
     <p:sldId id="258" r:id="rId3"/>
     <p:sldId id="282" r:id="rId4"/>
     <p:sldId id="283" r:id="rId5"/>
+    <p:sldId id="284" r:id="rId6"/>
   </p:sldIdLst>
   <p:sldSz cx="12192000" cy="6858000"/>
   <p:notesSz cx="6858000" cy="9144000"/>
@@ -229,7 +230,7 @@
           <a:p>
             <a:fld id="{D542D976-EE9F-4D81-93B4-309048736BC3}" type="datetimeFigureOut">
               <a:rPr lang="en-US" smtClean="0"/>
-              <a:t>5/27/2023</a:t>
+              <a:t>5/29/2023</a:t>
             </a:fld>
             <a:endParaRPr lang="en-US"/>
           </a:p>
@@ -406,7 +407,7 @@
           <a:p>
             <a:fld id="{10CB9D09-B8C5-4B94-B5DC-AF4ED464E025}" type="datetimeFigureOut">
               <a:rPr lang="en-US" smtClean="0"/>
-              <a:t>5/27/2023</a:t>
+              <a:t>5/29/2023</a:t>
             </a:fld>
             <a:endParaRPr lang="en-US"/>
           </a:p>
@@ -6815,6 +6816,155 @@
     <p:extLst>
       <p:ext uri="{BB962C8B-B14F-4D97-AF65-F5344CB8AC3E}">
         <p14:creationId xmlns:p14="http://schemas.microsoft.com/office/powerpoint/2010/main" val="364621248"/>
+      </p:ext>
+    </p:extLst>
+  </p:cSld>
+  <p:clrMapOvr>
+    <a:masterClrMapping/>
+  </p:clrMapOvr>
+</p:sld>
+</file>
+
+<file path=ppt/slides/slide5.xml><?xml version="1.0" encoding="utf-8"?>
+<p:sld xmlns:a="http://schemas.openxmlformats.org/drawingml/2006/main" xmlns:r="http://schemas.openxmlformats.org/officeDocument/2006/relationships" xmlns:p="http://schemas.openxmlformats.org/presentationml/2006/main">
+  <p:cSld>
+    <p:spTree>
+      <p:nvGrpSpPr>
+        <p:cNvPr id="1" name=""/>
+        <p:cNvGrpSpPr/>
+        <p:nvPr/>
+      </p:nvGrpSpPr>
+      <p:grpSpPr>
+        <a:xfrm>
+          <a:off x="0" y="0"/>
+          <a:ext cx="0" cy="0"/>
+          <a:chOff x="0" y="0"/>
+          <a:chExt cx="0" cy="0"/>
+        </a:xfrm>
+      </p:grpSpPr>
+      <p:sp>
+        <p:nvSpPr>
+          <p:cNvPr id="3" name="Content Placeholder 2">
+            <a:extLst>
+              <a:ext uri="{FF2B5EF4-FFF2-40B4-BE49-F238E27FC236}">
+                <a16:creationId xmlns:a16="http://schemas.microsoft.com/office/drawing/2014/main" id="{64BE6767-30AA-41AB-8C0B-29F30741AF76}"/>
+              </a:ext>
+            </a:extLst>
+          </p:cNvPr>
+          <p:cNvSpPr>
+            <a:spLocks noGrp="1"/>
+          </p:cNvSpPr>
+          <p:nvPr>
+            <p:ph idx="1"/>
+          </p:nvPr>
+        </p:nvSpPr>
+        <p:spPr>
+          <a:xfrm>
+            <a:off x="1077686" y="2248664"/>
+            <a:ext cx="10063163" cy="4286531"/>
+          </a:xfrm>
+        </p:spPr>
+        <p:txBody>
+          <a:bodyPr>
+            <a:normAutofit/>
+          </a:bodyPr>
+          <a:lstStyle/>
+          <a:p>
+            <a:r>
+              <a:rPr lang="en-US" dirty="0" err="1"/>
+              <a:t>ConEd</a:t>
+            </a:r>
+            <a:r>
+              <a:rPr lang="en-US" dirty="0"/>
+              <a:t> of NY moving towards Distributed System Platforms (DSPs)</a:t>
+            </a:r>
+          </a:p>
+          <a:p>
+            <a:r>
+              <a:rPr lang="en-US" dirty="0"/>
+              <a:t>These DSPs allow for DERs to be factored into Optimization schemes for Power Generation</a:t>
+            </a:r>
+          </a:p>
+          <a:p>
+            <a:r>
+              <a:rPr lang="en-US" dirty="0"/>
+              <a:t>DERs can be Optimized to function as Virtual Batteries (VBs)</a:t>
+            </a:r>
+          </a:p>
+          <a:p>
+            <a:pPr lvl="1">
+              <a:buFont typeface="Wingdings" panose="05000000000000000000" pitchFamily="2" charset="2"/>
+              <a:buChar char="Ø"/>
+            </a:pPr>
+            <a:r>
+              <a:rPr lang="en-US" dirty="0"/>
+              <a:t>provide energy services at different </a:t>
+            </a:r>
+            <a:r>
+              <a:rPr lang="en-US" dirty="0" err="1"/>
+              <a:t>spatio</a:t>
+            </a:r>
+            <a:r>
+              <a:rPr lang="en-US" dirty="0"/>
+              <a:t>-temporal scales.</a:t>
+            </a:r>
+          </a:p>
+          <a:p>
+            <a:pPr lvl="1"/>
+            <a:endParaRPr lang="en-US" dirty="0"/>
+          </a:p>
+        </p:txBody>
+      </p:sp>
+      <p:sp>
+        <p:nvSpPr>
+          <p:cNvPr id="2" name="Title 1">
+            <a:extLst>
+              <a:ext uri="{FF2B5EF4-FFF2-40B4-BE49-F238E27FC236}">
+                <a16:creationId xmlns:a16="http://schemas.microsoft.com/office/drawing/2014/main" id="{45DF1785-83CB-4F7A-820B-C600AC43B067}"/>
+              </a:ext>
+            </a:extLst>
+          </p:cNvPr>
+          <p:cNvSpPr>
+            <a:spLocks noGrp="1"/>
+          </p:cNvSpPr>
+          <p:nvPr>
+            <p:ph type="title"/>
+          </p:nvPr>
+        </p:nvSpPr>
+        <p:spPr>
+          <a:xfrm>
+            <a:off x="1064418" y="376654"/>
+            <a:ext cx="10063163" cy="1015584"/>
+          </a:xfrm>
+          <a:ln w="38100">
+            <a:solidFill>
+              <a:schemeClr val="bg2">
+                <a:lumMod val="40000"/>
+                <a:lumOff val="60000"/>
+              </a:schemeClr>
+            </a:solidFill>
+          </a:ln>
+        </p:spPr>
+        <p:txBody>
+          <a:bodyPr>
+            <a:normAutofit fontScale="90000"/>
+          </a:bodyPr>
+          <a:lstStyle/>
+          <a:p>
+            <a:r>
+              <a:rPr lang="en-US" b="0" dirty="0">
+                <a:latin typeface="Times New Roman" panose="02020603050405020304" pitchFamily="18" charset="0"/>
+                <a:cs typeface="Times New Roman" panose="02020603050405020304" pitchFamily="18" charset="0"/>
+              </a:rPr>
+              <a:t>Optimal Multi-Period Dispatch of Distributed Energy Resources in Unbalanced Distribution Feeders</a:t>
+            </a:r>
+          </a:p>
+        </p:txBody>
+      </p:sp>
+    </p:spTree>
+    <p:extLst>
+      <p:ext uri="{BB962C8B-B14F-4D97-AF65-F5344CB8AC3E}">
+        <p14:creationId xmlns:p14="http://schemas.microsoft.com/office/powerpoint/2010/main" val="497868237"/>
       </p:ext>
     </p:extLst>
   </p:cSld>

</xml_diff>

<commit_message>
slides updated until main-contributions of the paper.
</commit_message>
<xml_diff>
--- a/research_showcase/multiPeriodOptimization_aryan_ritwajeet_jha.pptx
+++ b/research_showcase/multiPeriodOptimization_aryan_ritwajeet_jha.pptx
@@ -5,10 +5,10 @@
     <p:sldMasterId id="2147483686" r:id="rId1"/>
   </p:sldMasterIdLst>
   <p:notesMasterIdLst>
-    <p:notesMasterId r:id="rId7"/>
+    <p:notesMasterId r:id="rId11"/>
   </p:notesMasterIdLst>
   <p:handoutMasterIdLst>
-    <p:handoutMasterId r:id="rId8"/>
+    <p:handoutMasterId r:id="rId12"/>
   </p:handoutMasterIdLst>
   <p:sldIdLst>
     <p:sldId id="257" r:id="rId2"/>
@@ -16,6 +16,10 @@
     <p:sldId id="282" r:id="rId4"/>
     <p:sldId id="283" r:id="rId5"/>
     <p:sldId id="284" r:id="rId6"/>
+    <p:sldId id="285" r:id="rId7"/>
+    <p:sldId id="286" r:id="rId8"/>
+    <p:sldId id="288" r:id="rId9"/>
+    <p:sldId id="287" r:id="rId10"/>
   </p:sldIdLst>
   <p:sldSz cx="12192000" cy="6858000"/>
   <p:notesSz cx="6858000" cy="9144000"/>
@@ -6880,10 +6884,16 @@
             </a:r>
           </a:p>
           <a:p>
+            <a:endParaRPr lang="en-US" dirty="0"/>
+          </a:p>
+          <a:p>
             <a:r>
               <a:rPr lang="en-US" dirty="0"/>
               <a:t>These DSPs allow for DERs to be factored into Optimization schemes for Power Generation</a:t>
             </a:r>
+          </a:p>
+          <a:p>
+            <a:endParaRPr lang="en-US" dirty="0"/>
           </a:p>
           <a:p>
             <a:r>
@@ -6965,6 +6975,586 @@
     <p:extLst>
       <p:ext uri="{BB962C8B-B14F-4D97-AF65-F5344CB8AC3E}">
         <p14:creationId xmlns:p14="http://schemas.microsoft.com/office/powerpoint/2010/main" val="497868237"/>
+      </p:ext>
+    </p:extLst>
+  </p:cSld>
+  <p:clrMapOvr>
+    <a:masterClrMapping/>
+  </p:clrMapOvr>
+</p:sld>
+</file>
+
+<file path=ppt/slides/slide6.xml><?xml version="1.0" encoding="utf-8"?>
+<p:sld xmlns:a="http://schemas.openxmlformats.org/drawingml/2006/main" xmlns:r="http://schemas.openxmlformats.org/officeDocument/2006/relationships" xmlns:p="http://schemas.openxmlformats.org/presentationml/2006/main">
+  <p:cSld>
+    <p:spTree>
+      <p:nvGrpSpPr>
+        <p:cNvPr id="1" name=""/>
+        <p:cNvGrpSpPr/>
+        <p:nvPr/>
+      </p:nvGrpSpPr>
+      <p:grpSpPr>
+        <a:xfrm>
+          <a:off x="0" y="0"/>
+          <a:ext cx="0" cy="0"/>
+          <a:chOff x="0" y="0"/>
+          <a:chExt cx="0" cy="0"/>
+        </a:xfrm>
+      </p:grpSpPr>
+      <p:sp>
+        <p:nvSpPr>
+          <p:cNvPr id="3" name="Content Placeholder 2">
+            <a:extLst>
+              <a:ext uri="{FF2B5EF4-FFF2-40B4-BE49-F238E27FC236}">
+                <a16:creationId xmlns:a16="http://schemas.microsoft.com/office/drawing/2014/main" id="{64BE6767-30AA-41AB-8C0B-29F30741AF76}"/>
+              </a:ext>
+            </a:extLst>
+          </p:cNvPr>
+          <p:cNvSpPr>
+            <a:spLocks noGrp="1"/>
+          </p:cNvSpPr>
+          <p:nvPr>
+            <p:ph idx="1"/>
+          </p:nvPr>
+        </p:nvSpPr>
+        <p:spPr>
+          <a:xfrm>
+            <a:off x="1077686" y="2248664"/>
+            <a:ext cx="10063163" cy="4286531"/>
+          </a:xfrm>
+        </p:spPr>
+        <p:txBody>
+          <a:bodyPr>
+            <a:normAutofit/>
+          </a:bodyPr>
+          <a:lstStyle/>
+          <a:p>
+            <a:pPr lvl="1"/>
+            <a:r>
+              <a:rPr lang="en-US" dirty="0"/>
+              <a:t>Traditionally, </a:t>
+            </a:r>
+            <a:r>
+              <a:rPr lang="en-US" i="1" dirty="0" err="1"/>
+              <a:t>DistFlow</a:t>
+            </a:r>
+            <a:r>
+              <a:rPr lang="en-US" i="1" dirty="0"/>
+              <a:t> </a:t>
+            </a:r>
+            <a:r>
+              <a:rPr lang="en-US" dirty="0"/>
+              <a:t>algorithms based on the Branch Flow Model (BFM), which are an exact non-linear formulation of the distribution power flow equations, only work on balanced single-phase equivalent networks.</a:t>
+            </a:r>
+          </a:p>
+          <a:p>
+            <a:pPr lvl="1"/>
+            <a:endParaRPr lang="en-US" dirty="0"/>
+          </a:p>
+          <a:p>
+            <a:pPr lvl="1"/>
+            <a:r>
+              <a:rPr lang="en-US" dirty="0"/>
+              <a:t>But Distribution Networks are inherently unbalanced.</a:t>
+            </a:r>
+          </a:p>
+        </p:txBody>
+      </p:sp>
+      <p:sp>
+        <p:nvSpPr>
+          <p:cNvPr id="2" name="Title 1">
+            <a:extLst>
+              <a:ext uri="{FF2B5EF4-FFF2-40B4-BE49-F238E27FC236}">
+                <a16:creationId xmlns:a16="http://schemas.microsoft.com/office/drawing/2014/main" id="{45DF1785-83CB-4F7A-820B-C600AC43B067}"/>
+              </a:ext>
+            </a:extLst>
+          </p:cNvPr>
+          <p:cNvSpPr>
+            <a:spLocks noGrp="1"/>
+          </p:cNvSpPr>
+          <p:nvPr>
+            <p:ph type="title"/>
+          </p:nvPr>
+        </p:nvSpPr>
+        <p:spPr>
+          <a:xfrm>
+            <a:off x="1064418" y="376654"/>
+            <a:ext cx="10063163" cy="1015584"/>
+          </a:xfrm>
+          <a:ln w="38100">
+            <a:solidFill>
+              <a:schemeClr val="bg2">
+                <a:lumMod val="40000"/>
+                <a:lumOff val="60000"/>
+              </a:schemeClr>
+            </a:solidFill>
+          </a:ln>
+        </p:spPr>
+        <p:txBody>
+          <a:bodyPr>
+            <a:normAutofit fontScale="90000"/>
+          </a:bodyPr>
+          <a:lstStyle/>
+          <a:p>
+            <a:r>
+              <a:rPr lang="en-US" b="0" dirty="0">
+                <a:latin typeface="Times New Roman" panose="02020603050405020304" pitchFamily="18" charset="0"/>
+                <a:cs typeface="Times New Roman" panose="02020603050405020304" pitchFamily="18" charset="0"/>
+              </a:rPr>
+              <a:t>Optimal Multi-Period Dispatch of Distributed Energy Resources in Unbalanced Distribution Feeders</a:t>
+            </a:r>
+          </a:p>
+        </p:txBody>
+      </p:sp>
+    </p:spTree>
+    <p:extLst>
+      <p:ext uri="{BB962C8B-B14F-4D97-AF65-F5344CB8AC3E}">
+        <p14:creationId xmlns:p14="http://schemas.microsoft.com/office/powerpoint/2010/main" val="1321834617"/>
+      </p:ext>
+    </p:extLst>
+  </p:cSld>
+  <p:clrMapOvr>
+    <a:masterClrMapping/>
+  </p:clrMapOvr>
+</p:sld>
+</file>
+
+<file path=ppt/slides/slide7.xml><?xml version="1.0" encoding="utf-8"?>
+<p:sld xmlns:a="http://schemas.openxmlformats.org/drawingml/2006/main" xmlns:r="http://schemas.openxmlformats.org/officeDocument/2006/relationships" xmlns:p="http://schemas.openxmlformats.org/presentationml/2006/main">
+  <p:cSld>
+    <p:spTree>
+      <p:nvGrpSpPr>
+        <p:cNvPr id="1" name=""/>
+        <p:cNvGrpSpPr/>
+        <p:nvPr/>
+      </p:nvGrpSpPr>
+      <p:grpSpPr>
+        <a:xfrm>
+          <a:off x="0" y="0"/>
+          <a:ext cx="0" cy="0"/>
+          <a:chOff x="0" y="0"/>
+          <a:chExt cx="0" cy="0"/>
+        </a:xfrm>
+      </p:grpSpPr>
+      <p:sp>
+        <p:nvSpPr>
+          <p:cNvPr id="3" name="Content Placeholder 2">
+            <a:extLst>
+              <a:ext uri="{FF2B5EF4-FFF2-40B4-BE49-F238E27FC236}">
+                <a16:creationId xmlns:a16="http://schemas.microsoft.com/office/drawing/2014/main" id="{64BE6767-30AA-41AB-8C0B-29F30741AF76}"/>
+              </a:ext>
+            </a:extLst>
+          </p:cNvPr>
+          <p:cNvSpPr>
+            <a:spLocks noGrp="1"/>
+          </p:cNvSpPr>
+          <p:nvPr>
+            <p:ph idx="1"/>
+          </p:nvPr>
+        </p:nvSpPr>
+        <p:spPr>
+          <a:xfrm>
+            <a:off x="1077686" y="2248664"/>
+            <a:ext cx="10063163" cy="4286531"/>
+          </a:xfrm>
+        </p:spPr>
+        <p:txBody>
+          <a:bodyPr>
+            <a:normAutofit/>
+          </a:bodyPr>
+          <a:lstStyle/>
+          <a:p>
+            <a:pPr lvl="1"/>
+            <a:r>
+              <a:rPr lang="en-US" dirty="0"/>
+              <a:t>In </a:t>
+            </a:r>
+            <a:r>
+              <a:rPr lang="en-US" dirty="0">
+                <a:hlinkClick r:id="rId2" action="ppaction://hlinksldjump"/>
+              </a:rPr>
+              <a:t>[22] </a:t>
+            </a:r>
+            <a:r>
+              <a:rPr lang="en-US" dirty="0"/>
+              <a:t>by the same authors, they have developed a three-phase convex SOCP relaxation of the multi-period OPF problem, and provided sufficient conditions which ensure the avoidance of simultaneous charging and discharging.</a:t>
+            </a:r>
+          </a:p>
+          <a:p>
+            <a:pPr lvl="1"/>
+            <a:endParaRPr lang="en-US" dirty="0"/>
+          </a:p>
+          <a:p>
+            <a:pPr lvl="1"/>
+            <a:r>
+              <a:rPr lang="en-US" dirty="0"/>
+              <a:t>In this paper, they extend the work by developing a Multi-Period SOCP-NLP algorithm that provides a </a:t>
+            </a:r>
+            <a:r>
+              <a:rPr lang="en-US" i="1" dirty="0"/>
+              <a:t>near </a:t>
+            </a:r>
+            <a:r>
+              <a:rPr lang="en-US" dirty="0"/>
+              <a:t>optimal and guaranteed feasible solution.</a:t>
+            </a:r>
+          </a:p>
+          <a:p>
+            <a:pPr marL="182880" lvl="1" indent="0">
+              <a:buNone/>
+            </a:pPr>
+            <a:endParaRPr lang="en-US" dirty="0"/>
+          </a:p>
+        </p:txBody>
+      </p:sp>
+      <p:sp>
+        <p:nvSpPr>
+          <p:cNvPr id="2" name="Title 1">
+            <a:extLst>
+              <a:ext uri="{FF2B5EF4-FFF2-40B4-BE49-F238E27FC236}">
+                <a16:creationId xmlns:a16="http://schemas.microsoft.com/office/drawing/2014/main" id="{45DF1785-83CB-4F7A-820B-C600AC43B067}"/>
+              </a:ext>
+            </a:extLst>
+          </p:cNvPr>
+          <p:cNvSpPr>
+            <a:spLocks noGrp="1"/>
+          </p:cNvSpPr>
+          <p:nvPr>
+            <p:ph type="title"/>
+          </p:nvPr>
+        </p:nvSpPr>
+        <p:spPr>
+          <a:xfrm>
+            <a:off x="1064418" y="376654"/>
+            <a:ext cx="10063163" cy="1015584"/>
+          </a:xfrm>
+          <a:ln w="38100">
+            <a:solidFill>
+              <a:schemeClr val="bg2">
+                <a:lumMod val="40000"/>
+                <a:lumOff val="60000"/>
+              </a:schemeClr>
+            </a:solidFill>
+          </a:ln>
+        </p:spPr>
+        <p:txBody>
+          <a:bodyPr>
+            <a:normAutofit fontScale="90000"/>
+          </a:bodyPr>
+          <a:lstStyle/>
+          <a:p>
+            <a:r>
+              <a:rPr lang="en-US" b="0" dirty="0">
+                <a:latin typeface="Times New Roman" panose="02020603050405020304" pitchFamily="18" charset="0"/>
+                <a:cs typeface="Times New Roman" panose="02020603050405020304" pitchFamily="18" charset="0"/>
+              </a:rPr>
+              <a:t>Optimal Multi-Period Dispatch of Distributed Energy Resources in Unbalanced Distribution Feeders</a:t>
+            </a:r>
+          </a:p>
+        </p:txBody>
+      </p:sp>
+    </p:spTree>
+    <p:extLst>
+      <p:ext uri="{BB962C8B-B14F-4D97-AF65-F5344CB8AC3E}">
+        <p14:creationId xmlns:p14="http://schemas.microsoft.com/office/powerpoint/2010/main" val="1097106583"/>
+      </p:ext>
+    </p:extLst>
+  </p:cSld>
+  <p:clrMapOvr>
+    <a:masterClrMapping/>
+  </p:clrMapOvr>
+</p:sld>
+</file>
+
+<file path=ppt/slides/slide8.xml><?xml version="1.0" encoding="utf-8"?>
+<p:sld xmlns:a="http://schemas.openxmlformats.org/drawingml/2006/main" xmlns:r="http://schemas.openxmlformats.org/officeDocument/2006/relationships" xmlns:p="http://schemas.openxmlformats.org/presentationml/2006/main">
+  <p:cSld>
+    <p:spTree>
+      <p:nvGrpSpPr>
+        <p:cNvPr id="1" name=""/>
+        <p:cNvGrpSpPr/>
+        <p:nvPr/>
+      </p:nvGrpSpPr>
+      <p:grpSpPr>
+        <a:xfrm>
+          <a:off x="0" y="0"/>
+          <a:ext cx="0" cy="0"/>
+          <a:chOff x="0" y="0"/>
+          <a:chExt cx="0" cy="0"/>
+        </a:xfrm>
+      </p:grpSpPr>
+      <p:sp>
+        <p:nvSpPr>
+          <p:cNvPr id="3" name="Content Placeholder 2">
+            <a:extLst>
+              <a:ext uri="{FF2B5EF4-FFF2-40B4-BE49-F238E27FC236}">
+                <a16:creationId xmlns:a16="http://schemas.microsoft.com/office/drawing/2014/main" id="{64BE6767-30AA-41AB-8C0B-29F30741AF76}"/>
+              </a:ext>
+            </a:extLst>
+          </p:cNvPr>
+          <p:cNvSpPr>
+            <a:spLocks noGrp="1"/>
+          </p:cNvSpPr>
+          <p:nvPr>
+            <p:ph idx="1"/>
+          </p:nvPr>
+        </p:nvSpPr>
+        <p:spPr>
+          <a:xfrm>
+            <a:off x="1077686" y="2248664"/>
+            <a:ext cx="10063163" cy="4286531"/>
+          </a:xfrm>
+        </p:spPr>
+        <p:txBody>
+          <a:bodyPr>
+            <a:normAutofit/>
+          </a:bodyPr>
+          <a:lstStyle/>
+          <a:p>
+            <a:pPr lvl="1"/>
+            <a:r>
+              <a:rPr lang="en-US" dirty="0"/>
+              <a:t>The optimized solutions from the relaxed SOCP model, are used to initialize a Non-Linear Program (NLP) of the actual AC Power Flow, to obtain a physically realizable solution.</a:t>
+            </a:r>
+          </a:p>
+          <a:p>
+            <a:pPr lvl="1"/>
+            <a:endParaRPr lang="en-US" dirty="0"/>
+          </a:p>
+          <a:p>
+            <a:pPr lvl="1"/>
+            <a:r>
+              <a:rPr lang="en-US" dirty="0"/>
+              <a:t>Real-Power Solutions that form the energy trajectory and are obtained from the SOCP, are fixed in the NLP, </a:t>
+            </a:r>
+            <a:r>
+              <a:rPr lang="en-US" dirty="0">
+                <a:solidFill>
+                  <a:schemeClr val="bg2">
+                    <a:lumMod val="40000"/>
+                    <a:lumOff val="60000"/>
+                  </a:schemeClr>
+                </a:solidFill>
+              </a:rPr>
+              <a:t>leading to a decoupling of the different time-steps</a:t>
+            </a:r>
+            <a:r>
+              <a:rPr lang="en-US" dirty="0"/>
+              <a:t>. </a:t>
+            </a:r>
+            <a:r>
+              <a:rPr lang="en-US" b="1" i="1" dirty="0"/>
+              <a:t>(What? How?)</a:t>
+            </a:r>
+          </a:p>
+          <a:p>
+            <a:pPr lvl="1"/>
+            <a:endParaRPr lang="en-US" dirty="0"/>
+          </a:p>
+          <a:p>
+            <a:pPr lvl="1"/>
+            <a:r>
+              <a:rPr lang="en-US" dirty="0">
+                <a:solidFill>
+                  <a:schemeClr val="bg2">
+                    <a:lumMod val="40000"/>
+                    <a:lumOff val="60000"/>
+                  </a:schemeClr>
+                </a:solidFill>
+              </a:rPr>
+              <a:t>As a result, the NLP solves for each time-step separately (possibly in-parallel), leading to a scalable framework. </a:t>
+            </a:r>
+            <a:r>
+              <a:rPr lang="en-US" b="1" i="1" dirty="0"/>
+              <a:t>(What?)</a:t>
+            </a:r>
+          </a:p>
+          <a:p>
+            <a:pPr lvl="1"/>
+            <a:endParaRPr lang="en-US" b="1" i="1" dirty="0"/>
+          </a:p>
+          <a:p>
+            <a:pPr lvl="1"/>
+            <a:r>
+              <a:rPr lang="en-US" dirty="0"/>
+              <a:t>Validation is performed using </a:t>
+            </a:r>
+            <a:r>
+              <a:rPr lang="en-US" dirty="0" err="1"/>
+              <a:t>GridLab</a:t>
+            </a:r>
+            <a:r>
+              <a:rPr lang="en-US"/>
+              <a:t>-D.</a:t>
+            </a:r>
+            <a:endParaRPr lang="en-US" dirty="0"/>
+          </a:p>
+          <a:p>
+            <a:pPr marL="182880" lvl="1" indent="0">
+              <a:buNone/>
+            </a:pPr>
+            <a:endParaRPr lang="en-US" dirty="0"/>
+          </a:p>
+        </p:txBody>
+      </p:sp>
+      <p:sp>
+        <p:nvSpPr>
+          <p:cNvPr id="2" name="Title 1">
+            <a:extLst>
+              <a:ext uri="{FF2B5EF4-FFF2-40B4-BE49-F238E27FC236}">
+                <a16:creationId xmlns:a16="http://schemas.microsoft.com/office/drawing/2014/main" id="{45DF1785-83CB-4F7A-820B-C600AC43B067}"/>
+              </a:ext>
+            </a:extLst>
+          </p:cNvPr>
+          <p:cNvSpPr>
+            <a:spLocks noGrp="1"/>
+          </p:cNvSpPr>
+          <p:nvPr>
+            <p:ph type="title"/>
+          </p:nvPr>
+        </p:nvSpPr>
+        <p:spPr>
+          <a:xfrm>
+            <a:off x="1064418" y="376654"/>
+            <a:ext cx="10063163" cy="1015584"/>
+          </a:xfrm>
+          <a:ln w="38100">
+            <a:solidFill>
+              <a:schemeClr val="bg2">
+                <a:lumMod val="40000"/>
+                <a:lumOff val="60000"/>
+              </a:schemeClr>
+            </a:solidFill>
+          </a:ln>
+        </p:spPr>
+        <p:txBody>
+          <a:bodyPr>
+            <a:normAutofit fontScale="90000"/>
+          </a:bodyPr>
+          <a:lstStyle/>
+          <a:p>
+            <a:r>
+              <a:rPr lang="en-US" b="0" dirty="0">
+                <a:latin typeface="Times New Roman" panose="02020603050405020304" pitchFamily="18" charset="0"/>
+                <a:cs typeface="Times New Roman" panose="02020603050405020304" pitchFamily="18" charset="0"/>
+              </a:rPr>
+              <a:t>Optimal Multi-Period Dispatch of Distributed Energy Resources in Unbalanced Distribution Feeders</a:t>
+            </a:r>
+          </a:p>
+        </p:txBody>
+      </p:sp>
+    </p:spTree>
+    <p:extLst>
+      <p:ext uri="{BB962C8B-B14F-4D97-AF65-F5344CB8AC3E}">
+        <p14:creationId xmlns:p14="http://schemas.microsoft.com/office/powerpoint/2010/main" val="4063236158"/>
+      </p:ext>
+    </p:extLst>
+  </p:cSld>
+  <p:clrMapOvr>
+    <a:masterClrMapping/>
+  </p:clrMapOvr>
+</p:sld>
+</file>
+
+<file path=ppt/slides/slide9.xml><?xml version="1.0" encoding="utf-8"?>
+<p:sld xmlns:a="http://schemas.openxmlformats.org/drawingml/2006/main" xmlns:r="http://schemas.openxmlformats.org/officeDocument/2006/relationships" xmlns:p="http://schemas.openxmlformats.org/presentationml/2006/main">
+  <p:cSld>
+    <p:spTree>
+      <p:nvGrpSpPr>
+        <p:cNvPr id="1" name=""/>
+        <p:cNvGrpSpPr/>
+        <p:nvPr/>
+      </p:nvGrpSpPr>
+      <p:grpSpPr>
+        <a:xfrm>
+          <a:off x="0" y="0"/>
+          <a:ext cx="0" cy="0"/>
+          <a:chOff x="0" y="0"/>
+          <a:chExt cx="0" cy="0"/>
+        </a:xfrm>
+      </p:grpSpPr>
+      <p:sp>
+        <p:nvSpPr>
+          <p:cNvPr id="2" name="Title 1">
+            <a:extLst>
+              <a:ext uri="{FF2B5EF4-FFF2-40B4-BE49-F238E27FC236}">
+                <a16:creationId xmlns:a16="http://schemas.microsoft.com/office/drawing/2014/main" id="{5F549704-23C4-B094-622E-8880D581DDB1}"/>
+              </a:ext>
+            </a:extLst>
+          </p:cNvPr>
+          <p:cNvSpPr>
+            <a:spLocks noGrp="1"/>
+          </p:cNvSpPr>
+          <p:nvPr>
+            <p:ph type="title"/>
+          </p:nvPr>
+        </p:nvSpPr>
+        <p:spPr/>
+        <p:txBody>
+          <a:bodyPr/>
+          <a:lstStyle/>
+          <a:p>
+            <a:r>
+              <a:rPr lang="en-IN" dirty="0"/>
+              <a:t>References</a:t>
+            </a:r>
+          </a:p>
+        </p:txBody>
+      </p:sp>
+      <p:sp>
+        <p:nvSpPr>
+          <p:cNvPr id="3" name="Content Placeholder 2">
+            <a:extLst>
+              <a:ext uri="{FF2B5EF4-FFF2-40B4-BE49-F238E27FC236}">
+                <a16:creationId xmlns:a16="http://schemas.microsoft.com/office/drawing/2014/main" id="{1E746B68-8B8A-22C0-9957-1D01E835E282}"/>
+              </a:ext>
+            </a:extLst>
+          </p:cNvPr>
+          <p:cNvSpPr>
+            <a:spLocks noGrp="1"/>
+          </p:cNvSpPr>
+          <p:nvPr>
+            <p:ph idx="1"/>
+          </p:nvPr>
+        </p:nvSpPr>
+        <p:spPr/>
+        <p:txBody>
+          <a:bodyPr/>
+          <a:lstStyle/>
+          <a:p>
+            <a:r>
+              <a:rPr lang="en-IN" dirty="0">
+                <a:hlinkClick r:id="rId2"/>
+              </a:rPr>
+              <a:t>[22]</a:t>
+            </a:r>
+            <a:r>
+              <a:rPr lang="en-IN" dirty="0"/>
+              <a:t> Nazir, N., &amp; </a:t>
+            </a:r>
+            <a:r>
+              <a:rPr lang="en-IN" dirty="0" err="1"/>
+              <a:t>Almassalkhi</a:t>
+            </a:r>
+            <a:r>
+              <a:rPr lang="en-IN" dirty="0"/>
+              <a:t>, M. (2018). Receding-Horizon Optimization of Unbalanced Distribution Systems with Time-Scale Separation for Discrete and Continuous Control Devices. 2018 Power Systems Computation Conference (PSCC). IEEE. </a:t>
+            </a:r>
+            <a:r>
+              <a:rPr lang="en-IN" dirty="0" err="1"/>
+              <a:t>doi</a:t>
+            </a:r>
+            <a:r>
+              <a:rPr lang="en-IN" dirty="0"/>
+              <a:t>: 10.23919/PSCC.2018.8442555</a:t>
+            </a:r>
+          </a:p>
+        </p:txBody>
+      </p:sp>
+    </p:spTree>
+    <p:extLst>
+      <p:ext uri="{BB962C8B-B14F-4D97-AF65-F5344CB8AC3E}">
+        <p14:creationId xmlns:p14="http://schemas.microsoft.com/office/powerpoint/2010/main" val="2023634528"/>
       </p:ext>
     </p:extLst>
   </p:cSld>

</xml_diff>

<commit_message>
case study description and process flow added.
</commit_message>
<xml_diff>
--- a/research_showcase/multiPeriodOptimization_aryan_ritwajeet_jha.pptx
+++ b/research_showcase/multiPeriodOptimization_aryan_ritwajeet_jha.pptx
@@ -5,10 +5,10 @@
     <p:sldMasterId id="2147483686" r:id="rId1"/>
   </p:sldMasterIdLst>
   <p:notesMasterIdLst>
-    <p:notesMasterId r:id="rId11"/>
+    <p:notesMasterId r:id="rId13"/>
   </p:notesMasterIdLst>
   <p:handoutMasterIdLst>
-    <p:handoutMasterId r:id="rId12"/>
+    <p:handoutMasterId r:id="rId14"/>
   </p:handoutMasterIdLst>
   <p:sldIdLst>
     <p:sldId id="257" r:id="rId2"/>
@@ -19,7 +19,9 @@
     <p:sldId id="285" r:id="rId7"/>
     <p:sldId id="286" r:id="rId8"/>
     <p:sldId id="288" r:id="rId9"/>
-    <p:sldId id="287" r:id="rId10"/>
+    <p:sldId id="289" r:id="rId10"/>
+    <p:sldId id="290" r:id="rId11"/>
+    <p:sldId id="287" r:id="rId12"/>
   </p:sldIdLst>
   <p:sldSz cx="12192000" cy="6858000"/>
   <p:notesSz cx="6858000" cy="9144000"/>
@@ -140,6 +142,3008 @@
 </p:presentation>
 </file>
 
+<file path=ppt/diagrams/colors1.xml><?xml version="1.0" encoding="utf-8"?>
+<dgm:colorsDef xmlns:dgm="http://schemas.openxmlformats.org/drawingml/2006/diagram" xmlns:a="http://schemas.openxmlformats.org/drawingml/2006/main" uniqueId="urn:microsoft.com/office/officeart/2005/8/colors/accent1_2">
+  <dgm:title val=""/>
+  <dgm:desc val=""/>
+  <dgm:catLst>
+    <dgm:cat type="accent1" pri="11200"/>
+  </dgm:catLst>
+  <dgm:styleLbl name="node0">
+    <dgm:fillClrLst meth="repeat">
+      <a:schemeClr val="accent1"/>
+    </dgm:fillClrLst>
+    <dgm:linClrLst meth="repeat">
+      <a:schemeClr val="lt1"/>
+    </dgm:linClrLst>
+    <dgm:effectClrLst/>
+    <dgm:txLinClrLst/>
+    <dgm:txFillClrLst/>
+    <dgm:txEffectClrLst/>
+  </dgm:styleLbl>
+  <dgm:styleLbl name="alignNode1">
+    <dgm:fillClrLst meth="repeat">
+      <a:schemeClr val="accent1"/>
+    </dgm:fillClrLst>
+    <dgm:linClrLst meth="repeat">
+      <a:schemeClr val="accent1"/>
+    </dgm:linClrLst>
+    <dgm:effectClrLst/>
+    <dgm:txLinClrLst/>
+    <dgm:txFillClrLst/>
+    <dgm:txEffectClrLst/>
+  </dgm:styleLbl>
+  <dgm:styleLbl name="node1">
+    <dgm:fillClrLst meth="repeat">
+      <a:schemeClr val="accent1"/>
+    </dgm:fillClrLst>
+    <dgm:linClrLst meth="repeat">
+      <a:schemeClr val="lt1"/>
+    </dgm:linClrLst>
+    <dgm:effectClrLst/>
+    <dgm:txLinClrLst/>
+    <dgm:txFillClrLst/>
+    <dgm:txEffectClrLst/>
+  </dgm:styleLbl>
+  <dgm:styleLbl name="lnNode1">
+    <dgm:fillClrLst meth="repeat">
+      <a:schemeClr val="accent1"/>
+    </dgm:fillClrLst>
+    <dgm:linClrLst meth="repeat">
+      <a:schemeClr val="lt1"/>
+    </dgm:linClrLst>
+    <dgm:effectClrLst/>
+    <dgm:txLinClrLst/>
+    <dgm:txFillClrLst/>
+    <dgm:txEffectClrLst/>
+  </dgm:styleLbl>
+  <dgm:styleLbl name="vennNode1">
+    <dgm:fillClrLst meth="repeat">
+      <a:schemeClr val="accent1">
+        <a:alpha val="50000"/>
+      </a:schemeClr>
+    </dgm:fillClrLst>
+    <dgm:linClrLst meth="repeat">
+      <a:schemeClr val="lt1"/>
+    </dgm:linClrLst>
+    <dgm:effectClrLst/>
+    <dgm:txLinClrLst/>
+    <dgm:txFillClrLst/>
+    <dgm:txEffectClrLst/>
+  </dgm:styleLbl>
+  <dgm:styleLbl name="node2">
+    <dgm:fillClrLst meth="repeat">
+      <a:schemeClr val="accent1"/>
+    </dgm:fillClrLst>
+    <dgm:linClrLst meth="repeat">
+      <a:schemeClr val="lt1"/>
+    </dgm:linClrLst>
+    <dgm:effectClrLst/>
+    <dgm:txLinClrLst/>
+    <dgm:txFillClrLst/>
+    <dgm:txEffectClrLst/>
+  </dgm:styleLbl>
+  <dgm:styleLbl name="node3">
+    <dgm:fillClrLst meth="repeat">
+      <a:schemeClr val="accent1"/>
+    </dgm:fillClrLst>
+    <dgm:linClrLst meth="repeat">
+      <a:schemeClr val="lt1"/>
+    </dgm:linClrLst>
+    <dgm:effectClrLst/>
+    <dgm:txLinClrLst/>
+    <dgm:txFillClrLst/>
+    <dgm:txEffectClrLst/>
+  </dgm:styleLbl>
+  <dgm:styleLbl name="node4">
+    <dgm:fillClrLst meth="repeat">
+      <a:schemeClr val="accent1"/>
+    </dgm:fillClrLst>
+    <dgm:linClrLst meth="repeat">
+      <a:schemeClr val="lt1"/>
+    </dgm:linClrLst>
+    <dgm:effectClrLst/>
+    <dgm:txLinClrLst/>
+    <dgm:txFillClrLst/>
+    <dgm:txEffectClrLst/>
+  </dgm:styleLbl>
+  <dgm:styleLbl name="fgImgPlace1">
+    <dgm:fillClrLst meth="repeat">
+      <a:schemeClr val="accent1">
+        <a:tint val="50000"/>
+      </a:schemeClr>
+    </dgm:fillClrLst>
+    <dgm:linClrLst meth="repeat">
+      <a:schemeClr val="lt1"/>
+    </dgm:linClrLst>
+    <dgm:effectClrLst/>
+    <dgm:txLinClrLst/>
+    <dgm:txFillClrLst meth="repeat">
+      <a:schemeClr val="lt1"/>
+    </dgm:txFillClrLst>
+    <dgm:txEffectClrLst/>
+  </dgm:styleLbl>
+  <dgm:styleLbl name="alignImgPlace1">
+    <dgm:fillClrLst meth="repeat">
+      <a:schemeClr val="accent1">
+        <a:tint val="50000"/>
+      </a:schemeClr>
+    </dgm:fillClrLst>
+    <dgm:linClrLst meth="repeat">
+      <a:schemeClr val="lt1"/>
+    </dgm:linClrLst>
+    <dgm:effectClrLst/>
+    <dgm:txLinClrLst/>
+    <dgm:txFillClrLst meth="repeat">
+      <a:schemeClr val="lt1"/>
+    </dgm:txFillClrLst>
+    <dgm:txEffectClrLst/>
+  </dgm:styleLbl>
+  <dgm:styleLbl name="bgImgPlace1">
+    <dgm:fillClrLst meth="repeat">
+      <a:schemeClr val="accent1">
+        <a:tint val="50000"/>
+      </a:schemeClr>
+    </dgm:fillClrLst>
+    <dgm:linClrLst meth="repeat">
+      <a:schemeClr val="lt1"/>
+    </dgm:linClrLst>
+    <dgm:effectClrLst/>
+    <dgm:txLinClrLst/>
+    <dgm:txFillClrLst meth="repeat">
+      <a:schemeClr val="lt1"/>
+    </dgm:txFillClrLst>
+    <dgm:txEffectClrLst/>
+  </dgm:styleLbl>
+  <dgm:styleLbl name="sibTrans2D1">
+    <dgm:fillClrLst meth="repeat">
+      <a:schemeClr val="accent1">
+        <a:tint val="60000"/>
+      </a:schemeClr>
+    </dgm:fillClrLst>
+    <dgm:linClrLst meth="repeat">
+      <a:schemeClr val="accent1">
+        <a:tint val="60000"/>
+      </a:schemeClr>
+    </dgm:linClrLst>
+    <dgm:effectClrLst/>
+    <dgm:txLinClrLst/>
+    <dgm:txFillClrLst/>
+    <dgm:txEffectClrLst/>
+  </dgm:styleLbl>
+  <dgm:styleLbl name="fgSibTrans2D1">
+    <dgm:fillClrLst meth="repeat">
+      <a:schemeClr val="accent1">
+        <a:tint val="60000"/>
+      </a:schemeClr>
+    </dgm:fillClrLst>
+    <dgm:linClrLst meth="repeat">
+      <a:schemeClr val="accent1">
+        <a:tint val="60000"/>
+      </a:schemeClr>
+    </dgm:linClrLst>
+    <dgm:effectClrLst/>
+    <dgm:txLinClrLst/>
+    <dgm:txFillClrLst/>
+    <dgm:txEffectClrLst/>
+  </dgm:styleLbl>
+  <dgm:styleLbl name="bgSibTrans2D1">
+    <dgm:fillClrLst meth="repeat">
+      <a:schemeClr val="accent1">
+        <a:tint val="60000"/>
+      </a:schemeClr>
+    </dgm:fillClrLst>
+    <dgm:linClrLst meth="repeat">
+      <a:schemeClr val="accent1">
+        <a:tint val="60000"/>
+      </a:schemeClr>
+    </dgm:linClrLst>
+    <dgm:effectClrLst/>
+    <dgm:txLinClrLst/>
+    <dgm:txFillClrLst/>
+    <dgm:txEffectClrLst/>
+  </dgm:styleLbl>
+  <dgm:styleLbl name="sibTrans1D1">
+    <dgm:fillClrLst meth="repeat">
+      <a:schemeClr val="accent1"/>
+    </dgm:fillClrLst>
+    <dgm:linClrLst meth="repeat">
+      <a:schemeClr val="accent1"/>
+    </dgm:linClrLst>
+    <dgm:effectClrLst/>
+    <dgm:txLinClrLst/>
+    <dgm:txFillClrLst meth="repeat">
+      <a:schemeClr val="tx1"/>
+    </dgm:txFillClrLst>
+    <dgm:txEffectClrLst/>
+  </dgm:styleLbl>
+  <dgm:styleLbl name="callout">
+    <dgm:fillClrLst meth="repeat">
+      <a:schemeClr val="accent1"/>
+    </dgm:fillClrLst>
+    <dgm:linClrLst meth="repeat">
+      <a:schemeClr val="accent1">
+        <a:tint val="50000"/>
+      </a:schemeClr>
+    </dgm:linClrLst>
+    <dgm:effectClrLst/>
+    <dgm:txLinClrLst/>
+    <dgm:txFillClrLst meth="repeat">
+      <a:schemeClr val="tx1"/>
+    </dgm:txFillClrLst>
+    <dgm:txEffectClrLst/>
+  </dgm:styleLbl>
+  <dgm:styleLbl name="asst0">
+    <dgm:fillClrLst meth="repeat">
+      <a:schemeClr val="accent1"/>
+    </dgm:fillClrLst>
+    <dgm:linClrLst meth="repeat">
+      <a:schemeClr val="lt1"/>
+    </dgm:linClrLst>
+    <dgm:effectClrLst/>
+    <dgm:txLinClrLst/>
+    <dgm:txFillClrLst/>
+    <dgm:txEffectClrLst/>
+  </dgm:styleLbl>
+  <dgm:styleLbl name="asst1">
+    <dgm:fillClrLst meth="repeat">
+      <a:schemeClr val="accent1"/>
+    </dgm:fillClrLst>
+    <dgm:linClrLst meth="repeat">
+      <a:schemeClr val="lt1"/>
+    </dgm:linClrLst>
+    <dgm:effectClrLst/>
+    <dgm:txLinClrLst/>
+    <dgm:txFillClrLst/>
+    <dgm:txEffectClrLst/>
+  </dgm:styleLbl>
+  <dgm:styleLbl name="asst2">
+    <dgm:fillClrLst meth="repeat">
+      <a:schemeClr val="accent1"/>
+    </dgm:fillClrLst>
+    <dgm:linClrLst meth="repeat">
+      <a:schemeClr val="lt1"/>
+    </dgm:linClrLst>
+    <dgm:effectClrLst/>
+    <dgm:txLinClrLst/>
+    <dgm:txFillClrLst/>
+    <dgm:txEffectClrLst/>
+  </dgm:styleLbl>
+  <dgm:styleLbl name="asst3">
+    <dgm:fillClrLst meth="repeat">
+      <a:schemeClr val="accent1"/>
+    </dgm:fillClrLst>
+    <dgm:linClrLst meth="repeat">
+      <a:schemeClr val="lt1"/>
+    </dgm:linClrLst>
+    <dgm:effectClrLst/>
+    <dgm:txLinClrLst/>
+    <dgm:txFillClrLst/>
+    <dgm:txEffectClrLst/>
+  </dgm:styleLbl>
+  <dgm:styleLbl name="asst4">
+    <dgm:fillClrLst meth="repeat">
+      <a:schemeClr val="accent1"/>
+    </dgm:fillClrLst>
+    <dgm:linClrLst meth="repeat">
+      <a:schemeClr val="lt1"/>
+    </dgm:linClrLst>
+    <dgm:effectClrLst/>
+    <dgm:txLinClrLst/>
+    <dgm:txFillClrLst/>
+    <dgm:txEffectClrLst/>
+  </dgm:styleLbl>
+  <dgm:styleLbl name="parChTrans2D1">
+    <dgm:fillClrLst meth="repeat">
+      <a:schemeClr val="accent1">
+        <a:tint val="60000"/>
+      </a:schemeClr>
+    </dgm:fillClrLst>
+    <dgm:linClrLst meth="repeat">
+      <a:schemeClr val="accent1">
+        <a:tint val="60000"/>
+      </a:schemeClr>
+    </dgm:linClrLst>
+    <dgm:effectClrLst/>
+    <dgm:txLinClrLst/>
+    <dgm:txFillClrLst meth="repeat">
+      <a:schemeClr val="lt1"/>
+    </dgm:txFillClrLst>
+    <dgm:txEffectClrLst/>
+  </dgm:styleLbl>
+  <dgm:styleLbl name="parChTrans2D2">
+    <dgm:fillClrLst meth="repeat">
+      <a:schemeClr val="accent1"/>
+    </dgm:fillClrLst>
+    <dgm:linClrLst meth="repeat">
+      <a:schemeClr val="accent1"/>
+    </dgm:linClrLst>
+    <dgm:effectClrLst/>
+    <dgm:txLinClrLst/>
+    <dgm:txFillClrLst meth="repeat">
+      <a:schemeClr val="lt1"/>
+    </dgm:txFillClrLst>
+    <dgm:txEffectClrLst/>
+  </dgm:styleLbl>
+  <dgm:styleLbl name="parChTrans2D3">
+    <dgm:fillClrLst meth="repeat">
+      <a:schemeClr val="accent1"/>
+    </dgm:fillClrLst>
+    <dgm:linClrLst meth="repeat">
+      <a:schemeClr val="accent1"/>
+    </dgm:linClrLst>
+    <dgm:effectClrLst/>
+    <dgm:txLinClrLst/>
+    <dgm:txFillClrLst meth="repeat">
+      <a:schemeClr val="lt1"/>
+    </dgm:txFillClrLst>
+    <dgm:txEffectClrLst/>
+  </dgm:styleLbl>
+  <dgm:styleLbl name="parChTrans2D4">
+    <dgm:fillClrLst meth="repeat">
+      <a:schemeClr val="accent1"/>
+    </dgm:fillClrLst>
+    <dgm:linClrLst meth="repeat">
+      <a:schemeClr val="accent1"/>
+    </dgm:linClrLst>
+    <dgm:effectClrLst/>
+    <dgm:txLinClrLst/>
+    <dgm:txFillClrLst meth="repeat">
+      <a:schemeClr val="lt1"/>
+    </dgm:txFillClrLst>
+    <dgm:txEffectClrLst/>
+  </dgm:styleLbl>
+  <dgm:styleLbl name="parChTrans1D1">
+    <dgm:fillClrLst meth="repeat">
+      <a:schemeClr val="accent1"/>
+    </dgm:fillClrLst>
+    <dgm:linClrLst meth="repeat">
+      <a:schemeClr val="accent1">
+        <a:shade val="60000"/>
+      </a:schemeClr>
+    </dgm:linClrLst>
+    <dgm:effectClrLst/>
+    <dgm:txLinClrLst/>
+    <dgm:txFillClrLst meth="repeat">
+      <a:schemeClr val="tx1"/>
+    </dgm:txFillClrLst>
+    <dgm:txEffectClrLst/>
+  </dgm:styleLbl>
+  <dgm:styleLbl name="parChTrans1D2">
+    <dgm:fillClrLst meth="repeat">
+      <a:schemeClr val="accent1"/>
+    </dgm:fillClrLst>
+    <dgm:linClrLst meth="repeat">
+      <a:schemeClr val="accent1">
+        <a:shade val="60000"/>
+      </a:schemeClr>
+    </dgm:linClrLst>
+    <dgm:effectClrLst/>
+    <dgm:txLinClrLst/>
+    <dgm:txFillClrLst meth="repeat">
+      <a:schemeClr val="tx1"/>
+    </dgm:txFillClrLst>
+    <dgm:txEffectClrLst/>
+  </dgm:styleLbl>
+  <dgm:styleLbl name="parChTrans1D3">
+    <dgm:fillClrLst meth="repeat">
+      <a:schemeClr val="accent1"/>
+    </dgm:fillClrLst>
+    <dgm:linClrLst meth="repeat">
+      <a:schemeClr val="accent1">
+        <a:shade val="80000"/>
+      </a:schemeClr>
+    </dgm:linClrLst>
+    <dgm:effectClrLst/>
+    <dgm:txLinClrLst/>
+    <dgm:txFillClrLst meth="repeat">
+      <a:schemeClr val="tx1"/>
+    </dgm:txFillClrLst>
+    <dgm:txEffectClrLst/>
+  </dgm:styleLbl>
+  <dgm:styleLbl name="parChTrans1D4">
+    <dgm:fillClrLst meth="repeat">
+      <a:schemeClr val="accent1"/>
+    </dgm:fillClrLst>
+    <dgm:linClrLst meth="repeat">
+      <a:schemeClr val="accent1">
+        <a:shade val="80000"/>
+      </a:schemeClr>
+    </dgm:linClrLst>
+    <dgm:effectClrLst/>
+    <dgm:txLinClrLst/>
+    <dgm:txFillClrLst meth="repeat">
+      <a:schemeClr val="tx1"/>
+    </dgm:txFillClrLst>
+    <dgm:txEffectClrLst/>
+  </dgm:styleLbl>
+  <dgm:styleLbl name="fgAcc1">
+    <dgm:fillClrLst meth="repeat">
+      <a:schemeClr val="lt1">
+        <a:alpha val="90000"/>
+      </a:schemeClr>
+    </dgm:fillClrLst>
+    <dgm:linClrLst meth="repeat">
+      <a:schemeClr val="accent1"/>
+    </dgm:linClrLst>
+    <dgm:effectClrLst/>
+    <dgm:txLinClrLst/>
+    <dgm:txFillClrLst meth="repeat">
+      <a:schemeClr val="dk1"/>
+    </dgm:txFillClrLst>
+    <dgm:txEffectClrLst/>
+  </dgm:styleLbl>
+  <dgm:styleLbl name="conFgAcc1">
+    <dgm:fillClrLst meth="repeat">
+      <a:schemeClr val="lt1">
+        <a:alpha val="90000"/>
+      </a:schemeClr>
+    </dgm:fillClrLst>
+    <dgm:linClrLst meth="repeat">
+      <a:schemeClr val="accent1"/>
+    </dgm:linClrLst>
+    <dgm:effectClrLst/>
+    <dgm:txLinClrLst/>
+    <dgm:txFillClrLst meth="repeat">
+      <a:schemeClr val="dk1"/>
+    </dgm:txFillClrLst>
+    <dgm:txEffectClrLst/>
+  </dgm:styleLbl>
+  <dgm:styleLbl name="alignAcc1">
+    <dgm:fillClrLst meth="repeat">
+      <a:schemeClr val="lt1">
+        <a:alpha val="90000"/>
+      </a:schemeClr>
+    </dgm:fillClrLst>
+    <dgm:linClrLst meth="repeat">
+      <a:schemeClr val="accent1"/>
+    </dgm:linClrLst>
+    <dgm:effectClrLst/>
+    <dgm:txLinClrLst/>
+    <dgm:txFillClrLst meth="repeat">
+      <a:schemeClr val="dk1"/>
+    </dgm:txFillClrLst>
+    <dgm:txEffectClrLst/>
+  </dgm:styleLbl>
+  <dgm:styleLbl name="trAlignAcc1">
+    <dgm:fillClrLst meth="repeat">
+      <a:schemeClr val="lt1">
+        <a:alpha val="40000"/>
+      </a:schemeClr>
+    </dgm:fillClrLst>
+    <dgm:linClrLst meth="repeat">
+      <a:schemeClr val="accent1"/>
+    </dgm:linClrLst>
+    <dgm:effectClrLst/>
+    <dgm:txLinClrLst/>
+    <dgm:txFillClrLst meth="repeat">
+      <a:schemeClr val="dk1"/>
+    </dgm:txFillClrLst>
+    <dgm:txEffectClrLst/>
+  </dgm:styleLbl>
+  <dgm:styleLbl name="bgAcc1">
+    <dgm:fillClrLst meth="repeat">
+      <a:schemeClr val="lt1">
+        <a:alpha val="90000"/>
+      </a:schemeClr>
+    </dgm:fillClrLst>
+    <dgm:linClrLst meth="repeat">
+      <a:schemeClr val="accent1"/>
+    </dgm:linClrLst>
+    <dgm:effectClrLst/>
+    <dgm:txLinClrLst/>
+    <dgm:txFillClrLst meth="repeat">
+      <a:schemeClr val="dk1"/>
+    </dgm:txFillClrLst>
+    <dgm:txEffectClrLst/>
+  </dgm:styleLbl>
+  <dgm:styleLbl name="solidFgAcc1">
+    <dgm:fillClrLst meth="repeat">
+      <a:schemeClr val="lt1"/>
+    </dgm:fillClrLst>
+    <dgm:linClrLst meth="repeat">
+      <a:schemeClr val="accent1"/>
+    </dgm:linClrLst>
+    <dgm:effectClrLst/>
+    <dgm:txLinClrLst/>
+    <dgm:txFillClrLst meth="repeat">
+      <a:schemeClr val="dk1"/>
+    </dgm:txFillClrLst>
+    <dgm:txEffectClrLst/>
+  </dgm:styleLbl>
+  <dgm:styleLbl name="solidAlignAcc1">
+    <dgm:fillClrLst meth="repeat">
+      <a:schemeClr val="lt1"/>
+    </dgm:fillClrLst>
+    <dgm:linClrLst meth="repeat">
+      <a:schemeClr val="accent1"/>
+    </dgm:linClrLst>
+    <dgm:effectClrLst/>
+    <dgm:txLinClrLst/>
+    <dgm:txFillClrLst meth="repeat">
+      <a:schemeClr val="dk1"/>
+    </dgm:txFillClrLst>
+    <dgm:txEffectClrLst/>
+  </dgm:styleLbl>
+  <dgm:styleLbl name="solidBgAcc1">
+    <dgm:fillClrLst meth="repeat">
+      <a:schemeClr val="lt1"/>
+    </dgm:fillClrLst>
+    <dgm:linClrLst meth="repeat">
+      <a:schemeClr val="accent1"/>
+    </dgm:linClrLst>
+    <dgm:effectClrLst/>
+    <dgm:txLinClrLst/>
+    <dgm:txFillClrLst meth="repeat">
+      <a:schemeClr val="dk1"/>
+    </dgm:txFillClrLst>
+    <dgm:txEffectClrLst/>
+  </dgm:styleLbl>
+  <dgm:styleLbl name="fgAccFollowNode1">
+    <dgm:fillClrLst meth="repeat">
+      <a:schemeClr val="accent1">
+        <a:alpha val="90000"/>
+        <a:tint val="40000"/>
+      </a:schemeClr>
+    </dgm:fillClrLst>
+    <dgm:linClrLst meth="repeat">
+      <a:schemeClr val="accent1">
+        <a:alpha val="90000"/>
+        <a:tint val="40000"/>
+      </a:schemeClr>
+    </dgm:linClrLst>
+    <dgm:effectClrLst/>
+    <dgm:txLinClrLst/>
+    <dgm:txFillClrLst meth="repeat">
+      <a:schemeClr val="dk1"/>
+    </dgm:txFillClrLst>
+    <dgm:txEffectClrLst/>
+  </dgm:styleLbl>
+  <dgm:styleLbl name="alignAccFollowNode1">
+    <dgm:fillClrLst meth="repeat">
+      <a:schemeClr val="accent1">
+        <a:alpha val="90000"/>
+        <a:tint val="40000"/>
+      </a:schemeClr>
+    </dgm:fillClrLst>
+    <dgm:linClrLst meth="repeat">
+      <a:schemeClr val="accent1">
+        <a:alpha val="90000"/>
+        <a:tint val="40000"/>
+      </a:schemeClr>
+    </dgm:linClrLst>
+    <dgm:effectClrLst/>
+    <dgm:txLinClrLst/>
+    <dgm:txFillClrLst meth="repeat">
+      <a:schemeClr val="dk1"/>
+    </dgm:txFillClrLst>
+    <dgm:txEffectClrLst/>
+  </dgm:styleLbl>
+  <dgm:styleLbl name="bgAccFollowNode1">
+    <dgm:fillClrLst meth="repeat">
+      <a:schemeClr val="accent1">
+        <a:alpha val="90000"/>
+        <a:tint val="40000"/>
+      </a:schemeClr>
+    </dgm:fillClrLst>
+    <dgm:linClrLst meth="repeat">
+      <a:schemeClr val="accent1">
+        <a:alpha val="90000"/>
+        <a:tint val="40000"/>
+      </a:schemeClr>
+    </dgm:linClrLst>
+    <dgm:effectClrLst/>
+    <dgm:txLinClrLst/>
+    <dgm:txFillClrLst meth="repeat">
+      <a:schemeClr val="dk1"/>
+    </dgm:txFillClrLst>
+    <dgm:txEffectClrLst/>
+  </dgm:styleLbl>
+  <dgm:styleLbl name="fgAcc0">
+    <dgm:fillClrLst meth="repeat">
+      <a:schemeClr val="lt1">
+        <a:alpha val="90000"/>
+      </a:schemeClr>
+    </dgm:fillClrLst>
+    <dgm:linClrLst meth="repeat">
+      <a:schemeClr val="accent1"/>
+    </dgm:linClrLst>
+    <dgm:effectClrLst/>
+    <dgm:txLinClrLst/>
+    <dgm:txFillClrLst meth="repeat">
+      <a:schemeClr val="dk1"/>
+    </dgm:txFillClrLst>
+    <dgm:txEffectClrLst/>
+  </dgm:styleLbl>
+  <dgm:styleLbl name="fgAcc2">
+    <dgm:fillClrLst meth="repeat">
+      <a:schemeClr val="lt1">
+        <a:alpha val="90000"/>
+      </a:schemeClr>
+    </dgm:fillClrLst>
+    <dgm:linClrLst meth="repeat">
+      <a:schemeClr val="accent1"/>
+    </dgm:linClrLst>
+    <dgm:effectClrLst/>
+    <dgm:txLinClrLst/>
+    <dgm:txFillClrLst meth="repeat">
+      <a:schemeClr val="dk1"/>
+    </dgm:txFillClrLst>
+    <dgm:txEffectClrLst/>
+  </dgm:styleLbl>
+  <dgm:styleLbl name="fgAcc3">
+    <dgm:fillClrLst meth="repeat">
+      <a:schemeClr val="lt1">
+        <a:alpha val="90000"/>
+      </a:schemeClr>
+    </dgm:fillClrLst>
+    <dgm:linClrLst meth="repeat">
+      <a:schemeClr val="accent1"/>
+    </dgm:linClrLst>
+    <dgm:effectClrLst/>
+    <dgm:txLinClrLst/>
+    <dgm:txFillClrLst meth="repeat">
+      <a:schemeClr val="dk1"/>
+    </dgm:txFillClrLst>
+    <dgm:txEffectClrLst/>
+  </dgm:styleLbl>
+  <dgm:styleLbl name="fgAcc4">
+    <dgm:fillClrLst meth="repeat">
+      <a:schemeClr val="lt1">
+        <a:alpha val="90000"/>
+      </a:schemeClr>
+    </dgm:fillClrLst>
+    <dgm:linClrLst meth="repeat">
+      <a:schemeClr val="accent1"/>
+    </dgm:linClrLst>
+    <dgm:effectClrLst/>
+    <dgm:txLinClrLst/>
+    <dgm:txFillClrLst meth="repeat">
+      <a:schemeClr val="dk1"/>
+    </dgm:txFillClrLst>
+    <dgm:txEffectClrLst/>
+  </dgm:styleLbl>
+  <dgm:styleLbl name="bgShp">
+    <dgm:fillClrLst meth="repeat">
+      <a:schemeClr val="accent1">
+        <a:tint val="40000"/>
+      </a:schemeClr>
+    </dgm:fillClrLst>
+    <dgm:linClrLst meth="repeat">
+      <a:schemeClr val="accent1"/>
+    </dgm:linClrLst>
+    <dgm:effectClrLst/>
+    <dgm:txLinClrLst/>
+    <dgm:txFillClrLst meth="repeat">
+      <a:schemeClr val="dk1"/>
+    </dgm:txFillClrLst>
+    <dgm:txEffectClrLst/>
+  </dgm:styleLbl>
+  <dgm:styleLbl name="dkBgShp">
+    <dgm:fillClrLst meth="repeat">
+      <a:schemeClr val="accent1">
+        <a:shade val="80000"/>
+      </a:schemeClr>
+    </dgm:fillClrLst>
+    <dgm:linClrLst meth="repeat">
+      <a:schemeClr val="accent1"/>
+    </dgm:linClrLst>
+    <dgm:effectClrLst/>
+    <dgm:txLinClrLst/>
+    <dgm:txFillClrLst meth="repeat">
+      <a:schemeClr val="lt1"/>
+    </dgm:txFillClrLst>
+    <dgm:txEffectClrLst/>
+  </dgm:styleLbl>
+  <dgm:styleLbl name="trBgShp">
+    <dgm:fillClrLst meth="repeat">
+      <a:schemeClr val="accent1">
+        <a:tint val="50000"/>
+        <a:alpha val="40000"/>
+      </a:schemeClr>
+    </dgm:fillClrLst>
+    <dgm:linClrLst meth="repeat">
+      <a:schemeClr val="accent1"/>
+    </dgm:linClrLst>
+    <dgm:effectClrLst/>
+    <dgm:txLinClrLst/>
+    <dgm:txFillClrLst meth="repeat">
+      <a:schemeClr val="lt1"/>
+    </dgm:txFillClrLst>
+    <dgm:txEffectClrLst/>
+  </dgm:styleLbl>
+  <dgm:styleLbl name="fgShp">
+    <dgm:fillClrLst meth="repeat">
+      <a:schemeClr val="accent1">
+        <a:tint val="60000"/>
+      </a:schemeClr>
+    </dgm:fillClrLst>
+    <dgm:linClrLst meth="repeat">
+      <a:schemeClr val="lt1"/>
+    </dgm:linClrLst>
+    <dgm:effectClrLst/>
+    <dgm:txLinClrLst/>
+    <dgm:txFillClrLst meth="repeat">
+      <a:schemeClr val="dk1"/>
+    </dgm:txFillClrLst>
+    <dgm:txEffectClrLst/>
+  </dgm:styleLbl>
+  <dgm:styleLbl name="revTx">
+    <dgm:fillClrLst meth="repeat">
+      <a:schemeClr val="lt1">
+        <a:alpha val="0"/>
+      </a:schemeClr>
+    </dgm:fillClrLst>
+    <dgm:linClrLst meth="repeat">
+      <a:schemeClr val="dk1">
+        <a:alpha val="0"/>
+      </a:schemeClr>
+    </dgm:linClrLst>
+    <dgm:effectClrLst/>
+    <dgm:txLinClrLst/>
+    <dgm:txFillClrLst meth="repeat">
+      <a:schemeClr val="tx1"/>
+    </dgm:txFillClrLst>
+    <dgm:txEffectClrLst/>
+  </dgm:styleLbl>
+</dgm:colorsDef>
+</file>
+
+<file path=ppt/diagrams/data1.xml><?xml version="1.0" encoding="utf-8"?>
+<dgm:dataModel xmlns:dgm="http://schemas.openxmlformats.org/drawingml/2006/diagram" xmlns:a="http://schemas.openxmlformats.org/drawingml/2006/main">
+  <dgm:ptLst>
+    <dgm:pt modelId="{55C1318A-8A71-46CA-B53C-3835F89094B3}" type="doc">
+      <dgm:prSet loTypeId="urn:microsoft.com/office/officeart/2005/8/layout/cycle2" loCatId="cycle" qsTypeId="urn:microsoft.com/office/officeart/2005/8/quickstyle/simple1" qsCatId="simple" csTypeId="urn:microsoft.com/office/officeart/2005/8/colors/accent1_2" csCatId="accent1" phldr="1"/>
+      <dgm:spPr/>
+      <dgm:t>
+        <a:bodyPr/>
+        <a:lstStyle/>
+        <a:p>
+          <a:endParaRPr lang="en-US"/>
+        </a:p>
+      </dgm:t>
+    </dgm:pt>
+    <dgm:pt modelId="{B0C45C90-45F1-4B34-8E45-E20C6AEA344C}">
+      <dgm:prSet phldrT="[Text]"/>
+      <dgm:spPr>
+        <a:solidFill>
+          <a:schemeClr val="bg2">
+            <a:lumMod val="60000"/>
+            <a:lumOff val="40000"/>
+          </a:schemeClr>
+        </a:solidFill>
+        <a:ln w="19050">
+          <a:solidFill>
+            <a:schemeClr val="tx2">
+              <a:lumMod val="50000"/>
+            </a:schemeClr>
+          </a:solidFill>
+        </a:ln>
+      </dgm:spPr>
+      <dgm:t>
+        <a:bodyPr/>
+        <a:lstStyle/>
+        <a:p>
+          <a:r>
+            <a:rPr lang="en-US" dirty="0">
+              <a:solidFill>
+                <a:schemeClr val="bg1">
+                  <a:lumMod val="95000"/>
+                </a:schemeClr>
+              </a:solidFill>
+            </a:rPr>
+            <a:t>The SOCP solution  outputs an optimal battery and inverter control schedule</a:t>
+          </a:r>
+        </a:p>
+      </dgm:t>
+    </dgm:pt>
+    <dgm:pt modelId="{84598C56-434A-45E7-8056-90F7CAB89263}" type="parTrans" cxnId="{BABD956F-579A-4B9E-8F71-10670D321B5A}">
+      <dgm:prSet/>
+      <dgm:spPr/>
+      <dgm:t>
+        <a:bodyPr/>
+        <a:lstStyle/>
+        <a:p>
+          <a:endParaRPr lang="en-US"/>
+        </a:p>
+      </dgm:t>
+    </dgm:pt>
+    <dgm:pt modelId="{D81C8CCF-4697-4DD5-ADE9-14CED9E8EA19}" type="sibTrans" cxnId="{BABD956F-579A-4B9E-8F71-10670D321B5A}">
+      <dgm:prSet/>
+      <dgm:spPr/>
+      <dgm:t>
+        <a:bodyPr/>
+        <a:lstStyle/>
+        <a:p>
+          <a:endParaRPr lang="en-US"/>
+        </a:p>
+      </dgm:t>
+    </dgm:pt>
+    <dgm:pt modelId="{343CADBF-4DDC-4ED2-8368-6BE57FBC7B38}">
+      <dgm:prSet phldrT="[Text]"/>
+      <dgm:spPr>
+        <a:solidFill>
+          <a:schemeClr val="bg2">
+            <a:lumMod val="60000"/>
+            <a:lumOff val="40000"/>
+          </a:schemeClr>
+        </a:solidFill>
+        <a:ln w="19050">
+          <a:solidFill>
+            <a:schemeClr val="tx2">
+              <a:lumMod val="50000"/>
+            </a:schemeClr>
+          </a:solidFill>
+        </a:ln>
+      </dgm:spPr>
+      <dgm:t>
+        <a:bodyPr/>
+        <a:lstStyle/>
+        <a:p>
+          <a:r>
+            <a:rPr lang="en-US" dirty="0">
+              <a:solidFill>
+                <a:schemeClr val="bg1">
+                  <a:lumMod val="95000"/>
+                </a:schemeClr>
+              </a:solidFill>
+            </a:rPr>
+            <a:t>The schedule is used by the NLP to calculate a physically realizable schedule</a:t>
+          </a:r>
+        </a:p>
+      </dgm:t>
+    </dgm:pt>
+    <dgm:pt modelId="{F541670E-5BC2-409C-83D8-FDDF00C0DD8F}" type="parTrans" cxnId="{41B2C289-DC66-4405-A725-B993FD2F6816}">
+      <dgm:prSet/>
+      <dgm:spPr/>
+      <dgm:t>
+        <a:bodyPr/>
+        <a:lstStyle/>
+        <a:p>
+          <a:endParaRPr lang="en-US"/>
+        </a:p>
+      </dgm:t>
+    </dgm:pt>
+    <dgm:pt modelId="{5C79A275-8CC6-4192-937D-9C1E0C3C5EF6}" type="sibTrans" cxnId="{41B2C289-DC66-4405-A725-B993FD2F6816}">
+      <dgm:prSet/>
+      <dgm:spPr/>
+      <dgm:t>
+        <a:bodyPr/>
+        <a:lstStyle/>
+        <a:p>
+          <a:endParaRPr lang="en-US"/>
+        </a:p>
+      </dgm:t>
+    </dgm:pt>
+    <dgm:pt modelId="{62EEB961-7EE2-43E7-9E10-CE6AEBA2D905}">
+      <dgm:prSet phldrT="[Text]"/>
+      <dgm:spPr>
+        <a:solidFill>
+          <a:schemeClr val="bg2">
+            <a:lumMod val="60000"/>
+            <a:lumOff val="40000"/>
+          </a:schemeClr>
+        </a:solidFill>
+        <a:ln w="19050">
+          <a:solidFill>
+            <a:schemeClr val="tx2">
+              <a:lumMod val="50000"/>
+            </a:schemeClr>
+          </a:solidFill>
+        </a:ln>
+      </dgm:spPr>
+      <dgm:t>
+        <a:bodyPr/>
+        <a:lstStyle/>
+        <a:p>
+          <a:r>
+            <a:rPr lang="en-US" dirty="0">
+              <a:solidFill>
+                <a:schemeClr val="bg1">
+                  <a:lumMod val="95000"/>
+                </a:schemeClr>
+              </a:solidFill>
+            </a:rPr>
+            <a:t>The physically realizable schedule is implemented by </a:t>
+          </a:r>
+          <a:r>
+            <a:rPr lang="en-US" dirty="0" err="1">
+              <a:solidFill>
+                <a:schemeClr val="bg1">
+                  <a:lumMod val="95000"/>
+                </a:schemeClr>
+              </a:solidFill>
+            </a:rPr>
+            <a:t>GridLab</a:t>
+          </a:r>
+          <a:r>
+            <a:rPr lang="en-US" dirty="0">
+              <a:solidFill>
+                <a:schemeClr val="bg1">
+                  <a:lumMod val="95000"/>
+                </a:schemeClr>
+              </a:solidFill>
+            </a:rPr>
+            <a:t>-D to determine the resulting AC Power Flows.</a:t>
+          </a:r>
+        </a:p>
+      </dgm:t>
+    </dgm:pt>
+    <dgm:pt modelId="{CF7CCA23-E042-4A06-ADF3-B5998DF8240F}" type="parTrans" cxnId="{A349ED6F-2413-4399-BAF0-FA35AFC4B148}">
+      <dgm:prSet/>
+      <dgm:spPr/>
+      <dgm:t>
+        <a:bodyPr/>
+        <a:lstStyle/>
+        <a:p>
+          <a:endParaRPr lang="en-US"/>
+        </a:p>
+      </dgm:t>
+    </dgm:pt>
+    <dgm:pt modelId="{FA8A6BD6-5E7D-4F86-BCCD-642C66E1627D}" type="sibTrans" cxnId="{A349ED6F-2413-4399-BAF0-FA35AFC4B148}">
+      <dgm:prSet/>
+      <dgm:spPr/>
+      <dgm:t>
+        <a:bodyPr/>
+        <a:lstStyle/>
+        <a:p>
+          <a:endParaRPr lang="en-US"/>
+        </a:p>
+      </dgm:t>
+    </dgm:pt>
+    <dgm:pt modelId="{A070EE7E-2EC8-43B7-A174-54F76DC9A5C1}">
+      <dgm:prSet phldrT="[Text]"/>
+      <dgm:spPr>
+        <a:solidFill>
+          <a:schemeClr val="bg2">
+            <a:lumMod val="60000"/>
+            <a:lumOff val="40000"/>
+          </a:schemeClr>
+        </a:solidFill>
+        <a:ln w="19050">
+          <a:solidFill>
+            <a:schemeClr val="tx2">
+              <a:lumMod val="50000"/>
+            </a:schemeClr>
+          </a:solidFill>
+        </a:ln>
+      </dgm:spPr>
+      <dgm:t>
+        <a:bodyPr/>
+        <a:lstStyle/>
+        <a:p>
+          <a:r>
+            <a:rPr lang="en-US" dirty="0">
+              <a:solidFill>
+                <a:schemeClr val="bg1">
+                  <a:lumMod val="95000"/>
+                </a:schemeClr>
+              </a:solidFill>
+            </a:rPr>
+            <a:t>The forecast of demand and renewable generations are updated.</a:t>
+          </a:r>
+        </a:p>
+      </dgm:t>
+    </dgm:pt>
+    <dgm:pt modelId="{4AC2CB48-F482-455A-B898-8B36E6C9272A}" type="parTrans" cxnId="{09276C0E-E3F9-483F-B536-5CAA766FA390}">
+      <dgm:prSet/>
+      <dgm:spPr/>
+      <dgm:t>
+        <a:bodyPr/>
+        <a:lstStyle/>
+        <a:p>
+          <a:endParaRPr lang="en-US"/>
+        </a:p>
+      </dgm:t>
+    </dgm:pt>
+    <dgm:pt modelId="{BA03094D-F954-4822-A49A-9EB8C09AE785}" type="sibTrans" cxnId="{09276C0E-E3F9-483F-B536-5CAA766FA390}">
+      <dgm:prSet/>
+      <dgm:spPr/>
+      <dgm:t>
+        <a:bodyPr/>
+        <a:lstStyle/>
+        <a:p>
+          <a:endParaRPr lang="en-US"/>
+        </a:p>
+      </dgm:t>
+    </dgm:pt>
+    <dgm:pt modelId="{AE692026-969F-49A2-99D3-501E3CDAFB2D}" type="pres">
+      <dgm:prSet presAssocID="{55C1318A-8A71-46CA-B53C-3835F89094B3}" presName="cycle" presStyleCnt="0">
+        <dgm:presLayoutVars>
+          <dgm:dir/>
+          <dgm:resizeHandles val="exact"/>
+        </dgm:presLayoutVars>
+      </dgm:prSet>
+      <dgm:spPr/>
+    </dgm:pt>
+    <dgm:pt modelId="{96FE773E-0D0D-4853-8FC2-C585534B9FA7}" type="pres">
+      <dgm:prSet presAssocID="{B0C45C90-45F1-4B34-8E45-E20C6AEA344C}" presName="node" presStyleLbl="node1" presStyleIdx="0" presStyleCnt="4" custRadScaleRad="83752" custRadScaleInc="-19025">
+        <dgm:presLayoutVars>
+          <dgm:bulletEnabled val="1"/>
+        </dgm:presLayoutVars>
+      </dgm:prSet>
+      <dgm:spPr/>
+    </dgm:pt>
+    <dgm:pt modelId="{F4F227FC-327F-4CAD-9C83-044C14E76999}" type="pres">
+      <dgm:prSet presAssocID="{D81C8CCF-4697-4DD5-ADE9-14CED9E8EA19}" presName="sibTrans" presStyleLbl="sibTrans2D1" presStyleIdx="0" presStyleCnt="4"/>
+      <dgm:spPr/>
+    </dgm:pt>
+    <dgm:pt modelId="{AB6F7010-012A-44EC-9661-DAE623EB80E2}" type="pres">
+      <dgm:prSet presAssocID="{D81C8CCF-4697-4DD5-ADE9-14CED9E8EA19}" presName="connectorText" presStyleLbl="sibTrans2D1" presStyleIdx="0" presStyleCnt="4"/>
+      <dgm:spPr/>
+    </dgm:pt>
+    <dgm:pt modelId="{EBEB4AB3-D801-4615-973A-A003B350B7F7}" type="pres">
+      <dgm:prSet presAssocID="{343CADBF-4DDC-4ED2-8368-6BE57FBC7B38}" presName="node" presStyleLbl="node1" presStyleIdx="1" presStyleCnt="4" custRadScaleRad="121610" custRadScaleInc="12786">
+        <dgm:presLayoutVars>
+          <dgm:bulletEnabled val="1"/>
+        </dgm:presLayoutVars>
+      </dgm:prSet>
+      <dgm:spPr/>
+    </dgm:pt>
+    <dgm:pt modelId="{CD633E9B-76DB-461A-BEA8-90588114C834}" type="pres">
+      <dgm:prSet presAssocID="{5C79A275-8CC6-4192-937D-9C1E0C3C5EF6}" presName="sibTrans" presStyleLbl="sibTrans2D1" presStyleIdx="1" presStyleCnt="4"/>
+      <dgm:spPr/>
+    </dgm:pt>
+    <dgm:pt modelId="{1BB5C323-4794-428F-9CDE-D80CB3243B35}" type="pres">
+      <dgm:prSet presAssocID="{5C79A275-8CC6-4192-937D-9C1E0C3C5EF6}" presName="connectorText" presStyleLbl="sibTrans2D1" presStyleIdx="1" presStyleCnt="4"/>
+      <dgm:spPr/>
+    </dgm:pt>
+    <dgm:pt modelId="{4BAE3030-6163-4BB0-A9FC-4D12F88EF28E}" type="pres">
+      <dgm:prSet presAssocID="{62EEB961-7EE2-43E7-9E10-CE6AEBA2D905}" presName="node" presStyleLbl="node1" presStyleIdx="2" presStyleCnt="4" custRadScaleRad="87323" custRadScaleInc="10467">
+        <dgm:presLayoutVars>
+          <dgm:bulletEnabled val="1"/>
+        </dgm:presLayoutVars>
+      </dgm:prSet>
+      <dgm:spPr/>
+    </dgm:pt>
+    <dgm:pt modelId="{67617F40-DA62-4ADF-8E3B-AC4DF870A1B2}" type="pres">
+      <dgm:prSet presAssocID="{FA8A6BD6-5E7D-4F86-BCCD-642C66E1627D}" presName="sibTrans" presStyleLbl="sibTrans2D1" presStyleIdx="2" presStyleCnt="4"/>
+      <dgm:spPr/>
+    </dgm:pt>
+    <dgm:pt modelId="{A1AC9EC1-B1FD-4659-8304-53652714DFF3}" type="pres">
+      <dgm:prSet presAssocID="{FA8A6BD6-5E7D-4F86-BCCD-642C66E1627D}" presName="connectorText" presStyleLbl="sibTrans2D1" presStyleIdx="2" presStyleCnt="4"/>
+      <dgm:spPr/>
+    </dgm:pt>
+    <dgm:pt modelId="{FC9AEC83-8A34-416E-ADB1-769965C1BE09}" type="pres">
+      <dgm:prSet presAssocID="{A070EE7E-2EC8-43B7-A174-54F76DC9A5C1}" presName="node" presStyleLbl="node1" presStyleIdx="3" presStyleCnt="4" custRadScaleRad="133971" custRadScaleInc="-4729">
+        <dgm:presLayoutVars>
+          <dgm:bulletEnabled val="1"/>
+        </dgm:presLayoutVars>
+      </dgm:prSet>
+      <dgm:spPr/>
+    </dgm:pt>
+    <dgm:pt modelId="{27F7F757-5639-4E8D-B7BC-438DB737CBD6}" type="pres">
+      <dgm:prSet presAssocID="{BA03094D-F954-4822-A49A-9EB8C09AE785}" presName="sibTrans" presStyleLbl="sibTrans2D1" presStyleIdx="3" presStyleCnt="4"/>
+      <dgm:spPr/>
+    </dgm:pt>
+    <dgm:pt modelId="{1C0C47D8-1906-46A1-8CDB-0FBECB22C4ED}" type="pres">
+      <dgm:prSet presAssocID="{BA03094D-F954-4822-A49A-9EB8C09AE785}" presName="connectorText" presStyleLbl="sibTrans2D1" presStyleIdx="3" presStyleCnt="4"/>
+      <dgm:spPr/>
+    </dgm:pt>
+  </dgm:ptLst>
+  <dgm:cxnLst>
+    <dgm:cxn modelId="{09276C0E-E3F9-483F-B536-5CAA766FA390}" srcId="{55C1318A-8A71-46CA-B53C-3835F89094B3}" destId="{A070EE7E-2EC8-43B7-A174-54F76DC9A5C1}" srcOrd="3" destOrd="0" parTransId="{4AC2CB48-F482-455A-B898-8B36E6C9272A}" sibTransId="{BA03094D-F954-4822-A49A-9EB8C09AE785}"/>
+    <dgm:cxn modelId="{EA0AE11C-9F82-4774-AA41-B89115EE5111}" type="presOf" srcId="{FA8A6BD6-5E7D-4F86-BCCD-642C66E1627D}" destId="{67617F40-DA62-4ADF-8E3B-AC4DF870A1B2}" srcOrd="0" destOrd="0" presId="urn:microsoft.com/office/officeart/2005/8/layout/cycle2"/>
+    <dgm:cxn modelId="{6561F71E-EAC9-4B0D-9CF9-43230E0880F3}" type="presOf" srcId="{BA03094D-F954-4822-A49A-9EB8C09AE785}" destId="{27F7F757-5639-4E8D-B7BC-438DB737CBD6}" srcOrd="0" destOrd="0" presId="urn:microsoft.com/office/officeart/2005/8/layout/cycle2"/>
+    <dgm:cxn modelId="{F229C125-DDB0-4B07-80E2-E8B959A061E3}" type="presOf" srcId="{FA8A6BD6-5E7D-4F86-BCCD-642C66E1627D}" destId="{A1AC9EC1-B1FD-4659-8304-53652714DFF3}" srcOrd="1" destOrd="0" presId="urn:microsoft.com/office/officeart/2005/8/layout/cycle2"/>
+    <dgm:cxn modelId="{F3139664-E1DD-4810-A5E4-0A08171C6607}" type="presOf" srcId="{D81C8CCF-4697-4DD5-ADE9-14CED9E8EA19}" destId="{AB6F7010-012A-44EC-9661-DAE623EB80E2}" srcOrd="1" destOrd="0" presId="urn:microsoft.com/office/officeart/2005/8/layout/cycle2"/>
+    <dgm:cxn modelId="{EC256F6E-D679-465C-A757-D7064CB36163}" type="presOf" srcId="{55C1318A-8A71-46CA-B53C-3835F89094B3}" destId="{AE692026-969F-49A2-99D3-501E3CDAFB2D}" srcOrd="0" destOrd="0" presId="urn:microsoft.com/office/officeart/2005/8/layout/cycle2"/>
+    <dgm:cxn modelId="{3754764E-ACE5-440B-A2EF-55A5C5BF30AB}" type="presOf" srcId="{D81C8CCF-4697-4DD5-ADE9-14CED9E8EA19}" destId="{F4F227FC-327F-4CAD-9C83-044C14E76999}" srcOrd="0" destOrd="0" presId="urn:microsoft.com/office/officeart/2005/8/layout/cycle2"/>
+    <dgm:cxn modelId="{BABD956F-579A-4B9E-8F71-10670D321B5A}" srcId="{55C1318A-8A71-46CA-B53C-3835F89094B3}" destId="{B0C45C90-45F1-4B34-8E45-E20C6AEA344C}" srcOrd="0" destOrd="0" parTransId="{84598C56-434A-45E7-8056-90F7CAB89263}" sibTransId="{D81C8CCF-4697-4DD5-ADE9-14CED9E8EA19}"/>
+    <dgm:cxn modelId="{A349ED6F-2413-4399-BAF0-FA35AFC4B148}" srcId="{55C1318A-8A71-46CA-B53C-3835F89094B3}" destId="{62EEB961-7EE2-43E7-9E10-CE6AEBA2D905}" srcOrd="2" destOrd="0" parTransId="{CF7CCA23-E042-4A06-ADF3-B5998DF8240F}" sibTransId="{FA8A6BD6-5E7D-4F86-BCCD-642C66E1627D}"/>
+    <dgm:cxn modelId="{77CBC451-75E0-49A8-AC4E-0862C54016B5}" type="presOf" srcId="{62EEB961-7EE2-43E7-9E10-CE6AEBA2D905}" destId="{4BAE3030-6163-4BB0-A9FC-4D12F88EF28E}" srcOrd="0" destOrd="0" presId="urn:microsoft.com/office/officeart/2005/8/layout/cycle2"/>
+    <dgm:cxn modelId="{44377D53-FA7F-4907-82A7-63FEFD8003E5}" type="presOf" srcId="{343CADBF-4DDC-4ED2-8368-6BE57FBC7B38}" destId="{EBEB4AB3-D801-4615-973A-A003B350B7F7}" srcOrd="0" destOrd="0" presId="urn:microsoft.com/office/officeart/2005/8/layout/cycle2"/>
+    <dgm:cxn modelId="{0781AF78-A049-461E-8A30-C5991CF2F36B}" type="presOf" srcId="{B0C45C90-45F1-4B34-8E45-E20C6AEA344C}" destId="{96FE773E-0D0D-4853-8FC2-C585534B9FA7}" srcOrd="0" destOrd="0" presId="urn:microsoft.com/office/officeart/2005/8/layout/cycle2"/>
+    <dgm:cxn modelId="{6C459C85-6BA7-43AE-B9EA-2B418ED2F6BE}" type="presOf" srcId="{5C79A275-8CC6-4192-937D-9C1E0C3C5EF6}" destId="{1BB5C323-4794-428F-9CDE-D80CB3243B35}" srcOrd="1" destOrd="0" presId="urn:microsoft.com/office/officeart/2005/8/layout/cycle2"/>
+    <dgm:cxn modelId="{41B2C289-DC66-4405-A725-B993FD2F6816}" srcId="{55C1318A-8A71-46CA-B53C-3835F89094B3}" destId="{343CADBF-4DDC-4ED2-8368-6BE57FBC7B38}" srcOrd="1" destOrd="0" parTransId="{F541670E-5BC2-409C-83D8-FDDF00C0DD8F}" sibTransId="{5C79A275-8CC6-4192-937D-9C1E0C3C5EF6}"/>
+    <dgm:cxn modelId="{062292BE-E671-43BA-96F3-3D4DB0BAFDD2}" type="presOf" srcId="{BA03094D-F954-4822-A49A-9EB8C09AE785}" destId="{1C0C47D8-1906-46A1-8CDB-0FBECB22C4ED}" srcOrd="1" destOrd="0" presId="urn:microsoft.com/office/officeart/2005/8/layout/cycle2"/>
+    <dgm:cxn modelId="{2C219FD4-6EF5-4283-90F9-7B9F8E4BDA0C}" type="presOf" srcId="{5C79A275-8CC6-4192-937D-9C1E0C3C5EF6}" destId="{CD633E9B-76DB-461A-BEA8-90588114C834}" srcOrd="0" destOrd="0" presId="urn:microsoft.com/office/officeart/2005/8/layout/cycle2"/>
+    <dgm:cxn modelId="{C6A8AEF2-D665-4C14-A577-B3440B110415}" type="presOf" srcId="{A070EE7E-2EC8-43B7-A174-54F76DC9A5C1}" destId="{FC9AEC83-8A34-416E-ADB1-769965C1BE09}" srcOrd="0" destOrd="0" presId="urn:microsoft.com/office/officeart/2005/8/layout/cycle2"/>
+    <dgm:cxn modelId="{EF167B71-8016-4184-AEA3-E8FFEACA6762}" type="presParOf" srcId="{AE692026-969F-49A2-99D3-501E3CDAFB2D}" destId="{96FE773E-0D0D-4853-8FC2-C585534B9FA7}" srcOrd="0" destOrd="0" presId="urn:microsoft.com/office/officeart/2005/8/layout/cycle2"/>
+    <dgm:cxn modelId="{A95F1B94-ADE5-4FCE-89F3-F38464ED0694}" type="presParOf" srcId="{AE692026-969F-49A2-99D3-501E3CDAFB2D}" destId="{F4F227FC-327F-4CAD-9C83-044C14E76999}" srcOrd="1" destOrd="0" presId="urn:microsoft.com/office/officeart/2005/8/layout/cycle2"/>
+    <dgm:cxn modelId="{F5B1A0B6-1258-49F0-A200-2BD81B3D135F}" type="presParOf" srcId="{F4F227FC-327F-4CAD-9C83-044C14E76999}" destId="{AB6F7010-012A-44EC-9661-DAE623EB80E2}" srcOrd="0" destOrd="0" presId="urn:microsoft.com/office/officeart/2005/8/layout/cycle2"/>
+    <dgm:cxn modelId="{51D6EDD7-4A7F-419C-B593-CCDA380037EF}" type="presParOf" srcId="{AE692026-969F-49A2-99D3-501E3CDAFB2D}" destId="{EBEB4AB3-D801-4615-973A-A003B350B7F7}" srcOrd="2" destOrd="0" presId="urn:microsoft.com/office/officeart/2005/8/layout/cycle2"/>
+    <dgm:cxn modelId="{8DA7FAED-34A6-4523-889D-90C7DEF6BFEA}" type="presParOf" srcId="{AE692026-969F-49A2-99D3-501E3CDAFB2D}" destId="{CD633E9B-76DB-461A-BEA8-90588114C834}" srcOrd="3" destOrd="0" presId="urn:microsoft.com/office/officeart/2005/8/layout/cycle2"/>
+    <dgm:cxn modelId="{0D44B39B-5EA7-4F3E-91F1-144B49FB2781}" type="presParOf" srcId="{CD633E9B-76DB-461A-BEA8-90588114C834}" destId="{1BB5C323-4794-428F-9CDE-D80CB3243B35}" srcOrd="0" destOrd="0" presId="urn:microsoft.com/office/officeart/2005/8/layout/cycle2"/>
+    <dgm:cxn modelId="{E20BBD20-A5C6-4866-9A6E-477640C45C9A}" type="presParOf" srcId="{AE692026-969F-49A2-99D3-501E3CDAFB2D}" destId="{4BAE3030-6163-4BB0-A9FC-4D12F88EF28E}" srcOrd="4" destOrd="0" presId="urn:microsoft.com/office/officeart/2005/8/layout/cycle2"/>
+    <dgm:cxn modelId="{6FC16305-284C-42F6-BB66-10F88E2A45C5}" type="presParOf" srcId="{AE692026-969F-49A2-99D3-501E3CDAFB2D}" destId="{67617F40-DA62-4ADF-8E3B-AC4DF870A1B2}" srcOrd="5" destOrd="0" presId="urn:microsoft.com/office/officeart/2005/8/layout/cycle2"/>
+    <dgm:cxn modelId="{2FE1608E-B0F4-44DE-9158-8F1EDB940440}" type="presParOf" srcId="{67617F40-DA62-4ADF-8E3B-AC4DF870A1B2}" destId="{A1AC9EC1-B1FD-4659-8304-53652714DFF3}" srcOrd="0" destOrd="0" presId="urn:microsoft.com/office/officeart/2005/8/layout/cycle2"/>
+    <dgm:cxn modelId="{E34BD09B-ABB7-42D5-946E-0B2EA0DC17CB}" type="presParOf" srcId="{AE692026-969F-49A2-99D3-501E3CDAFB2D}" destId="{FC9AEC83-8A34-416E-ADB1-769965C1BE09}" srcOrd="6" destOrd="0" presId="urn:microsoft.com/office/officeart/2005/8/layout/cycle2"/>
+    <dgm:cxn modelId="{D9979B2F-0527-421B-9C86-7CBAA2651B6A}" type="presParOf" srcId="{AE692026-969F-49A2-99D3-501E3CDAFB2D}" destId="{27F7F757-5639-4E8D-B7BC-438DB737CBD6}" srcOrd="7" destOrd="0" presId="urn:microsoft.com/office/officeart/2005/8/layout/cycle2"/>
+    <dgm:cxn modelId="{7ABFF3F0-D352-45A7-95BD-1C35FF502A72}" type="presParOf" srcId="{27F7F757-5639-4E8D-B7BC-438DB737CBD6}" destId="{1C0C47D8-1906-46A1-8CDB-0FBECB22C4ED}" srcOrd="0" destOrd="0" presId="urn:microsoft.com/office/officeart/2005/8/layout/cycle2"/>
+  </dgm:cxnLst>
+  <dgm:bg/>
+  <dgm:whole>
+    <a:ln>
+      <a:solidFill>
+        <a:schemeClr val="bg2">
+          <a:lumMod val="20000"/>
+          <a:lumOff val="80000"/>
+        </a:schemeClr>
+      </a:solidFill>
+    </a:ln>
+  </dgm:whole>
+  <dgm:extLst>
+    <a:ext uri="http://schemas.microsoft.com/office/drawing/2008/diagram">
+      <dsp:dataModelExt xmlns:dsp="http://schemas.microsoft.com/office/drawing/2008/diagram" relId="rId6" minVer="http://schemas.openxmlformats.org/drawingml/2006/diagram"/>
+    </a:ext>
+  </dgm:extLst>
+</dgm:dataModel>
+</file>
+
+<file path=ppt/diagrams/drawing1.xml><?xml version="1.0" encoding="utf-8"?>
+<dsp:drawing xmlns:dgm="http://schemas.openxmlformats.org/drawingml/2006/diagram" xmlns:dsp="http://schemas.microsoft.com/office/drawing/2008/diagram" xmlns:a="http://schemas.openxmlformats.org/drawingml/2006/main">
+  <dsp:spTree>
+    <dsp:nvGrpSpPr>
+      <dsp:cNvPr id="0" name=""/>
+      <dsp:cNvGrpSpPr/>
+    </dsp:nvGrpSpPr>
+    <dsp:grpSpPr/>
+    <dsp:sp modelId="{96FE773E-0D0D-4853-8FC2-C585534B9FA7}">
+      <dsp:nvSpPr>
+        <dsp:cNvPr id="0" name=""/>
+        <dsp:cNvSpPr/>
+      </dsp:nvSpPr>
+      <dsp:spPr>
+        <a:xfrm>
+          <a:off x="3301445" y="307498"/>
+          <a:ext cx="1681561" cy="1681561"/>
+        </a:xfrm>
+        <a:prstGeom prst="ellipse">
+          <a:avLst/>
+        </a:prstGeom>
+        <a:solidFill>
+          <a:schemeClr val="bg2">
+            <a:lumMod val="60000"/>
+            <a:lumOff val="40000"/>
+          </a:schemeClr>
+        </a:solidFill>
+        <a:ln w="19050" cap="flat" cmpd="sng" algn="ctr">
+          <a:solidFill>
+            <a:schemeClr val="tx2">
+              <a:lumMod val="50000"/>
+            </a:schemeClr>
+          </a:solidFill>
+          <a:prstDash val="solid"/>
+          <a:miter lim="800000"/>
+        </a:ln>
+        <a:effectLst/>
+      </dsp:spPr>
+      <dsp:style>
+        <a:lnRef idx="2">
+          <a:scrgbClr r="0" g="0" b="0"/>
+        </a:lnRef>
+        <a:fillRef idx="1">
+          <a:scrgbClr r="0" g="0" b="0"/>
+        </a:fillRef>
+        <a:effectRef idx="0">
+          <a:scrgbClr r="0" g="0" b="0"/>
+        </a:effectRef>
+        <a:fontRef idx="minor">
+          <a:schemeClr val="lt1"/>
+        </a:fontRef>
+      </dsp:style>
+      <dsp:txBody>
+        <a:bodyPr spcFirstLastPara="0" vert="horz" wrap="square" lIns="13970" tIns="13970" rIns="13970" bIns="13970" numCol="1" spcCol="1270" anchor="ctr" anchorCtr="0">
+          <a:noAutofit/>
+        </a:bodyPr>
+        <a:lstStyle/>
+        <a:p>
+          <a:pPr marL="0" lvl="0" indent="0" algn="ctr" defTabSz="488950">
+            <a:lnSpc>
+              <a:spcPct val="90000"/>
+            </a:lnSpc>
+            <a:spcBef>
+              <a:spcPct val="0"/>
+            </a:spcBef>
+            <a:spcAft>
+              <a:spcPct val="35000"/>
+            </a:spcAft>
+            <a:buNone/>
+          </a:pPr>
+          <a:r>
+            <a:rPr lang="en-US" sz="1100" kern="1200" dirty="0">
+              <a:solidFill>
+                <a:schemeClr val="bg1">
+                  <a:lumMod val="95000"/>
+                </a:schemeClr>
+              </a:solidFill>
+            </a:rPr>
+            <a:t>The SOCP solution  outputs an optimal battery and inverter control schedule</a:t>
+          </a:r>
+        </a:p>
+      </dsp:txBody>
+      <dsp:txXfrm>
+        <a:off x="3547704" y="553757"/>
+        <a:ext cx="1189043" cy="1189043"/>
+      </dsp:txXfrm>
+    </dsp:sp>
+    <dsp:sp modelId="{F4F227FC-327F-4CAD-9C83-044C14E76999}">
+      <dsp:nvSpPr>
+        <dsp:cNvPr id="0" name=""/>
+        <dsp:cNvSpPr/>
+      </dsp:nvSpPr>
+      <dsp:spPr>
+        <a:xfrm rot="2126765">
+          <a:off x="4988938" y="1701803"/>
+          <a:ext cx="658924" cy="567526"/>
+        </a:xfrm>
+        <a:prstGeom prst="rightArrow">
+          <a:avLst>
+            <a:gd name="adj1" fmla="val 60000"/>
+            <a:gd name="adj2" fmla="val 50000"/>
+          </a:avLst>
+        </a:prstGeom>
+        <a:solidFill>
+          <a:schemeClr val="accent1">
+            <a:tint val="60000"/>
+            <a:hueOff val="0"/>
+            <a:satOff val="0"/>
+            <a:lumOff val="0"/>
+            <a:alphaOff val="0"/>
+          </a:schemeClr>
+        </a:solidFill>
+        <a:ln>
+          <a:noFill/>
+        </a:ln>
+        <a:effectLst/>
+      </dsp:spPr>
+      <dsp:style>
+        <a:lnRef idx="0">
+          <a:scrgbClr r="0" g="0" b="0"/>
+        </a:lnRef>
+        <a:fillRef idx="1">
+          <a:scrgbClr r="0" g="0" b="0"/>
+        </a:fillRef>
+        <a:effectRef idx="0">
+          <a:scrgbClr r="0" g="0" b="0"/>
+        </a:effectRef>
+        <a:fontRef idx="minor">
+          <a:schemeClr val="lt1"/>
+        </a:fontRef>
+      </dsp:style>
+      <dsp:txBody>
+        <a:bodyPr spcFirstLastPara="0" vert="horz" wrap="square" lIns="0" tIns="0" rIns="0" bIns="0" numCol="1" spcCol="1270" anchor="ctr" anchorCtr="0">
+          <a:noAutofit/>
+        </a:bodyPr>
+        <a:lstStyle/>
+        <a:p>
+          <a:pPr marL="0" lvl="0" indent="0" algn="ctr" defTabSz="400050">
+            <a:lnSpc>
+              <a:spcPct val="90000"/>
+            </a:lnSpc>
+            <a:spcBef>
+              <a:spcPct val="0"/>
+            </a:spcBef>
+            <a:spcAft>
+              <a:spcPct val="35000"/>
+            </a:spcAft>
+            <a:buNone/>
+          </a:pPr>
+          <a:endParaRPr lang="en-US" sz="900" kern="1200"/>
+        </a:p>
+      </dsp:txBody>
+      <dsp:txXfrm>
+        <a:off x="5004716" y="1765939"/>
+        <a:ext cx="488666" cy="340516"/>
+      </dsp:txXfrm>
+    </dsp:sp>
+    <dsp:sp modelId="{EBEB4AB3-D801-4615-973A-A003B350B7F7}">
+      <dsp:nvSpPr>
+        <dsp:cNvPr id="0" name=""/>
+        <dsp:cNvSpPr/>
+      </dsp:nvSpPr>
+      <dsp:spPr>
+        <a:xfrm>
+          <a:off x="5684179" y="2003705"/>
+          <a:ext cx="1681561" cy="1681561"/>
+        </a:xfrm>
+        <a:prstGeom prst="ellipse">
+          <a:avLst/>
+        </a:prstGeom>
+        <a:solidFill>
+          <a:schemeClr val="bg2">
+            <a:lumMod val="60000"/>
+            <a:lumOff val="40000"/>
+          </a:schemeClr>
+        </a:solidFill>
+        <a:ln w="19050" cap="flat" cmpd="sng" algn="ctr">
+          <a:solidFill>
+            <a:schemeClr val="tx2">
+              <a:lumMod val="50000"/>
+            </a:schemeClr>
+          </a:solidFill>
+          <a:prstDash val="solid"/>
+          <a:miter lim="800000"/>
+        </a:ln>
+        <a:effectLst/>
+      </dsp:spPr>
+      <dsp:style>
+        <a:lnRef idx="2">
+          <a:scrgbClr r="0" g="0" b="0"/>
+        </a:lnRef>
+        <a:fillRef idx="1">
+          <a:scrgbClr r="0" g="0" b="0"/>
+        </a:fillRef>
+        <a:effectRef idx="0">
+          <a:scrgbClr r="0" g="0" b="0"/>
+        </a:effectRef>
+        <a:fontRef idx="minor">
+          <a:schemeClr val="lt1"/>
+        </a:fontRef>
+      </dsp:style>
+      <dsp:txBody>
+        <a:bodyPr spcFirstLastPara="0" vert="horz" wrap="square" lIns="13970" tIns="13970" rIns="13970" bIns="13970" numCol="1" spcCol="1270" anchor="ctr" anchorCtr="0">
+          <a:noAutofit/>
+        </a:bodyPr>
+        <a:lstStyle/>
+        <a:p>
+          <a:pPr marL="0" lvl="0" indent="0" algn="ctr" defTabSz="488950">
+            <a:lnSpc>
+              <a:spcPct val="90000"/>
+            </a:lnSpc>
+            <a:spcBef>
+              <a:spcPct val="0"/>
+            </a:spcBef>
+            <a:spcAft>
+              <a:spcPct val="35000"/>
+            </a:spcAft>
+            <a:buNone/>
+          </a:pPr>
+          <a:r>
+            <a:rPr lang="en-US" sz="1100" kern="1200" dirty="0">
+              <a:solidFill>
+                <a:schemeClr val="bg1">
+                  <a:lumMod val="95000"/>
+                </a:schemeClr>
+              </a:solidFill>
+            </a:rPr>
+            <a:t>The schedule is used by the NLP to calculate a physically realizable schedule</a:t>
+          </a:r>
+        </a:p>
+      </dsp:txBody>
+      <dsp:txXfrm>
+        <a:off x="5930438" y="2249964"/>
+        <a:ext cx="1189043" cy="1189043"/>
+      </dsp:txXfrm>
+    </dsp:sp>
+    <dsp:sp modelId="{CD633E9B-76DB-461A-BEA8-90588114C834}">
+      <dsp:nvSpPr>
+        <dsp:cNvPr id="0" name=""/>
+        <dsp:cNvSpPr/>
+      </dsp:nvSpPr>
+      <dsp:spPr>
+        <a:xfrm rot="8983177">
+          <a:off x="5136873" y="3221421"/>
+          <a:ext cx="513091" cy="567526"/>
+        </a:xfrm>
+        <a:prstGeom prst="rightArrow">
+          <a:avLst>
+            <a:gd name="adj1" fmla="val 60000"/>
+            <a:gd name="adj2" fmla="val 50000"/>
+          </a:avLst>
+        </a:prstGeom>
+        <a:solidFill>
+          <a:schemeClr val="accent1">
+            <a:tint val="60000"/>
+            <a:hueOff val="0"/>
+            <a:satOff val="0"/>
+            <a:lumOff val="0"/>
+            <a:alphaOff val="0"/>
+          </a:schemeClr>
+        </a:solidFill>
+        <a:ln>
+          <a:noFill/>
+        </a:ln>
+        <a:effectLst/>
+      </dsp:spPr>
+      <dsp:style>
+        <a:lnRef idx="0">
+          <a:scrgbClr r="0" g="0" b="0"/>
+        </a:lnRef>
+        <a:fillRef idx="1">
+          <a:scrgbClr r="0" g="0" b="0"/>
+        </a:fillRef>
+        <a:effectRef idx="0">
+          <a:scrgbClr r="0" g="0" b="0"/>
+        </a:effectRef>
+        <a:fontRef idx="minor">
+          <a:schemeClr val="lt1"/>
+        </a:fontRef>
+      </dsp:style>
+      <dsp:txBody>
+        <a:bodyPr spcFirstLastPara="0" vert="horz" wrap="square" lIns="0" tIns="0" rIns="0" bIns="0" numCol="1" spcCol="1270" anchor="ctr" anchorCtr="0">
+          <a:noAutofit/>
+        </a:bodyPr>
+        <a:lstStyle/>
+        <a:p>
+          <a:pPr marL="0" lvl="0" indent="0" algn="ctr" defTabSz="400050">
+            <a:lnSpc>
+              <a:spcPct val="90000"/>
+            </a:lnSpc>
+            <a:spcBef>
+              <a:spcPct val="0"/>
+            </a:spcBef>
+            <a:spcAft>
+              <a:spcPct val="35000"/>
+            </a:spcAft>
+            <a:buNone/>
+          </a:pPr>
+          <a:endParaRPr lang="en-US" sz="900" kern="1200"/>
+        </a:p>
+      </dsp:txBody>
+      <dsp:txXfrm rot="10800000">
+        <a:off x="5280300" y="3296119"/>
+        <a:ext cx="359164" cy="340516"/>
+      </dsp:txXfrm>
+    </dsp:sp>
+    <dsp:sp modelId="{4BAE3030-6163-4BB0-A9FC-4D12F88EF28E}">
+      <dsp:nvSpPr>
+        <dsp:cNvPr id="0" name=""/>
+        <dsp:cNvSpPr/>
+      </dsp:nvSpPr>
+      <dsp:spPr>
+        <a:xfrm>
+          <a:off x="3396017" y="3339748"/>
+          <a:ext cx="1681561" cy="1681561"/>
+        </a:xfrm>
+        <a:prstGeom prst="ellipse">
+          <a:avLst/>
+        </a:prstGeom>
+        <a:solidFill>
+          <a:schemeClr val="bg2">
+            <a:lumMod val="60000"/>
+            <a:lumOff val="40000"/>
+          </a:schemeClr>
+        </a:solidFill>
+        <a:ln w="19050" cap="flat" cmpd="sng" algn="ctr">
+          <a:solidFill>
+            <a:schemeClr val="tx2">
+              <a:lumMod val="50000"/>
+            </a:schemeClr>
+          </a:solidFill>
+          <a:prstDash val="solid"/>
+          <a:miter lim="800000"/>
+        </a:ln>
+        <a:effectLst/>
+      </dsp:spPr>
+      <dsp:style>
+        <a:lnRef idx="2">
+          <a:scrgbClr r="0" g="0" b="0"/>
+        </a:lnRef>
+        <a:fillRef idx="1">
+          <a:scrgbClr r="0" g="0" b="0"/>
+        </a:fillRef>
+        <a:effectRef idx="0">
+          <a:scrgbClr r="0" g="0" b="0"/>
+        </a:effectRef>
+        <a:fontRef idx="minor">
+          <a:schemeClr val="lt1"/>
+        </a:fontRef>
+      </dsp:style>
+      <dsp:txBody>
+        <a:bodyPr spcFirstLastPara="0" vert="horz" wrap="square" lIns="13970" tIns="13970" rIns="13970" bIns="13970" numCol="1" spcCol="1270" anchor="ctr" anchorCtr="0">
+          <a:noAutofit/>
+        </a:bodyPr>
+        <a:lstStyle/>
+        <a:p>
+          <a:pPr marL="0" lvl="0" indent="0" algn="ctr" defTabSz="488950">
+            <a:lnSpc>
+              <a:spcPct val="90000"/>
+            </a:lnSpc>
+            <a:spcBef>
+              <a:spcPct val="0"/>
+            </a:spcBef>
+            <a:spcAft>
+              <a:spcPct val="35000"/>
+            </a:spcAft>
+            <a:buNone/>
+          </a:pPr>
+          <a:r>
+            <a:rPr lang="en-US" sz="1100" kern="1200" dirty="0">
+              <a:solidFill>
+                <a:schemeClr val="bg1">
+                  <a:lumMod val="95000"/>
+                </a:schemeClr>
+              </a:solidFill>
+            </a:rPr>
+            <a:t>The physically realizable schedule is implemented by </a:t>
+          </a:r>
+          <a:r>
+            <a:rPr lang="en-US" sz="1100" kern="1200" dirty="0" err="1">
+              <a:solidFill>
+                <a:schemeClr val="bg1">
+                  <a:lumMod val="95000"/>
+                </a:schemeClr>
+              </a:solidFill>
+            </a:rPr>
+            <a:t>GridLab</a:t>
+          </a:r>
+          <a:r>
+            <a:rPr lang="en-US" sz="1100" kern="1200" dirty="0">
+              <a:solidFill>
+                <a:schemeClr val="bg1">
+                  <a:lumMod val="95000"/>
+                </a:schemeClr>
+              </a:solidFill>
+            </a:rPr>
+            <a:t>-D to determine the resulting AC Power Flows.</a:t>
+          </a:r>
+        </a:p>
+      </dsp:txBody>
+      <dsp:txXfrm>
+        <a:off x="3642276" y="3586007"/>
+        <a:ext cx="1189043" cy="1189043"/>
+      </dsp:txXfrm>
+    </dsp:sp>
+    <dsp:sp modelId="{67617F40-DA62-4ADF-8E3B-AC4DF870A1B2}">
+      <dsp:nvSpPr>
+        <dsp:cNvPr id="0" name=""/>
+        <dsp:cNvSpPr/>
+      </dsp:nvSpPr>
+      <dsp:spPr>
+        <a:xfrm rot="12775572">
+          <a:off x="2849949" y="3172585"/>
+          <a:ext cx="537118" cy="567526"/>
+        </a:xfrm>
+        <a:prstGeom prst="rightArrow">
+          <a:avLst>
+            <a:gd name="adj1" fmla="val 60000"/>
+            <a:gd name="adj2" fmla="val 50000"/>
+          </a:avLst>
+        </a:prstGeom>
+        <a:solidFill>
+          <a:schemeClr val="accent1">
+            <a:tint val="60000"/>
+            <a:hueOff val="0"/>
+            <a:satOff val="0"/>
+            <a:lumOff val="0"/>
+            <a:alphaOff val="0"/>
+          </a:schemeClr>
+        </a:solidFill>
+        <a:ln>
+          <a:noFill/>
+        </a:ln>
+        <a:effectLst/>
+      </dsp:spPr>
+      <dsp:style>
+        <a:lnRef idx="0">
+          <a:scrgbClr r="0" g="0" b="0"/>
+        </a:lnRef>
+        <a:fillRef idx="1">
+          <a:scrgbClr r="0" g="0" b="0"/>
+        </a:fillRef>
+        <a:effectRef idx="0">
+          <a:scrgbClr r="0" g="0" b="0"/>
+        </a:effectRef>
+        <a:fontRef idx="minor">
+          <a:schemeClr val="lt1"/>
+        </a:fontRef>
+      </dsp:style>
+      <dsp:txBody>
+        <a:bodyPr spcFirstLastPara="0" vert="horz" wrap="square" lIns="0" tIns="0" rIns="0" bIns="0" numCol="1" spcCol="1270" anchor="ctr" anchorCtr="0">
+          <a:noAutofit/>
+        </a:bodyPr>
+        <a:lstStyle/>
+        <a:p>
+          <a:pPr marL="0" lvl="0" indent="0" algn="ctr" defTabSz="400050">
+            <a:lnSpc>
+              <a:spcPct val="90000"/>
+            </a:lnSpc>
+            <a:spcBef>
+              <a:spcPct val="0"/>
+            </a:spcBef>
+            <a:spcAft>
+              <a:spcPct val="35000"/>
+            </a:spcAft>
+            <a:buNone/>
+          </a:pPr>
+          <a:endParaRPr lang="en-US" sz="900" kern="1200"/>
+        </a:p>
+      </dsp:txBody>
+      <dsp:txXfrm rot="10800000">
+        <a:off x="2998143" y="3329883"/>
+        <a:ext cx="375983" cy="340516"/>
+      </dsp:txXfrm>
+    </dsp:sp>
+    <dsp:sp modelId="{FC9AEC83-8A34-416E-ADB1-769965C1BE09}">
+      <dsp:nvSpPr>
+        <dsp:cNvPr id="0" name=""/>
+        <dsp:cNvSpPr/>
+      </dsp:nvSpPr>
+      <dsp:spPr>
+        <a:xfrm>
+          <a:off x="1133918" y="1874862"/>
+          <a:ext cx="1681561" cy="1681561"/>
+        </a:xfrm>
+        <a:prstGeom prst="ellipse">
+          <a:avLst/>
+        </a:prstGeom>
+        <a:solidFill>
+          <a:schemeClr val="bg2">
+            <a:lumMod val="60000"/>
+            <a:lumOff val="40000"/>
+          </a:schemeClr>
+        </a:solidFill>
+        <a:ln w="19050" cap="flat" cmpd="sng" algn="ctr">
+          <a:solidFill>
+            <a:schemeClr val="tx2">
+              <a:lumMod val="50000"/>
+            </a:schemeClr>
+          </a:solidFill>
+          <a:prstDash val="solid"/>
+          <a:miter lim="800000"/>
+        </a:ln>
+        <a:effectLst/>
+      </dsp:spPr>
+      <dsp:style>
+        <a:lnRef idx="2">
+          <a:scrgbClr r="0" g="0" b="0"/>
+        </a:lnRef>
+        <a:fillRef idx="1">
+          <a:scrgbClr r="0" g="0" b="0"/>
+        </a:fillRef>
+        <a:effectRef idx="0">
+          <a:scrgbClr r="0" g="0" b="0"/>
+        </a:effectRef>
+        <a:fontRef idx="minor">
+          <a:schemeClr val="lt1"/>
+        </a:fontRef>
+      </dsp:style>
+      <dsp:txBody>
+        <a:bodyPr spcFirstLastPara="0" vert="horz" wrap="square" lIns="13970" tIns="13970" rIns="13970" bIns="13970" numCol="1" spcCol="1270" anchor="ctr" anchorCtr="0">
+          <a:noAutofit/>
+        </a:bodyPr>
+        <a:lstStyle/>
+        <a:p>
+          <a:pPr marL="0" lvl="0" indent="0" algn="ctr" defTabSz="488950">
+            <a:lnSpc>
+              <a:spcPct val="90000"/>
+            </a:lnSpc>
+            <a:spcBef>
+              <a:spcPct val="0"/>
+            </a:spcBef>
+            <a:spcAft>
+              <a:spcPct val="35000"/>
+            </a:spcAft>
+            <a:buNone/>
+          </a:pPr>
+          <a:r>
+            <a:rPr lang="en-US" sz="1100" kern="1200" dirty="0">
+              <a:solidFill>
+                <a:schemeClr val="bg1">
+                  <a:lumMod val="95000"/>
+                </a:schemeClr>
+              </a:solidFill>
+            </a:rPr>
+            <a:t>The forecast of demand and renewable generations are updated.</a:t>
+          </a:r>
+        </a:p>
+      </dsp:txBody>
+      <dsp:txXfrm>
+        <a:off x="1380177" y="2121121"/>
+        <a:ext cx="1189043" cy="1189043"/>
+      </dsp:txXfrm>
+    </dsp:sp>
+    <dsp:sp modelId="{27F7F757-5639-4E8D-B7BC-438DB737CBD6}">
+      <dsp:nvSpPr>
+        <dsp:cNvPr id="0" name=""/>
+        <dsp:cNvSpPr/>
+      </dsp:nvSpPr>
+      <dsp:spPr>
+        <a:xfrm rot="19447732">
+          <a:off x="2783168" y="1656927"/>
+          <a:ext cx="526441" cy="567526"/>
+        </a:xfrm>
+        <a:prstGeom prst="rightArrow">
+          <a:avLst>
+            <a:gd name="adj1" fmla="val 60000"/>
+            <a:gd name="adj2" fmla="val 50000"/>
+          </a:avLst>
+        </a:prstGeom>
+        <a:solidFill>
+          <a:schemeClr val="accent1">
+            <a:tint val="60000"/>
+            <a:hueOff val="0"/>
+            <a:satOff val="0"/>
+            <a:lumOff val="0"/>
+            <a:alphaOff val="0"/>
+          </a:schemeClr>
+        </a:solidFill>
+        <a:ln>
+          <a:noFill/>
+        </a:ln>
+        <a:effectLst/>
+      </dsp:spPr>
+      <dsp:style>
+        <a:lnRef idx="0">
+          <a:scrgbClr r="0" g="0" b="0"/>
+        </a:lnRef>
+        <a:fillRef idx="1">
+          <a:scrgbClr r="0" g="0" b="0"/>
+        </a:fillRef>
+        <a:effectRef idx="0">
+          <a:scrgbClr r="0" g="0" b="0"/>
+        </a:effectRef>
+        <a:fontRef idx="minor">
+          <a:schemeClr val="lt1"/>
+        </a:fontRef>
+      </dsp:style>
+      <dsp:txBody>
+        <a:bodyPr spcFirstLastPara="0" vert="horz" wrap="square" lIns="0" tIns="0" rIns="0" bIns="0" numCol="1" spcCol="1270" anchor="ctr" anchorCtr="0">
+          <a:noAutofit/>
+        </a:bodyPr>
+        <a:lstStyle/>
+        <a:p>
+          <a:pPr marL="0" lvl="0" indent="0" algn="ctr" defTabSz="400050">
+            <a:lnSpc>
+              <a:spcPct val="90000"/>
+            </a:lnSpc>
+            <a:spcBef>
+              <a:spcPct val="0"/>
+            </a:spcBef>
+            <a:spcAft>
+              <a:spcPct val="35000"/>
+            </a:spcAft>
+            <a:buNone/>
+          </a:pPr>
+          <a:endParaRPr lang="en-US" sz="900" kern="1200"/>
+        </a:p>
+      </dsp:txBody>
+      <dsp:txXfrm>
+        <a:off x="2798145" y="1816703"/>
+        <a:ext cx="368509" cy="340516"/>
+      </dsp:txXfrm>
+    </dsp:sp>
+  </dsp:spTree>
+</dsp:drawing>
+</file>
+
+<file path=ppt/diagrams/layout1.xml><?xml version="1.0" encoding="utf-8"?>
+<dgm:layoutDef xmlns:dgm="http://schemas.openxmlformats.org/drawingml/2006/diagram" xmlns:a="http://schemas.openxmlformats.org/drawingml/2006/main" uniqueId="urn:microsoft.com/office/officeart/2005/8/layout/cycle2">
+  <dgm:title val=""/>
+  <dgm:desc val=""/>
+  <dgm:catLst>
+    <dgm:cat type="cycle" pri="1000"/>
+    <dgm:cat type="convert" pri="10000"/>
+  </dgm:catLst>
+  <dgm:sampData>
+    <dgm:dataModel>
+      <dgm:ptLst>
+        <dgm:pt modelId="0" type="doc"/>
+        <dgm:pt modelId="1">
+          <dgm:prSet phldr="1"/>
+        </dgm:pt>
+        <dgm:pt modelId="2">
+          <dgm:prSet phldr="1"/>
+        </dgm:pt>
+        <dgm:pt modelId="3">
+          <dgm:prSet phldr="1"/>
+        </dgm:pt>
+        <dgm:pt modelId="4">
+          <dgm:prSet phldr="1"/>
+        </dgm:pt>
+        <dgm:pt modelId="5">
+          <dgm:prSet phldr="1"/>
+        </dgm:pt>
+      </dgm:ptLst>
+      <dgm:cxnLst>
+        <dgm:cxn modelId="6" srcId="0" destId="1" srcOrd="0" destOrd="0"/>
+        <dgm:cxn modelId="7" srcId="0" destId="2" srcOrd="1" destOrd="0"/>
+        <dgm:cxn modelId="8" srcId="0" destId="3" srcOrd="2" destOrd="0"/>
+        <dgm:cxn modelId="9" srcId="0" destId="4" srcOrd="3" destOrd="0"/>
+        <dgm:cxn modelId="10" srcId="0" destId="5" srcOrd="4" destOrd="0"/>
+      </dgm:cxnLst>
+      <dgm:bg/>
+      <dgm:whole/>
+    </dgm:dataModel>
+  </dgm:sampData>
+  <dgm:styleData>
+    <dgm:dataModel>
+      <dgm:ptLst>
+        <dgm:pt modelId="0" type="doc"/>
+        <dgm:pt modelId="1"/>
+        <dgm:pt modelId="2"/>
+        <dgm:pt modelId="3"/>
+      </dgm:ptLst>
+      <dgm:cxnLst>
+        <dgm:cxn modelId="4" srcId="0" destId="1" srcOrd="0" destOrd="0"/>
+        <dgm:cxn modelId="5" srcId="0" destId="2" srcOrd="1" destOrd="0"/>
+        <dgm:cxn modelId="6" srcId="0" destId="3" srcOrd="2" destOrd="0"/>
+      </dgm:cxnLst>
+      <dgm:bg/>
+      <dgm:whole/>
+    </dgm:dataModel>
+  </dgm:styleData>
+  <dgm:clrData>
+    <dgm:dataModel>
+      <dgm:ptLst>
+        <dgm:pt modelId="0" type="doc"/>
+        <dgm:pt modelId="1"/>
+        <dgm:pt modelId="2"/>
+        <dgm:pt modelId="3"/>
+        <dgm:pt modelId="4"/>
+        <dgm:pt modelId="5"/>
+        <dgm:pt modelId="6"/>
+      </dgm:ptLst>
+      <dgm:cxnLst>
+        <dgm:cxn modelId="7" srcId="0" destId="1" srcOrd="0" destOrd="0"/>
+        <dgm:cxn modelId="8" srcId="0" destId="2" srcOrd="1" destOrd="0"/>
+        <dgm:cxn modelId="9" srcId="0" destId="3" srcOrd="2" destOrd="0"/>
+        <dgm:cxn modelId="10" srcId="0" destId="4" srcOrd="3" destOrd="0"/>
+        <dgm:cxn modelId="11" srcId="0" destId="5" srcOrd="4" destOrd="0"/>
+        <dgm:cxn modelId="12" srcId="0" destId="6" srcOrd="5" destOrd="0"/>
+      </dgm:cxnLst>
+      <dgm:bg/>
+      <dgm:whole/>
+    </dgm:dataModel>
+  </dgm:clrData>
+  <dgm:layoutNode name="cycle">
+    <dgm:varLst>
+      <dgm:dir/>
+      <dgm:resizeHandles val="exact"/>
+    </dgm:varLst>
+    <dgm:choose name="Name0">
+      <dgm:if name="Name1" func="var" arg="dir" op="equ" val="norm">
+        <dgm:choose name="Name2">
+          <dgm:if name="Name3" axis="ch" ptType="node" func="cnt" op="gt" val="2">
+            <dgm:alg type="cycle">
+              <dgm:param type="stAng" val="0"/>
+              <dgm:param type="spanAng" val="360"/>
+            </dgm:alg>
+          </dgm:if>
+          <dgm:else name="Name4">
+            <dgm:alg type="cycle">
+              <dgm:param type="stAng" val="-90"/>
+              <dgm:param type="spanAng" val="360"/>
+            </dgm:alg>
+          </dgm:else>
+        </dgm:choose>
+      </dgm:if>
+      <dgm:else name="Name5">
+        <dgm:choose name="Name6">
+          <dgm:if name="Name7" axis="ch" ptType="node" func="cnt" op="gt" val="2">
+            <dgm:alg type="cycle">
+              <dgm:param type="stAng" val="0"/>
+              <dgm:param type="spanAng" val="-360"/>
+            </dgm:alg>
+          </dgm:if>
+          <dgm:else name="Name8">
+            <dgm:alg type="cycle">
+              <dgm:param type="stAng" val="90"/>
+              <dgm:param type="spanAng" val="-360"/>
+            </dgm:alg>
+          </dgm:else>
+        </dgm:choose>
+      </dgm:else>
+    </dgm:choose>
+    <dgm:shape xmlns:r="http://schemas.openxmlformats.org/officeDocument/2006/relationships" r:blip="">
+      <dgm:adjLst/>
+    </dgm:shape>
+    <dgm:presOf/>
+    <dgm:constrLst>
+      <dgm:constr type="w" for="ch" ptType="node" refType="w"/>
+      <dgm:constr type="w" for="ch" ptType="sibTrans" refType="w" refFor="ch" refPtType="node" op="equ" fact="0.25"/>
+      <dgm:constr type="sibSp" refType="w" refFor="ch" refPtType="node" fact="0.5"/>
+      <dgm:constr type="primFontSz" for="ch" ptType="node" op="equ" val="65"/>
+      <dgm:constr type="primFontSz" for="des" forName="connectorText" op="equ" val="55"/>
+      <dgm:constr type="primFontSz" for="des" forName="connectorText" refType="primFontSz" refFor="ch" refPtType="node" op="lte" fact="0.8"/>
+    </dgm:constrLst>
+    <dgm:ruleLst/>
+    <dgm:forEach name="nodesForEach" axis="ch" ptType="node">
+      <dgm:layoutNode name="node">
+        <dgm:varLst>
+          <dgm:bulletEnabled val="1"/>
+        </dgm:varLst>
+        <dgm:alg type="tx">
+          <dgm:param type="txAnchorVertCh" val="mid"/>
+        </dgm:alg>
+        <dgm:shape xmlns:r="http://schemas.openxmlformats.org/officeDocument/2006/relationships" type="ellipse" r:blip="">
+          <dgm:adjLst/>
+        </dgm:shape>
+        <dgm:presOf axis="desOrSelf" ptType="node"/>
+        <dgm:constrLst>
+          <dgm:constr type="h" refType="w"/>
+          <dgm:constr type="lMarg" refType="primFontSz" fact="0.1"/>
+          <dgm:constr type="rMarg" refType="primFontSz" fact="0.1"/>
+          <dgm:constr type="tMarg" refType="primFontSz" fact="0.1"/>
+          <dgm:constr type="bMarg" refType="primFontSz" fact="0.1"/>
+        </dgm:constrLst>
+        <dgm:ruleLst>
+          <dgm:rule type="primFontSz" val="5" fact="NaN" max="NaN"/>
+        </dgm:ruleLst>
+      </dgm:layoutNode>
+      <dgm:choose name="Name9">
+        <dgm:if name="Name10" axis="par ch" ptType="doc node" func="cnt" op="gt" val="1">
+          <dgm:forEach name="sibTransForEach" axis="followSib" ptType="sibTrans" hideLastTrans="0" cnt="1">
+            <dgm:layoutNode name="sibTrans">
+              <dgm:choose name="Name11">
+                <dgm:if name="Name12" axis="par ch" ptType="doc node" func="cnt" op="lt" val="3">
+                  <dgm:alg type="conn">
+                    <dgm:param type="begPts" val="radial"/>
+                    <dgm:param type="endPts" val="radial"/>
+                  </dgm:alg>
+                </dgm:if>
+                <dgm:else name="Name13">
+                  <dgm:alg type="conn">
+                    <dgm:param type="begPts" val="auto"/>
+                    <dgm:param type="endPts" val="auto"/>
+                  </dgm:alg>
+                </dgm:else>
+              </dgm:choose>
+              <dgm:shape xmlns:r="http://schemas.openxmlformats.org/officeDocument/2006/relationships" type="conn" r:blip="">
+                <dgm:adjLst/>
+              </dgm:shape>
+              <dgm:presOf axis="self"/>
+              <dgm:constrLst>
+                <dgm:constr type="h" refType="w" fact="1.35"/>
+                <dgm:constr type="connDist"/>
+                <dgm:constr type="w" for="ch" refType="connDist" fact="0.45"/>
+                <dgm:constr type="h" for="ch" refType="h"/>
+              </dgm:constrLst>
+              <dgm:ruleLst/>
+              <dgm:layoutNode name="connectorText">
+                <dgm:alg type="tx">
+                  <dgm:param type="autoTxRot" val="grav"/>
+                </dgm:alg>
+                <dgm:shape xmlns:r="http://schemas.openxmlformats.org/officeDocument/2006/relationships" type="conn" r:blip="" hideGeom="1">
+                  <dgm:adjLst/>
+                </dgm:shape>
+                <dgm:presOf axis="self"/>
+                <dgm:constrLst>
+                  <dgm:constr type="lMarg"/>
+                  <dgm:constr type="rMarg"/>
+                  <dgm:constr type="tMarg"/>
+                  <dgm:constr type="bMarg"/>
+                </dgm:constrLst>
+                <dgm:ruleLst>
+                  <dgm:rule type="primFontSz" val="5" fact="NaN" max="NaN"/>
+                </dgm:ruleLst>
+              </dgm:layoutNode>
+            </dgm:layoutNode>
+          </dgm:forEach>
+        </dgm:if>
+        <dgm:else name="Name14"/>
+      </dgm:choose>
+    </dgm:forEach>
+  </dgm:layoutNode>
+</dgm:layoutDef>
+</file>
+
+<file path=ppt/diagrams/quickStyle1.xml><?xml version="1.0" encoding="utf-8"?>
+<dgm:styleDef xmlns:dgm="http://schemas.openxmlformats.org/drawingml/2006/diagram" xmlns:a="http://schemas.openxmlformats.org/drawingml/2006/main" uniqueId="urn:microsoft.com/office/officeart/2005/8/quickstyle/simple1">
+  <dgm:title val=""/>
+  <dgm:desc val=""/>
+  <dgm:catLst>
+    <dgm:cat type="simple" pri="10100"/>
+  </dgm:catLst>
+  <dgm:scene3d>
+    <a:camera prst="orthographicFront"/>
+    <a:lightRig rig="threePt" dir="t"/>
+  </dgm:scene3d>
+  <dgm:styleLbl name="node0">
+    <dgm:scene3d>
+      <a:camera prst="orthographicFront"/>
+      <a:lightRig rig="threePt" dir="t"/>
+    </dgm:scene3d>
+    <dgm:sp3d/>
+    <dgm:txPr/>
+    <dgm:style>
+      <a:lnRef idx="2">
+        <a:scrgbClr r="0" g="0" b="0"/>
+      </a:lnRef>
+      <a:fillRef idx="1">
+        <a:scrgbClr r="0" g="0" b="0"/>
+      </a:fillRef>
+      <a:effectRef idx="0">
+        <a:scrgbClr r="0" g="0" b="0"/>
+      </a:effectRef>
+      <a:fontRef idx="minor">
+        <a:schemeClr val="lt1"/>
+      </a:fontRef>
+    </dgm:style>
+  </dgm:styleLbl>
+  <dgm:styleLbl name="lnNode1">
+    <dgm:scene3d>
+      <a:camera prst="orthographicFront"/>
+      <a:lightRig rig="threePt" dir="t"/>
+    </dgm:scene3d>
+    <dgm:sp3d/>
+    <dgm:txPr/>
+    <dgm:style>
+      <a:lnRef idx="2">
+        <a:scrgbClr r="0" g="0" b="0"/>
+      </a:lnRef>
+      <a:fillRef idx="1">
+        <a:scrgbClr r="0" g="0" b="0"/>
+      </a:fillRef>
+      <a:effectRef idx="0">
+        <a:scrgbClr r="0" g="0" b="0"/>
+      </a:effectRef>
+      <a:fontRef idx="minor">
+        <a:schemeClr val="lt1"/>
+      </a:fontRef>
+    </dgm:style>
+  </dgm:styleLbl>
+  <dgm:styleLbl name="vennNode1">
+    <dgm:scene3d>
+      <a:camera prst="orthographicFront"/>
+      <a:lightRig rig="threePt" dir="t"/>
+    </dgm:scene3d>
+    <dgm:sp3d/>
+    <dgm:txPr/>
+    <dgm:style>
+      <a:lnRef idx="2">
+        <a:scrgbClr r="0" g="0" b="0"/>
+      </a:lnRef>
+      <a:fillRef idx="1">
+        <a:scrgbClr r="0" g="0" b="0"/>
+      </a:fillRef>
+      <a:effectRef idx="0">
+        <a:scrgbClr r="0" g="0" b="0"/>
+      </a:effectRef>
+      <a:fontRef idx="minor">
+        <a:schemeClr val="tx1"/>
+      </a:fontRef>
+    </dgm:style>
+  </dgm:styleLbl>
+  <dgm:styleLbl name="alignNode1">
+    <dgm:scene3d>
+      <a:camera prst="orthographicFront"/>
+      <a:lightRig rig="threePt" dir="t"/>
+    </dgm:scene3d>
+    <dgm:sp3d/>
+    <dgm:txPr/>
+    <dgm:style>
+      <a:lnRef idx="2">
+        <a:scrgbClr r="0" g="0" b="0"/>
+      </a:lnRef>
+      <a:fillRef idx="1">
+        <a:scrgbClr r="0" g="0" b="0"/>
+      </a:fillRef>
+      <a:effectRef idx="0">
+        <a:scrgbClr r="0" g="0" b="0"/>
+      </a:effectRef>
+      <a:fontRef idx="minor">
+        <a:schemeClr val="lt1"/>
+      </a:fontRef>
+    </dgm:style>
+  </dgm:styleLbl>
+  <dgm:styleLbl name="node1">
+    <dgm:scene3d>
+      <a:camera prst="orthographicFront"/>
+      <a:lightRig rig="threePt" dir="t"/>
+    </dgm:scene3d>
+    <dgm:sp3d/>
+    <dgm:txPr/>
+    <dgm:style>
+      <a:lnRef idx="2">
+        <a:scrgbClr r="0" g="0" b="0"/>
+      </a:lnRef>
+      <a:fillRef idx="1">
+        <a:scrgbClr r="0" g="0" b="0"/>
+      </a:fillRef>
+      <a:effectRef idx="0">
+        <a:scrgbClr r="0" g="0" b="0"/>
+      </a:effectRef>
+      <a:fontRef idx="minor">
+        <a:schemeClr val="lt1"/>
+      </a:fontRef>
+    </dgm:style>
+  </dgm:styleLbl>
+  <dgm:styleLbl name="node2">
+    <dgm:scene3d>
+      <a:camera prst="orthographicFront"/>
+      <a:lightRig rig="threePt" dir="t"/>
+    </dgm:scene3d>
+    <dgm:sp3d/>
+    <dgm:txPr/>
+    <dgm:style>
+      <a:lnRef idx="2">
+        <a:scrgbClr r="0" g="0" b="0"/>
+      </a:lnRef>
+      <a:fillRef idx="1">
+        <a:scrgbClr r="0" g="0" b="0"/>
+      </a:fillRef>
+      <a:effectRef idx="0">
+        <a:scrgbClr r="0" g="0" b="0"/>
+      </a:effectRef>
+      <a:fontRef idx="minor">
+        <a:schemeClr val="lt1"/>
+      </a:fontRef>
+    </dgm:style>
+  </dgm:styleLbl>
+  <dgm:styleLbl name="node3">
+    <dgm:scene3d>
+      <a:camera prst="orthographicFront"/>
+      <a:lightRig rig="threePt" dir="t"/>
+    </dgm:scene3d>
+    <dgm:sp3d/>
+    <dgm:txPr/>
+    <dgm:style>
+      <a:lnRef idx="2">
+        <a:scrgbClr r="0" g="0" b="0"/>
+      </a:lnRef>
+      <a:fillRef idx="1">
+        <a:scrgbClr r="0" g="0" b="0"/>
+      </a:fillRef>
+      <a:effectRef idx="0">
+        <a:scrgbClr r="0" g="0" b="0"/>
+      </a:effectRef>
+      <a:fontRef idx="minor">
+        <a:schemeClr val="lt1"/>
+      </a:fontRef>
+    </dgm:style>
+  </dgm:styleLbl>
+  <dgm:styleLbl name="node4">
+    <dgm:scene3d>
+      <a:camera prst="orthographicFront"/>
+      <a:lightRig rig="threePt" dir="t"/>
+    </dgm:scene3d>
+    <dgm:sp3d/>
+    <dgm:txPr/>
+    <dgm:style>
+      <a:lnRef idx="2">
+        <a:scrgbClr r="0" g="0" b="0"/>
+      </a:lnRef>
+      <a:fillRef idx="1">
+        <a:scrgbClr r="0" g="0" b="0"/>
+      </a:fillRef>
+      <a:effectRef idx="0">
+        <a:scrgbClr r="0" g="0" b="0"/>
+      </a:effectRef>
+      <a:fontRef idx="minor">
+        <a:schemeClr val="lt1"/>
+      </a:fontRef>
+    </dgm:style>
+  </dgm:styleLbl>
+  <dgm:styleLbl name="fgImgPlace1">
+    <dgm:scene3d>
+      <a:camera prst="orthographicFront"/>
+      <a:lightRig rig="threePt" dir="t"/>
+    </dgm:scene3d>
+    <dgm:sp3d/>
+    <dgm:txPr/>
+    <dgm:style>
+      <a:lnRef idx="2">
+        <a:scrgbClr r="0" g="0" b="0"/>
+      </a:lnRef>
+      <a:fillRef idx="1">
+        <a:scrgbClr r="0" g="0" b="0"/>
+      </a:fillRef>
+      <a:effectRef idx="0">
+        <a:scrgbClr r="0" g="0" b="0"/>
+      </a:effectRef>
+      <a:fontRef idx="minor"/>
+    </dgm:style>
+  </dgm:styleLbl>
+  <dgm:styleLbl name="alignImgPlace1">
+    <dgm:scene3d>
+      <a:camera prst="orthographicFront"/>
+      <a:lightRig rig="threePt" dir="t"/>
+    </dgm:scene3d>
+    <dgm:sp3d/>
+    <dgm:txPr/>
+    <dgm:style>
+      <a:lnRef idx="2">
+        <a:scrgbClr r="0" g="0" b="0"/>
+      </a:lnRef>
+      <a:fillRef idx="1">
+        <a:scrgbClr r="0" g="0" b="0"/>
+      </a:fillRef>
+      <a:effectRef idx="0">
+        <a:scrgbClr r="0" g="0" b="0"/>
+      </a:effectRef>
+      <a:fontRef idx="minor"/>
+    </dgm:style>
+  </dgm:styleLbl>
+  <dgm:styleLbl name="bgImgPlace1">
+    <dgm:scene3d>
+      <a:camera prst="orthographicFront"/>
+      <a:lightRig rig="threePt" dir="t"/>
+    </dgm:scene3d>
+    <dgm:sp3d/>
+    <dgm:txPr/>
+    <dgm:style>
+      <a:lnRef idx="2">
+        <a:scrgbClr r="0" g="0" b="0"/>
+      </a:lnRef>
+      <a:fillRef idx="1">
+        <a:scrgbClr r="0" g="0" b="0"/>
+      </a:fillRef>
+      <a:effectRef idx="0">
+        <a:scrgbClr r="0" g="0" b="0"/>
+      </a:effectRef>
+      <a:fontRef idx="minor"/>
+    </dgm:style>
+  </dgm:styleLbl>
+  <dgm:styleLbl name="sibTrans2D1">
+    <dgm:scene3d>
+      <a:camera prst="orthographicFront"/>
+      <a:lightRig rig="threePt" dir="t"/>
+    </dgm:scene3d>
+    <dgm:sp3d/>
+    <dgm:txPr/>
+    <dgm:style>
+      <a:lnRef idx="0">
+        <a:scrgbClr r="0" g="0" b="0"/>
+      </a:lnRef>
+      <a:fillRef idx="1">
+        <a:scrgbClr r="0" g="0" b="0"/>
+      </a:fillRef>
+      <a:effectRef idx="0">
+        <a:scrgbClr r="0" g="0" b="0"/>
+      </a:effectRef>
+      <a:fontRef idx="minor">
+        <a:schemeClr val="lt1"/>
+      </a:fontRef>
+    </dgm:style>
+  </dgm:styleLbl>
+  <dgm:styleLbl name="fgSibTrans2D1">
+    <dgm:scene3d>
+      <a:camera prst="orthographicFront"/>
+      <a:lightRig rig="threePt" dir="t"/>
+    </dgm:scene3d>
+    <dgm:sp3d/>
+    <dgm:txPr/>
+    <dgm:style>
+      <a:lnRef idx="0">
+        <a:scrgbClr r="0" g="0" b="0"/>
+      </a:lnRef>
+      <a:fillRef idx="1">
+        <a:scrgbClr r="0" g="0" b="0"/>
+      </a:fillRef>
+      <a:effectRef idx="0">
+        <a:scrgbClr r="0" g="0" b="0"/>
+      </a:effectRef>
+      <a:fontRef idx="minor">
+        <a:schemeClr val="lt1"/>
+      </a:fontRef>
+    </dgm:style>
+  </dgm:styleLbl>
+  <dgm:styleLbl name="bgSibTrans2D1">
+    <dgm:scene3d>
+      <a:camera prst="orthographicFront"/>
+      <a:lightRig rig="threePt" dir="t"/>
+    </dgm:scene3d>
+    <dgm:sp3d/>
+    <dgm:txPr/>
+    <dgm:style>
+      <a:lnRef idx="0">
+        <a:scrgbClr r="0" g="0" b="0"/>
+      </a:lnRef>
+      <a:fillRef idx="1">
+        <a:scrgbClr r="0" g="0" b="0"/>
+      </a:fillRef>
+      <a:effectRef idx="0">
+        <a:scrgbClr r="0" g="0" b="0"/>
+      </a:effectRef>
+      <a:fontRef idx="minor">
+        <a:schemeClr val="lt1"/>
+      </a:fontRef>
+    </dgm:style>
+  </dgm:styleLbl>
+  <dgm:styleLbl name="sibTrans1D1">
+    <dgm:scene3d>
+      <a:camera prst="orthographicFront"/>
+      <a:lightRig rig="threePt" dir="t"/>
+    </dgm:scene3d>
+    <dgm:sp3d/>
+    <dgm:txPr/>
+    <dgm:style>
+      <a:lnRef idx="1">
+        <a:scrgbClr r="0" g="0" b="0"/>
+      </a:lnRef>
+      <a:fillRef idx="0">
+        <a:scrgbClr r="0" g="0" b="0"/>
+      </a:fillRef>
+      <a:effectRef idx="0">
+        <a:scrgbClr r="0" g="0" b="0"/>
+      </a:effectRef>
+      <a:fontRef idx="minor"/>
+    </dgm:style>
+  </dgm:styleLbl>
+  <dgm:styleLbl name="callout">
+    <dgm:scene3d>
+      <a:camera prst="orthographicFront"/>
+      <a:lightRig rig="threePt" dir="t"/>
+    </dgm:scene3d>
+    <dgm:sp3d/>
+    <dgm:txPr/>
+    <dgm:style>
+      <a:lnRef idx="2">
+        <a:scrgbClr r="0" g="0" b="0"/>
+      </a:lnRef>
+      <a:fillRef idx="1">
+        <a:scrgbClr r="0" g="0" b="0"/>
+      </a:fillRef>
+      <a:effectRef idx="0">
+        <a:scrgbClr r="0" g="0" b="0"/>
+      </a:effectRef>
+      <a:fontRef idx="minor"/>
+    </dgm:style>
+  </dgm:styleLbl>
+  <dgm:styleLbl name="asst0">
+    <dgm:scene3d>
+      <a:camera prst="orthographicFront"/>
+      <a:lightRig rig="threePt" dir="t"/>
+    </dgm:scene3d>
+    <dgm:sp3d/>
+    <dgm:txPr/>
+    <dgm:style>
+      <a:lnRef idx="2">
+        <a:scrgbClr r="0" g="0" b="0"/>
+      </a:lnRef>
+      <a:fillRef idx="1">
+        <a:scrgbClr r="0" g="0" b="0"/>
+      </a:fillRef>
+      <a:effectRef idx="0">
+        <a:scrgbClr r="0" g="0" b="0"/>
+      </a:effectRef>
+      <a:fontRef idx="minor">
+        <a:schemeClr val="lt1"/>
+      </a:fontRef>
+    </dgm:style>
+  </dgm:styleLbl>
+  <dgm:styleLbl name="asst1">
+    <dgm:scene3d>
+      <a:camera prst="orthographicFront"/>
+      <a:lightRig rig="threePt" dir="t"/>
+    </dgm:scene3d>
+    <dgm:sp3d/>
+    <dgm:txPr/>
+    <dgm:style>
+      <a:lnRef idx="2">
+        <a:scrgbClr r="0" g="0" b="0"/>
+      </a:lnRef>
+      <a:fillRef idx="1">
+        <a:scrgbClr r="0" g="0" b="0"/>
+      </a:fillRef>
+      <a:effectRef idx="0">
+        <a:scrgbClr r="0" g="0" b="0"/>
+      </a:effectRef>
+      <a:fontRef idx="minor">
+        <a:schemeClr val="lt1"/>
+      </a:fontRef>
+    </dgm:style>
+  </dgm:styleLbl>
+  <dgm:styleLbl name="asst2">
+    <dgm:scene3d>
+      <a:camera prst="orthographicFront"/>
+      <a:lightRig rig="threePt" dir="t"/>
+    </dgm:scene3d>
+    <dgm:sp3d/>
+    <dgm:txPr/>
+    <dgm:style>
+      <a:lnRef idx="2">
+        <a:scrgbClr r="0" g="0" b="0"/>
+      </a:lnRef>
+      <a:fillRef idx="1">
+        <a:scrgbClr r="0" g="0" b="0"/>
+      </a:fillRef>
+      <a:effectRef idx="0">
+        <a:scrgbClr r="0" g="0" b="0"/>
+      </a:effectRef>
+      <a:fontRef idx="minor">
+        <a:schemeClr val="lt1"/>
+      </a:fontRef>
+    </dgm:style>
+  </dgm:styleLbl>
+  <dgm:styleLbl name="asst3">
+    <dgm:scene3d>
+      <a:camera prst="orthographicFront"/>
+      <a:lightRig rig="threePt" dir="t"/>
+    </dgm:scene3d>
+    <dgm:sp3d/>
+    <dgm:txPr/>
+    <dgm:style>
+      <a:lnRef idx="2">
+        <a:scrgbClr r="0" g="0" b="0"/>
+      </a:lnRef>
+      <a:fillRef idx="1">
+        <a:scrgbClr r="0" g="0" b="0"/>
+      </a:fillRef>
+      <a:effectRef idx="0">
+        <a:scrgbClr r="0" g="0" b="0"/>
+      </a:effectRef>
+      <a:fontRef idx="minor">
+        <a:schemeClr val="lt1"/>
+      </a:fontRef>
+    </dgm:style>
+  </dgm:styleLbl>
+  <dgm:styleLbl name="asst4">
+    <dgm:scene3d>
+      <a:camera prst="orthographicFront"/>
+      <a:lightRig rig="threePt" dir="t"/>
+    </dgm:scene3d>
+    <dgm:sp3d/>
+    <dgm:txPr/>
+    <dgm:style>
+      <a:lnRef idx="2">
+        <a:scrgbClr r="0" g="0" b="0"/>
+      </a:lnRef>
+      <a:fillRef idx="1">
+        <a:scrgbClr r="0" g="0" b="0"/>
+      </a:fillRef>
+      <a:effectRef idx="0">
+        <a:scrgbClr r="0" g="0" b="0"/>
+      </a:effectRef>
+      <a:fontRef idx="minor">
+        <a:schemeClr val="lt1"/>
+      </a:fontRef>
+    </dgm:style>
+  </dgm:styleLbl>
+  <dgm:styleLbl name="parChTrans2D1">
+    <dgm:scene3d>
+      <a:camera prst="orthographicFront"/>
+      <a:lightRig rig="threePt" dir="t"/>
+    </dgm:scene3d>
+    <dgm:sp3d/>
+    <dgm:txPr/>
+    <dgm:style>
+      <a:lnRef idx="2">
+        <a:scrgbClr r="0" g="0" b="0"/>
+      </a:lnRef>
+      <a:fillRef idx="1">
+        <a:scrgbClr r="0" g="0" b="0"/>
+      </a:fillRef>
+      <a:effectRef idx="0">
+        <a:scrgbClr r="0" g="0" b="0"/>
+      </a:effectRef>
+      <a:fontRef idx="minor">
+        <a:schemeClr val="lt1"/>
+      </a:fontRef>
+    </dgm:style>
+  </dgm:styleLbl>
+  <dgm:styleLbl name="parChTrans2D2">
+    <dgm:scene3d>
+      <a:camera prst="orthographicFront"/>
+      <a:lightRig rig="threePt" dir="t"/>
+    </dgm:scene3d>
+    <dgm:sp3d/>
+    <dgm:txPr/>
+    <dgm:style>
+      <a:lnRef idx="2">
+        <a:scrgbClr r="0" g="0" b="0"/>
+      </a:lnRef>
+      <a:fillRef idx="1">
+        <a:scrgbClr r="0" g="0" b="0"/>
+      </a:fillRef>
+      <a:effectRef idx="0">
+        <a:scrgbClr r="0" g="0" b="0"/>
+      </a:effectRef>
+      <a:fontRef idx="minor">
+        <a:schemeClr val="lt1"/>
+      </a:fontRef>
+    </dgm:style>
+  </dgm:styleLbl>
+  <dgm:styleLbl name="parChTrans2D3">
+    <dgm:scene3d>
+      <a:camera prst="orthographicFront"/>
+      <a:lightRig rig="threePt" dir="t"/>
+    </dgm:scene3d>
+    <dgm:sp3d/>
+    <dgm:txPr/>
+    <dgm:style>
+      <a:lnRef idx="2">
+        <a:scrgbClr r="0" g="0" b="0"/>
+      </a:lnRef>
+      <a:fillRef idx="1">
+        <a:scrgbClr r="0" g="0" b="0"/>
+      </a:fillRef>
+      <a:effectRef idx="0">
+        <a:scrgbClr r="0" g="0" b="0"/>
+      </a:effectRef>
+      <a:fontRef idx="minor">
+        <a:schemeClr val="lt1"/>
+      </a:fontRef>
+    </dgm:style>
+  </dgm:styleLbl>
+  <dgm:styleLbl name="parChTrans2D4">
+    <dgm:scene3d>
+      <a:camera prst="orthographicFront"/>
+      <a:lightRig rig="threePt" dir="t"/>
+    </dgm:scene3d>
+    <dgm:sp3d/>
+    <dgm:txPr/>
+    <dgm:style>
+      <a:lnRef idx="2">
+        <a:scrgbClr r="0" g="0" b="0"/>
+      </a:lnRef>
+      <a:fillRef idx="1">
+        <a:scrgbClr r="0" g="0" b="0"/>
+      </a:fillRef>
+      <a:effectRef idx="0">
+        <a:scrgbClr r="0" g="0" b="0"/>
+      </a:effectRef>
+      <a:fontRef idx="minor">
+        <a:schemeClr val="lt1"/>
+      </a:fontRef>
+    </dgm:style>
+  </dgm:styleLbl>
+  <dgm:styleLbl name="parChTrans1D1">
+    <dgm:scene3d>
+      <a:camera prst="orthographicFront"/>
+      <a:lightRig rig="threePt" dir="t"/>
+    </dgm:scene3d>
+    <dgm:sp3d/>
+    <dgm:txPr/>
+    <dgm:style>
+      <a:lnRef idx="2">
+        <a:scrgbClr r="0" g="0" b="0"/>
+      </a:lnRef>
+      <a:fillRef idx="0">
+        <a:scrgbClr r="0" g="0" b="0"/>
+      </a:fillRef>
+      <a:effectRef idx="0">
+        <a:scrgbClr r="0" g="0" b="0"/>
+      </a:effectRef>
+      <a:fontRef idx="minor"/>
+    </dgm:style>
+  </dgm:styleLbl>
+  <dgm:styleLbl name="parChTrans1D2">
+    <dgm:scene3d>
+      <a:camera prst="orthographicFront"/>
+      <a:lightRig rig="threePt" dir="t"/>
+    </dgm:scene3d>
+    <dgm:sp3d/>
+    <dgm:txPr/>
+    <dgm:style>
+      <a:lnRef idx="2">
+        <a:scrgbClr r="0" g="0" b="0"/>
+      </a:lnRef>
+      <a:fillRef idx="0">
+        <a:scrgbClr r="0" g="0" b="0"/>
+      </a:fillRef>
+      <a:effectRef idx="0">
+        <a:scrgbClr r="0" g="0" b="0"/>
+      </a:effectRef>
+      <a:fontRef idx="minor"/>
+    </dgm:style>
+  </dgm:styleLbl>
+  <dgm:styleLbl name="parChTrans1D3">
+    <dgm:scene3d>
+      <a:camera prst="orthographicFront"/>
+      <a:lightRig rig="threePt" dir="t"/>
+    </dgm:scene3d>
+    <dgm:sp3d/>
+    <dgm:txPr/>
+    <dgm:style>
+      <a:lnRef idx="2">
+        <a:scrgbClr r="0" g="0" b="0"/>
+      </a:lnRef>
+      <a:fillRef idx="0">
+        <a:scrgbClr r="0" g="0" b="0"/>
+      </a:fillRef>
+      <a:effectRef idx="0">
+        <a:scrgbClr r="0" g="0" b="0"/>
+      </a:effectRef>
+      <a:fontRef idx="minor"/>
+    </dgm:style>
+  </dgm:styleLbl>
+  <dgm:styleLbl name="parChTrans1D4">
+    <dgm:scene3d>
+      <a:camera prst="orthographicFront"/>
+      <a:lightRig rig="threePt" dir="t"/>
+    </dgm:scene3d>
+    <dgm:sp3d/>
+    <dgm:txPr/>
+    <dgm:style>
+      <a:lnRef idx="2">
+        <a:scrgbClr r="0" g="0" b="0"/>
+      </a:lnRef>
+      <a:fillRef idx="0">
+        <a:scrgbClr r="0" g="0" b="0"/>
+      </a:fillRef>
+      <a:effectRef idx="0">
+        <a:scrgbClr r="0" g="0" b="0"/>
+      </a:effectRef>
+      <a:fontRef idx="minor"/>
+    </dgm:style>
+  </dgm:styleLbl>
+  <dgm:styleLbl name="fgAcc1">
+    <dgm:scene3d>
+      <a:camera prst="orthographicFront"/>
+      <a:lightRig rig="threePt" dir="t"/>
+    </dgm:scene3d>
+    <dgm:sp3d/>
+    <dgm:txPr/>
+    <dgm:style>
+      <a:lnRef idx="2">
+        <a:scrgbClr r="0" g="0" b="0"/>
+      </a:lnRef>
+      <a:fillRef idx="1">
+        <a:scrgbClr r="0" g="0" b="0"/>
+      </a:fillRef>
+      <a:effectRef idx="0">
+        <a:scrgbClr r="0" g="0" b="0"/>
+      </a:effectRef>
+      <a:fontRef idx="minor"/>
+    </dgm:style>
+  </dgm:styleLbl>
+  <dgm:styleLbl name="conFgAcc1">
+    <dgm:scene3d>
+      <a:camera prst="orthographicFront"/>
+      <a:lightRig rig="threePt" dir="t"/>
+    </dgm:scene3d>
+    <dgm:sp3d/>
+    <dgm:txPr/>
+    <dgm:style>
+      <a:lnRef idx="2">
+        <a:scrgbClr r="0" g="0" b="0"/>
+      </a:lnRef>
+      <a:fillRef idx="1">
+        <a:scrgbClr r="0" g="0" b="0"/>
+      </a:fillRef>
+      <a:effectRef idx="0">
+        <a:scrgbClr r="0" g="0" b="0"/>
+      </a:effectRef>
+      <a:fontRef idx="minor"/>
+    </dgm:style>
+  </dgm:styleLbl>
+  <dgm:styleLbl name="alignAcc1">
+    <dgm:scene3d>
+      <a:camera prst="orthographicFront"/>
+      <a:lightRig rig="threePt" dir="t"/>
+    </dgm:scene3d>
+    <dgm:sp3d/>
+    <dgm:txPr/>
+    <dgm:style>
+      <a:lnRef idx="2">
+        <a:scrgbClr r="0" g="0" b="0"/>
+      </a:lnRef>
+      <a:fillRef idx="1">
+        <a:scrgbClr r="0" g="0" b="0"/>
+      </a:fillRef>
+      <a:effectRef idx="0">
+        <a:scrgbClr r="0" g="0" b="0"/>
+      </a:effectRef>
+      <a:fontRef idx="minor"/>
+    </dgm:style>
+  </dgm:styleLbl>
+  <dgm:styleLbl name="trAlignAcc1">
+    <dgm:scene3d>
+      <a:camera prst="orthographicFront"/>
+      <a:lightRig rig="threePt" dir="t"/>
+    </dgm:scene3d>
+    <dgm:sp3d/>
+    <dgm:txPr/>
+    <dgm:style>
+      <a:lnRef idx="1">
+        <a:scrgbClr r="0" g="0" b="0"/>
+      </a:lnRef>
+      <a:fillRef idx="1">
+        <a:scrgbClr r="0" g="0" b="0"/>
+      </a:fillRef>
+      <a:effectRef idx="0">
+        <a:scrgbClr r="0" g="0" b="0"/>
+      </a:effectRef>
+      <a:fontRef idx="minor"/>
+    </dgm:style>
+  </dgm:styleLbl>
+  <dgm:styleLbl name="bgAcc1">
+    <dgm:scene3d>
+      <a:camera prst="orthographicFront"/>
+      <a:lightRig rig="threePt" dir="t"/>
+    </dgm:scene3d>
+    <dgm:sp3d/>
+    <dgm:txPr/>
+    <dgm:style>
+      <a:lnRef idx="2">
+        <a:scrgbClr r="0" g="0" b="0"/>
+      </a:lnRef>
+      <a:fillRef idx="1">
+        <a:scrgbClr r="0" g="0" b="0"/>
+      </a:fillRef>
+      <a:effectRef idx="0">
+        <a:scrgbClr r="0" g="0" b="0"/>
+      </a:effectRef>
+      <a:fontRef idx="minor"/>
+    </dgm:style>
+  </dgm:styleLbl>
+  <dgm:styleLbl name="solidFgAcc1">
+    <dgm:scene3d>
+      <a:camera prst="orthographicFront"/>
+      <a:lightRig rig="threePt" dir="t"/>
+    </dgm:scene3d>
+    <dgm:sp3d/>
+    <dgm:txPr/>
+    <dgm:style>
+      <a:lnRef idx="2">
+        <a:scrgbClr r="0" g="0" b="0"/>
+      </a:lnRef>
+      <a:fillRef idx="1">
+        <a:scrgbClr r="0" g="0" b="0"/>
+      </a:fillRef>
+      <a:effectRef idx="0">
+        <a:scrgbClr r="0" g="0" b="0"/>
+      </a:effectRef>
+      <a:fontRef idx="minor"/>
+    </dgm:style>
+  </dgm:styleLbl>
+  <dgm:styleLbl name="solidAlignAcc1">
+    <dgm:scene3d>
+      <a:camera prst="orthographicFront"/>
+      <a:lightRig rig="threePt" dir="t"/>
+    </dgm:scene3d>
+    <dgm:sp3d/>
+    <dgm:txPr/>
+    <dgm:style>
+      <a:lnRef idx="2">
+        <a:scrgbClr r="0" g="0" b="0"/>
+      </a:lnRef>
+      <a:fillRef idx="1">
+        <a:scrgbClr r="0" g="0" b="0"/>
+      </a:fillRef>
+      <a:effectRef idx="0">
+        <a:scrgbClr r="0" g="0" b="0"/>
+      </a:effectRef>
+      <a:fontRef idx="minor"/>
+    </dgm:style>
+  </dgm:styleLbl>
+  <dgm:styleLbl name="solidBgAcc1">
+    <dgm:scene3d>
+      <a:camera prst="orthographicFront"/>
+      <a:lightRig rig="threePt" dir="t"/>
+    </dgm:scene3d>
+    <dgm:sp3d/>
+    <dgm:txPr/>
+    <dgm:style>
+      <a:lnRef idx="2">
+        <a:scrgbClr r="0" g="0" b="0"/>
+      </a:lnRef>
+      <a:fillRef idx="1">
+        <a:scrgbClr r="0" g="0" b="0"/>
+      </a:fillRef>
+      <a:effectRef idx="0">
+        <a:scrgbClr r="0" g="0" b="0"/>
+      </a:effectRef>
+      <a:fontRef idx="minor"/>
+    </dgm:style>
+  </dgm:styleLbl>
+  <dgm:styleLbl name="fgAccFollowNode1">
+    <dgm:scene3d>
+      <a:camera prst="orthographicFront"/>
+      <a:lightRig rig="threePt" dir="t"/>
+    </dgm:scene3d>
+    <dgm:sp3d/>
+    <dgm:txPr/>
+    <dgm:style>
+      <a:lnRef idx="2">
+        <a:scrgbClr r="0" g="0" b="0"/>
+      </a:lnRef>
+      <a:fillRef idx="1">
+        <a:scrgbClr r="0" g="0" b="0"/>
+      </a:fillRef>
+      <a:effectRef idx="0">
+        <a:scrgbClr r="0" g="0" b="0"/>
+      </a:effectRef>
+      <a:fontRef idx="minor"/>
+    </dgm:style>
+  </dgm:styleLbl>
+  <dgm:styleLbl name="alignAccFollowNode1">
+    <dgm:scene3d>
+      <a:camera prst="orthographicFront"/>
+      <a:lightRig rig="threePt" dir="t"/>
+    </dgm:scene3d>
+    <dgm:sp3d/>
+    <dgm:txPr/>
+    <dgm:style>
+      <a:lnRef idx="2">
+        <a:scrgbClr r="0" g="0" b="0"/>
+      </a:lnRef>
+      <a:fillRef idx="1">
+        <a:scrgbClr r="0" g="0" b="0"/>
+      </a:fillRef>
+      <a:effectRef idx="0">
+        <a:scrgbClr r="0" g="0" b="0"/>
+      </a:effectRef>
+      <a:fontRef idx="minor"/>
+    </dgm:style>
+  </dgm:styleLbl>
+  <dgm:styleLbl name="bgAccFollowNode1">
+    <dgm:scene3d>
+      <a:camera prst="orthographicFront"/>
+      <a:lightRig rig="threePt" dir="t"/>
+    </dgm:scene3d>
+    <dgm:sp3d/>
+    <dgm:txPr/>
+    <dgm:style>
+      <a:lnRef idx="2">
+        <a:scrgbClr r="0" g="0" b="0"/>
+      </a:lnRef>
+      <a:fillRef idx="1">
+        <a:scrgbClr r="0" g="0" b="0"/>
+      </a:fillRef>
+      <a:effectRef idx="0">
+        <a:scrgbClr r="0" g="0" b="0"/>
+      </a:effectRef>
+      <a:fontRef idx="minor"/>
+    </dgm:style>
+  </dgm:styleLbl>
+  <dgm:styleLbl name="fgAcc0">
+    <dgm:scene3d>
+      <a:camera prst="orthographicFront"/>
+      <a:lightRig rig="threePt" dir="t"/>
+    </dgm:scene3d>
+    <dgm:sp3d/>
+    <dgm:txPr/>
+    <dgm:style>
+      <a:lnRef idx="2">
+        <a:scrgbClr r="0" g="0" b="0"/>
+      </a:lnRef>
+      <a:fillRef idx="1">
+        <a:scrgbClr r="0" g="0" b="0"/>
+      </a:fillRef>
+      <a:effectRef idx="0">
+        <a:scrgbClr r="0" g="0" b="0"/>
+      </a:effectRef>
+      <a:fontRef idx="minor"/>
+    </dgm:style>
+  </dgm:styleLbl>
+  <dgm:styleLbl name="fgAcc2">
+    <dgm:scene3d>
+      <a:camera prst="orthographicFront"/>
+      <a:lightRig rig="threePt" dir="t"/>
+    </dgm:scene3d>
+    <dgm:sp3d/>
+    <dgm:txPr/>
+    <dgm:style>
+      <a:lnRef idx="2">
+        <a:scrgbClr r="0" g="0" b="0"/>
+      </a:lnRef>
+      <a:fillRef idx="1">
+        <a:scrgbClr r="0" g="0" b="0"/>
+      </a:fillRef>
+      <a:effectRef idx="0">
+        <a:scrgbClr r="0" g="0" b="0"/>
+      </a:effectRef>
+      <a:fontRef idx="minor"/>
+    </dgm:style>
+  </dgm:styleLbl>
+  <dgm:styleLbl name="fgAcc3">
+    <dgm:scene3d>
+      <a:camera prst="orthographicFront"/>
+      <a:lightRig rig="threePt" dir="t"/>
+    </dgm:scene3d>
+    <dgm:sp3d/>
+    <dgm:txPr/>
+    <dgm:style>
+      <a:lnRef idx="2">
+        <a:scrgbClr r="0" g="0" b="0"/>
+      </a:lnRef>
+      <a:fillRef idx="1">
+        <a:scrgbClr r="0" g="0" b="0"/>
+      </a:fillRef>
+      <a:effectRef idx="0">
+        <a:scrgbClr r="0" g="0" b="0"/>
+      </a:effectRef>
+      <a:fontRef idx="minor"/>
+    </dgm:style>
+  </dgm:styleLbl>
+  <dgm:styleLbl name="fgAcc4">
+    <dgm:scene3d>
+      <a:camera prst="orthographicFront"/>
+      <a:lightRig rig="threePt" dir="t"/>
+    </dgm:scene3d>
+    <dgm:sp3d/>
+    <dgm:txPr/>
+    <dgm:style>
+      <a:lnRef idx="2">
+        <a:scrgbClr r="0" g="0" b="0"/>
+      </a:lnRef>
+      <a:fillRef idx="1">
+        <a:scrgbClr r="0" g="0" b="0"/>
+      </a:fillRef>
+      <a:effectRef idx="0">
+        <a:scrgbClr r="0" g="0" b="0"/>
+      </a:effectRef>
+      <a:fontRef idx="minor"/>
+    </dgm:style>
+  </dgm:styleLbl>
+  <dgm:styleLbl name="bgShp">
+    <dgm:scene3d>
+      <a:camera prst="orthographicFront"/>
+      <a:lightRig rig="threePt" dir="t"/>
+    </dgm:scene3d>
+    <dgm:sp3d/>
+    <dgm:txPr/>
+    <dgm:style>
+      <a:lnRef idx="0">
+        <a:scrgbClr r="0" g="0" b="0"/>
+      </a:lnRef>
+      <a:fillRef idx="1">
+        <a:scrgbClr r="0" g="0" b="0"/>
+      </a:fillRef>
+      <a:effectRef idx="0">
+        <a:scrgbClr r="0" g="0" b="0"/>
+      </a:effectRef>
+      <a:fontRef idx="minor"/>
+    </dgm:style>
+  </dgm:styleLbl>
+  <dgm:styleLbl name="dkBgShp">
+    <dgm:scene3d>
+      <a:camera prst="orthographicFront"/>
+      <a:lightRig rig="threePt" dir="t"/>
+    </dgm:scene3d>
+    <dgm:sp3d/>
+    <dgm:txPr/>
+    <dgm:style>
+      <a:lnRef idx="0">
+        <a:scrgbClr r="0" g="0" b="0"/>
+      </a:lnRef>
+      <a:fillRef idx="1">
+        <a:scrgbClr r="0" g="0" b="0"/>
+      </a:fillRef>
+      <a:effectRef idx="0">
+        <a:scrgbClr r="0" g="0" b="0"/>
+      </a:effectRef>
+      <a:fontRef idx="minor"/>
+    </dgm:style>
+  </dgm:styleLbl>
+  <dgm:styleLbl name="trBgShp">
+    <dgm:scene3d>
+      <a:camera prst="orthographicFront"/>
+      <a:lightRig rig="threePt" dir="t"/>
+    </dgm:scene3d>
+    <dgm:sp3d/>
+    <dgm:txPr/>
+    <dgm:style>
+      <a:lnRef idx="0">
+        <a:scrgbClr r="0" g="0" b="0"/>
+      </a:lnRef>
+      <a:fillRef idx="1">
+        <a:scrgbClr r="0" g="0" b="0"/>
+      </a:fillRef>
+      <a:effectRef idx="0">
+        <a:scrgbClr r="0" g="0" b="0"/>
+      </a:effectRef>
+      <a:fontRef idx="minor"/>
+    </dgm:style>
+  </dgm:styleLbl>
+  <dgm:styleLbl name="fgShp">
+    <dgm:scene3d>
+      <a:camera prst="orthographicFront"/>
+      <a:lightRig rig="threePt" dir="t"/>
+    </dgm:scene3d>
+    <dgm:sp3d/>
+    <dgm:txPr/>
+    <dgm:style>
+      <a:lnRef idx="2">
+        <a:scrgbClr r="0" g="0" b="0"/>
+      </a:lnRef>
+      <a:fillRef idx="1">
+        <a:scrgbClr r="0" g="0" b="0"/>
+      </a:fillRef>
+      <a:effectRef idx="0">
+        <a:scrgbClr r="0" g="0" b="0"/>
+      </a:effectRef>
+      <a:fontRef idx="minor"/>
+    </dgm:style>
+  </dgm:styleLbl>
+  <dgm:styleLbl name="revTx">
+    <dgm:scene3d>
+      <a:camera prst="orthographicFront"/>
+      <a:lightRig rig="threePt" dir="t"/>
+    </dgm:scene3d>
+    <dgm:sp3d/>
+    <dgm:txPr/>
+    <dgm:style>
+      <a:lnRef idx="0">
+        <a:scrgbClr r="0" g="0" b="0"/>
+      </a:lnRef>
+      <a:fillRef idx="0">
+        <a:scrgbClr r="0" g="0" b="0"/>
+      </a:fillRef>
+      <a:effectRef idx="0">
+        <a:scrgbClr r="0" g="0" b="0"/>
+      </a:effectRef>
+      <a:fontRef idx="minor"/>
+    </dgm:style>
+  </dgm:styleLbl>
+</dgm:styleDef>
+</file>
+
 <file path=ppt/handoutMasters/handoutMaster1.xml><?xml version="1.0" encoding="utf-8"?>
 <p:handoutMaster xmlns:a="http://schemas.openxmlformats.org/drawingml/2006/main" xmlns:r="http://schemas.openxmlformats.org/officeDocument/2006/relationships" xmlns:p="http://schemas.openxmlformats.org/presentationml/2006/main">
   <p:cSld>
@@ -234,7 +3238,7 @@
           <a:p>
             <a:fld id="{D542D976-EE9F-4D81-93B4-309048736BC3}" type="datetimeFigureOut">
               <a:rPr lang="en-US" smtClean="0"/>
-              <a:t>5/29/2023</a:t>
+              <a:t>5/30/2023</a:t>
             </a:fld>
             <a:endParaRPr lang="en-US"/>
           </a:p>
@@ -411,7 +3415,7 @@
           <a:p>
             <a:fld id="{10CB9D09-B8C5-4B94-B5DC-AF4ED464E025}" type="datetimeFigureOut">
               <a:rPr lang="en-US" smtClean="0"/>
-              <a:t>5/29/2023</a:t>
+              <a:t>5/30/2023</a:t>
             </a:fld>
             <a:endParaRPr lang="en-US"/>
           </a:p>
@@ -6260,6 +9264,265 @@
 </p:sld>
 </file>
 
+<file path=ppt/slides/slide10.xml><?xml version="1.0" encoding="utf-8"?>
+<p:sld xmlns:a="http://schemas.openxmlformats.org/drawingml/2006/main" xmlns:r="http://schemas.openxmlformats.org/officeDocument/2006/relationships" xmlns:p="http://schemas.openxmlformats.org/presentationml/2006/main">
+  <p:cSld>
+    <p:spTree>
+      <p:nvGrpSpPr>
+        <p:cNvPr id="1" name=""/>
+        <p:cNvGrpSpPr/>
+        <p:nvPr/>
+      </p:nvGrpSpPr>
+      <p:grpSpPr>
+        <a:xfrm>
+          <a:off x="0" y="0"/>
+          <a:ext cx="0" cy="0"/>
+          <a:chOff x="0" y="0"/>
+          <a:chExt cx="0" cy="0"/>
+        </a:xfrm>
+      </p:grpSpPr>
+      <p:sp>
+        <p:nvSpPr>
+          <p:cNvPr id="2" name="Title 1">
+            <a:extLst>
+              <a:ext uri="{FF2B5EF4-FFF2-40B4-BE49-F238E27FC236}">
+                <a16:creationId xmlns:a16="http://schemas.microsoft.com/office/drawing/2014/main" id="{45DF1785-83CB-4F7A-820B-C600AC43B067}"/>
+              </a:ext>
+            </a:extLst>
+          </p:cNvPr>
+          <p:cNvSpPr>
+            <a:spLocks noGrp="1"/>
+          </p:cNvSpPr>
+          <p:nvPr>
+            <p:ph type="title"/>
+          </p:nvPr>
+        </p:nvSpPr>
+        <p:spPr>
+          <a:xfrm>
+            <a:off x="1064418" y="376654"/>
+            <a:ext cx="10063163" cy="1015584"/>
+          </a:xfrm>
+          <a:ln w="38100">
+            <a:solidFill>
+              <a:schemeClr val="bg2">
+                <a:lumMod val="40000"/>
+                <a:lumOff val="60000"/>
+              </a:schemeClr>
+            </a:solidFill>
+          </a:ln>
+        </p:spPr>
+        <p:txBody>
+          <a:bodyPr>
+            <a:normAutofit fontScale="90000"/>
+          </a:bodyPr>
+          <a:lstStyle/>
+          <a:p>
+            <a:r>
+              <a:rPr lang="en-US" b="0" dirty="0">
+                <a:latin typeface="Times New Roman" panose="02020603050405020304" pitchFamily="18" charset="0"/>
+                <a:cs typeface="Times New Roman" panose="02020603050405020304" pitchFamily="18" charset="0"/>
+              </a:rPr>
+              <a:t>Optimal Multi-Period Dispatch of Distributed Energy Resources in Unbalanced Distribution Feeders</a:t>
+            </a:r>
+          </a:p>
+        </p:txBody>
+      </p:sp>
+      <p:graphicFrame>
+        <p:nvGraphicFramePr>
+          <p:cNvPr id="4" name="Diagram 3">
+            <a:extLst>
+              <a:ext uri="{FF2B5EF4-FFF2-40B4-BE49-F238E27FC236}">
+                <a16:creationId xmlns:a16="http://schemas.microsoft.com/office/drawing/2014/main" id="{6E8D8754-8752-D118-4DFD-F18A5E6DEF52}"/>
+              </a:ext>
+            </a:extLst>
+          </p:cNvPr>
+          <p:cNvGraphicFramePr/>
+          <p:nvPr>
+            <p:extLst>
+              <p:ext uri="{D42A27DB-BD31-4B8C-83A1-F6EECF244321}">
+                <p14:modId xmlns:p14="http://schemas.microsoft.com/office/powerpoint/2010/main" val="601288163"/>
+              </p:ext>
+            </p:extLst>
+          </p:nvPr>
+        </p:nvGraphicFramePr>
+        <p:xfrm>
+          <a:off x="3242415" y="1486506"/>
+          <a:ext cx="8729626" cy="5253659"/>
+        </p:xfrm>
+        <a:graphic>
+          <a:graphicData uri="http://schemas.openxmlformats.org/drawingml/2006/diagram">
+            <dgm:relIds xmlns:dgm="http://schemas.openxmlformats.org/drawingml/2006/diagram" xmlns:r="http://schemas.openxmlformats.org/officeDocument/2006/relationships" r:dm="rId2" r:lo="rId3" r:qs="rId4" r:cs="rId5"/>
+          </a:graphicData>
+        </a:graphic>
+      </p:graphicFrame>
+      <p:sp>
+        <p:nvSpPr>
+          <p:cNvPr id="11" name="TextBox 10">
+            <a:extLst>
+              <a:ext uri="{FF2B5EF4-FFF2-40B4-BE49-F238E27FC236}">
+                <a16:creationId xmlns:a16="http://schemas.microsoft.com/office/drawing/2014/main" id="{7C9DD76A-A77D-5721-DDB8-8503776FF432}"/>
+              </a:ext>
+            </a:extLst>
+          </p:cNvPr>
+          <p:cNvSpPr txBox="1"/>
+          <p:nvPr/>
+        </p:nvSpPr>
+        <p:spPr>
+          <a:xfrm>
+            <a:off x="219959" y="1894790"/>
+            <a:ext cx="2640316" cy="523220"/>
+          </a:xfrm>
+          <a:prstGeom prst="rect">
+            <a:avLst/>
+          </a:prstGeom>
+          <a:noFill/>
+          <a:ln>
+            <a:solidFill>
+              <a:schemeClr val="bg2">
+                <a:lumMod val="40000"/>
+                <a:lumOff val="60000"/>
+              </a:schemeClr>
+            </a:solidFill>
+          </a:ln>
+        </p:spPr>
+        <p:txBody>
+          <a:bodyPr wrap="square" rtlCol="0">
+            <a:spAutoFit/>
+          </a:bodyPr>
+          <a:lstStyle/>
+          <a:p>
+            <a:r>
+              <a:rPr lang="en-US" sz="2800" dirty="0">
+                <a:solidFill>
+                  <a:schemeClr val="bg1"/>
+                </a:solidFill>
+              </a:rPr>
+              <a:t>The Process</a:t>
+            </a:r>
+          </a:p>
+        </p:txBody>
+      </p:sp>
+    </p:spTree>
+    <p:extLst>
+      <p:ext uri="{BB962C8B-B14F-4D97-AF65-F5344CB8AC3E}">
+        <p14:creationId xmlns:p14="http://schemas.microsoft.com/office/powerpoint/2010/main" val="4032008920"/>
+      </p:ext>
+    </p:extLst>
+  </p:cSld>
+  <p:clrMapOvr>
+    <a:masterClrMapping/>
+  </p:clrMapOvr>
+</p:sld>
+</file>
+
+<file path=ppt/slides/slide11.xml><?xml version="1.0" encoding="utf-8"?>
+<p:sld xmlns:a="http://schemas.openxmlformats.org/drawingml/2006/main" xmlns:r="http://schemas.openxmlformats.org/officeDocument/2006/relationships" xmlns:p="http://schemas.openxmlformats.org/presentationml/2006/main">
+  <p:cSld>
+    <p:spTree>
+      <p:nvGrpSpPr>
+        <p:cNvPr id="1" name=""/>
+        <p:cNvGrpSpPr/>
+        <p:nvPr/>
+      </p:nvGrpSpPr>
+      <p:grpSpPr>
+        <a:xfrm>
+          <a:off x="0" y="0"/>
+          <a:ext cx="0" cy="0"/>
+          <a:chOff x="0" y="0"/>
+          <a:chExt cx="0" cy="0"/>
+        </a:xfrm>
+      </p:grpSpPr>
+      <p:sp>
+        <p:nvSpPr>
+          <p:cNvPr id="2" name="Title 1">
+            <a:extLst>
+              <a:ext uri="{FF2B5EF4-FFF2-40B4-BE49-F238E27FC236}">
+                <a16:creationId xmlns:a16="http://schemas.microsoft.com/office/drawing/2014/main" id="{5F549704-23C4-B094-622E-8880D581DDB1}"/>
+              </a:ext>
+            </a:extLst>
+          </p:cNvPr>
+          <p:cNvSpPr>
+            <a:spLocks noGrp="1"/>
+          </p:cNvSpPr>
+          <p:nvPr>
+            <p:ph type="title"/>
+          </p:nvPr>
+        </p:nvSpPr>
+        <p:spPr/>
+        <p:txBody>
+          <a:bodyPr/>
+          <a:lstStyle/>
+          <a:p>
+            <a:r>
+              <a:rPr lang="en-IN" dirty="0"/>
+              <a:t>References</a:t>
+            </a:r>
+          </a:p>
+        </p:txBody>
+      </p:sp>
+      <p:sp>
+        <p:nvSpPr>
+          <p:cNvPr id="3" name="Content Placeholder 2">
+            <a:extLst>
+              <a:ext uri="{FF2B5EF4-FFF2-40B4-BE49-F238E27FC236}">
+                <a16:creationId xmlns:a16="http://schemas.microsoft.com/office/drawing/2014/main" id="{1E746B68-8B8A-22C0-9957-1D01E835E282}"/>
+              </a:ext>
+            </a:extLst>
+          </p:cNvPr>
+          <p:cNvSpPr>
+            <a:spLocks noGrp="1"/>
+          </p:cNvSpPr>
+          <p:nvPr>
+            <p:ph idx="1"/>
+          </p:nvPr>
+        </p:nvSpPr>
+        <p:spPr/>
+        <p:txBody>
+          <a:bodyPr/>
+          <a:lstStyle/>
+          <a:p>
+            <a:r>
+              <a:rPr lang="en-IN" dirty="0">
+                <a:hlinkClick r:id="rId2"/>
+              </a:rPr>
+              <a:t>[22]</a:t>
+            </a:r>
+            <a:r>
+              <a:rPr lang="en-IN" dirty="0"/>
+              <a:t> Nazir, N., &amp; </a:t>
+            </a:r>
+            <a:r>
+              <a:rPr lang="en-IN" dirty="0" err="1"/>
+              <a:t>Almassalkhi</a:t>
+            </a:r>
+            <a:r>
+              <a:rPr lang="en-IN" dirty="0"/>
+              <a:t>, M. (2018). Receding-Horizon Optimization of Unbalanced Distribution Systems with Time-Scale Separation for Discrete and Continuous Control Devices. 2018 Power Systems Computation Conference (PSCC). IEEE. </a:t>
+            </a:r>
+            <a:r>
+              <a:rPr lang="en-IN" dirty="0" err="1"/>
+              <a:t>doi</a:t>
+            </a:r>
+            <a:r>
+              <a:rPr lang="en-IN" dirty="0"/>
+              <a:t>: 10.23919/PSCC.2018.8442555</a:t>
+            </a:r>
+          </a:p>
+        </p:txBody>
+      </p:sp>
+    </p:spTree>
+    <p:extLst>
+      <p:ext uri="{BB962C8B-B14F-4D97-AF65-F5344CB8AC3E}">
+        <p14:creationId xmlns:p14="http://schemas.microsoft.com/office/powerpoint/2010/main" val="2023634528"/>
+      </p:ext>
+    </p:extLst>
+  </p:cSld>
+  <p:clrMapOvr>
+    <a:masterClrMapping/>
+  </p:clrMapOvr>
+</p:sld>
+</file>
+
 <file path=ppt/slides/slide2.xml><?xml version="1.0" encoding="utf-8"?>
 <p:sld xmlns:a="http://schemas.openxmlformats.org/drawingml/2006/main" xmlns:r="http://schemas.openxmlformats.org/officeDocument/2006/relationships" xmlns:p="http://schemas.openxmlformats.org/presentationml/2006/main">
   <p:cSld>
@@ -6714,7 +9977,18 @@
           <a:p>
             <a:r>
               <a:rPr lang="en-US" dirty="0"/>
-              <a:t>Conditions derived to ensure that batteries do NOT simultaneously charge and discharge.</a:t>
+              <a:t>Conditions derived to ensure that batteries do NOT simultaneously charge and discharge. </a:t>
+            </a:r>
+            <a:r>
+              <a:rPr lang="en-US" b="1" i="1" dirty="0">
+                <a:solidFill>
+                  <a:schemeClr val="accent1">
+                    <a:lumMod val="40000"/>
+                    <a:lumOff val="60000"/>
+                  </a:schemeClr>
+                </a:solidFill>
+              </a:rPr>
+              <a:t>(Is that a big problem?)</a:t>
             </a:r>
           </a:p>
           <a:p>
@@ -7171,7 +10445,19 @@
             </a:r>
             <a:r>
               <a:rPr lang="en-US" dirty="0">
-                <a:hlinkClick r:id="rId2" action="ppaction://hlinksldjump"/>
+                <a:solidFill>
+                  <a:schemeClr val="accent1">
+                    <a:lumMod val="40000"/>
+                    <a:lumOff val="60000"/>
+                  </a:schemeClr>
+                </a:solidFill>
+                <a:hlinkClick r:id="rId2" action="ppaction://hlinksldjump">
+                  <a:extLst>
+                    <a:ext uri="{A12FA001-AC4F-418D-AE19-62706E023703}">
+                      <ahyp:hlinkClr xmlns:ahyp="http://schemas.microsoft.com/office/drawing/2018/hyperlinkcolor" val="tx"/>
+                    </a:ext>
+                  </a:extLst>
+                </a:hlinkClick>
               </a:rPr>
               <a:t>[22] </a:t>
             </a:r>
@@ -7330,7 +10616,7 @@
             <a:r>
               <a:rPr lang="en-US" dirty="0">
                 <a:solidFill>
-                  <a:schemeClr val="bg2">
+                  <a:schemeClr val="accent1">
                     <a:lumMod val="40000"/>
                     <a:lumOff val="60000"/>
                   </a:schemeClr>
@@ -7356,7 +10642,7 @@
             <a:r>
               <a:rPr lang="en-US" dirty="0">
                 <a:solidFill>
-                  <a:schemeClr val="bg2">
+                  <a:schemeClr val="accent1">
                     <a:lumMod val="40000"/>
                     <a:lumOff val="60000"/>
                   </a:schemeClr>
@@ -7384,10 +10670,9 @@
               <a:t>GridLab</a:t>
             </a:r>
             <a:r>
-              <a:rPr lang="en-US"/>
+              <a:rPr lang="en-US" dirty="0"/>
               <a:t>-D.</a:t>
             </a:r>
-            <a:endParaRPr lang="en-US" dirty="0"/>
           </a:p>
           <a:p>
             <a:pPr marL="182880" lvl="1" indent="0">
@@ -7473,12 +10758,442 @@
           <a:chExt cx="0" cy="0"/>
         </a:xfrm>
       </p:grpSpPr>
+      <mc:AlternateContent xmlns:mc="http://schemas.openxmlformats.org/markup-compatibility/2006">
+        <mc:Choice xmlns:a14="http://schemas.microsoft.com/office/drawing/2010/main" Requires="a14">
+          <p:sp>
+            <p:nvSpPr>
+              <p:cNvPr id="3" name="Content Placeholder 2">
+                <a:extLst>
+                  <a:ext uri="{FF2B5EF4-FFF2-40B4-BE49-F238E27FC236}">
+                    <a16:creationId xmlns:a16="http://schemas.microsoft.com/office/drawing/2014/main" id="{64BE6767-30AA-41AB-8C0B-29F30741AF76}"/>
+                  </a:ext>
+                </a:extLst>
+              </p:cNvPr>
+              <p:cNvSpPr>
+                <a:spLocks noGrp="1"/>
+              </p:cNvSpPr>
+              <p:nvPr>
+                <p:ph idx="1"/>
+              </p:nvPr>
+            </p:nvSpPr>
+            <p:spPr>
+              <a:xfrm>
+                <a:off x="1077687" y="2248664"/>
+                <a:ext cx="7359303" cy="4286531"/>
+              </a:xfrm>
+              <a:ln>
+                <a:solidFill>
+                  <a:schemeClr val="bg2">
+                    <a:lumMod val="20000"/>
+                    <a:lumOff val="80000"/>
+                  </a:schemeClr>
+                </a:solidFill>
+              </a:ln>
+            </p:spPr>
+            <p:txBody>
+              <a:bodyPr>
+                <a:normAutofit/>
+              </a:bodyPr>
+              <a:lstStyle/>
+              <a:p>
+                <a:pPr marL="182880" lvl="1" indent="0">
+                  <a:buNone/>
+                </a:pPr>
+                <a:r>
+                  <a:rPr lang="en-US" sz="2800" dirty="0"/>
+                  <a:t>Case Study Description</a:t>
+                </a:r>
+              </a:p>
+              <a:p>
+                <a:pPr lvl="1"/>
+                <a:r>
+                  <a:rPr lang="en-US" dirty="0"/>
+                  <a:t>IEEE </a:t>
+                </a:r>
+                <a14:m>
+                  <m:oMath xmlns:m="http://schemas.openxmlformats.org/officeDocument/2006/math">
+                    <m:r>
+                      <a:rPr lang="en-US" i="1" dirty="0" smtClean="0">
+                        <a:latin typeface="Cambria Math" panose="02040503050406030204" pitchFamily="18" charset="0"/>
+                      </a:rPr>
+                      <m:t>123</m:t>
+                    </m:r>
+                  </m:oMath>
+                </a14:m>
+                <a:r>
+                  <a:rPr lang="en-US" dirty="0"/>
+                  <a:t>, Unbalanced, </a:t>
+                </a:r>
+                <a14:m>
+                  <m:oMath xmlns:m="http://schemas.openxmlformats.org/officeDocument/2006/math">
+                    <m:r>
+                      <a:rPr lang="en-US" b="0" i="1" smtClean="0">
+                        <a:latin typeface="Cambria Math" panose="02040503050406030204" pitchFamily="18" charset="0"/>
+                      </a:rPr>
+                      <m:t>𝑘</m:t>
+                    </m:r>
+                    <m:sSub>
+                      <m:sSubPr>
+                        <m:ctrlPr>
+                          <a:rPr lang="en-US" b="0" i="1" smtClean="0">
+                            <a:latin typeface="Cambria Math" panose="02040503050406030204" pitchFamily="18" charset="0"/>
+                          </a:rPr>
+                        </m:ctrlPr>
+                      </m:sSubPr>
+                      <m:e>
+                        <m:r>
+                          <a:rPr lang="en-US" b="0" i="1" smtClean="0">
+                            <a:latin typeface="Cambria Math" panose="02040503050406030204" pitchFamily="18" charset="0"/>
+                          </a:rPr>
+                          <m:t>𝑉</m:t>
+                        </m:r>
+                      </m:e>
+                      <m:sub>
+                        <m:r>
+                          <a:rPr lang="en-US" b="0" i="1" smtClean="0">
+                            <a:latin typeface="Cambria Math" panose="02040503050406030204" pitchFamily="18" charset="0"/>
+                          </a:rPr>
+                          <m:t>𝐵</m:t>
+                        </m:r>
+                      </m:sub>
+                    </m:sSub>
+                    <m:r>
+                      <a:rPr lang="en-US" b="0" i="1" smtClean="0">
+                        <a:latin typeface="Cambria Math" panose="02040503050406030204" pitchFamily="18" charset="0"/>
+                      </a:rPr>
+                      <m:t>=2.4, </m:t>
+                    </m:r>
+                    <m:r>
+                      <a:rPr lang="en-US" b="0" i="1" smtClean="0">
+                        <a:latin typeface="Cambria Math" panose="02040503050406030204" pitchFamily="18" charset="0"/>
+                      </a:rPr>
+                      <m:t>𝑀𝑉</m:t>
+                    </m:r>
+                    <m:sSub>
+                      <m:sSubPr>
+                        <m:ctrlPr>
+                          <a:rPr lang="en-US" b="0" i="1" smtClean="0">
+                            <a:latin typeface="Cambria Math" panose="02040503050406030204" pitchFamily="18" charset="0"/>
+                          </a:rPr>
+                        </m:ctrlPr>
+                      </m:sSubPr>
+                      <m:e>
+                        <m:r>
+                          <a:rPr lang="en-US" b="0" i="1" smtClean="0">
+                            <a:latin typeface="Cambria Math" panose="02040503050406030204" pitchFamily="18" charset="0"/>
+                          </a:rPr>
+                          <m:t>𝐴</m:t>
+                        </m:r>
+                      </m:e>
+                      <m:sub>
+                        <m:r>
+                          <a:rPr lang="en-US" b="0" i="1" smtClean="0">
+                            <a:latin typeface="Cambria Math" panose="02040503050406030204" pitchFamily="18" charset="0"/>
+                          </a:rPr>
+                          <m:t>𝐵</m:t>
+                        </m:r>
+                      </m:sub>
+                    </m:sSub>
+                    <m:r>
+                      <a:rPr lang="en-US" b="0" i="1" smtClean="0">
+                        <a:latin typeface="Cambria Math" panose="02040503050406030204" pitchFamily="18" charset="0"/>
+                      </a:rPr>
+                      <m:t>=1</m:t>
+                    </m:r>
+                  </m:oMath>
+                </a14:m>
+                <a:endParaRPr lang="en-US" b="0" dirty="0"/>
+              </a:p>
+              <a:p>
+                <a:pPr lvl="1"/>
+                <a:endParaRPr lang="en-US" dirty="0"/>
+              </a:p>
+              <a:p>
+                <a:pPr lvl="1"/>
+                <a:r>
+                  <a:rPr lang="en-US" dirty="0"/>
+                  <a:t>Algorithm implemented in </a:t>
+                </a:r>
+                <a:r>
+                  <a:rPr lang="en-US" i="1" dirty="0"/>
+                  <a:t>Receding-Horizon </a:t>
+                </a:r>
+                <a:r>
+                  <a:rPr lang="en-US" dirty="0"/>
+                  <a:t>fashion.</a:t>
+                </a:r>
+              </a:p>
+              <a:p>
+                <a:pPr lvl="1"/>
+                <a:endParaRPr lang="en-US" dirty="0"/>
+              </a:p>
+              <a:p>
+                <a:pPr lvl="1"/>
+                <a:r>
+                  <a:rPr lang="en-US" i="1" dirty="0"/>
+                  <a:t>Receding-Horizon </a:t>
+                </a:r>
+                <a:r>
+                  <a:rPr lang="en-US" dirty="0"/>
+                  <a:t>means a rolling window where predictions for the next </a:t>
+                </a:r>
+                <a14:m>
+                  <m:oMath xmlns:m="http://schemas.openxmlformats.org/officeDocument/2006/math">
+                    <m:r>
+                      <a:rPr lang="en-US" b="0" i="1" smtClean="0">
+                        <a:latin typeface="Cambria Math" panose="02040503050406030204" pitchFamily="18" charset="0"/>
+                      </a:rPr>
+                      <m:t>𝑇</m:t>
+                    </m:r>
+                  </m:oMath>
+                </a14:m>
+                <a:r>
+                  <a:rPr lang="en-US" dirty="0"/>
+                  <a:t> time-steps from time </a:t>
+                </a:r>
+                <a14:m>
+                  <m:oMath xmlns:m="http://schemas.openxmlformats.org/officeDocument/2006/math">
+                    <m:r>
+                      <a:rPr lang="en-US" b="0" i="1" smtClean="0">
+                        <a:latin typeface="Cambria Math" panose="02040503050406030204" pitchFamily="18" charset="0"/>
+                      </a:rPr>
+                      <m:t>𝑡</m:t>
+                    </m:r>
+                    <m:r>
+                      <a:rPr lang="en-US" b="0" i="1" smtClean="0">
+                        <a:latin typeface="Cambria Math" panose="02040503050406030204" pitchFamily="18" charset="0"/>
+                      </a:rPr>
+                      <m:t>+1  </m:t>
+                    </m:r>
+                  </m:oMath>
+                </a14:m>
+                <a:r>
+                  <a:rPr lang="en-US" dirty="0"/>
+                  <a:t>to </a:t>
+                </a:r>
+                <a14:m>
+                  <m:oMath xmlns:m="http://schemas.openxmlformats.org/officeDocument/2006/math">
+                    <m:r>
+                      <a:rPr lang="en-US" b="0" i="1" smtClean="0">
+                        <a:latin typeface="Cambria Math" panose="02040503050406030204" pitchFamily="18" charset="0"/>
+                      </a:rPr>
+                      <m:t>𝑡</m:t>
+                    </m:r>
+                    <m:r>
+                      <a:rPr lang="en-US" b="0" i="1" smtClean="0">
+                        <a:latin typeface="Cambria Math" panose="02040503050406030204" pitchFamily="18" charset="0"/>
+                      </a:rPr>
+                      <m:t>+</m:t>
+                    </m:r>
+                    <m:r>
+                      <a:rPr lang="en-US" b="0" i="1" smtClean="0">
+                        <a:latin typeface="Cambria Math" panose="02040503050406030204" pitchFamily="18" charset="0"/>
+                      </a:rPr>
+                      <m:t>𝑇</m:t>
+                    </m:r>
+                    <m:r>
+                      <a:rPr lang="en-US" b="0" i="0" smtClean="0">
+                        <a:latin typeface="Cambria Math" panose="02040503050406030204" pitchFamily="18" charset="0"/>
+                      </a:rPr>
+                      <m:t> </m:t>
+                    </m:r>
+                  </m:oMath>
+                </a14:m>
+                <a:r>
+                  <a:rPr lang="en-US" dirty="0"/>
+                  <a:t>are made at time </a:t>
+                </a:r>
+                <a14:m>
+                  <m:oMath xmlns:m="http://schemas.openxmlformats.org/officeDocument/2006/math">
+                    <m:r>
+                      <a:rPr lang="en-US" b="0" i="1" smtClean="0">
+                        <a:latin typeface="Cambria Math" panose="02040503050406030204" pitchFamily="18" charset="0"/>
+                      </a:rPr>
+                      <m:t>𝑡</m:t>
+                    </m:r>
+                    <m:r>
+                      <a:rPr lang="en-US" b="0" i="0" smtClean="0">
+                        <a:latin typeface="Cambria Math" panose="02040503050406030204" pitchFamily="18" charset="0"/>
+                      </a:rPr>
+                      <m:t>, </m:t>
+                    </m:r>
+                  </m:oMath>
+                </a14:m>
+                <a:r>
+                  <a:rPr lang="en-US" dirty="0"/>
+                  <a:t>and since predictions are updated at every time step, for the next time step </a:t>
+                </a:r>
+                <a14:m>
+                  <m:oMath xmlns:m="http://schemas.openxmlformats.org/officeDocument/2006/math">
+                    <m:r>
+                      <a:rPr lang="en-US" b="0" i="1" smtClean="0">
+                        <a:latin typeface="Cambria Math" panose="02040503050406030204" pitchFamily="18" charset="0"/>
+                      </a:rPr>
+                      <m:t>𝑡</m:t>
+                    </m:r>
+                    <m:r>
+                      <a:rPr lang="en-US" b="0" i="1" smtClean="0">
+                        <a:latin typeface="Cambria Math" panose="02040503050406030204" pitchFamily="18" charset="0"/>
+                      </a:rPr>
+                      <m:t>+1</m:t>
+                    </m:r>
+                  </m:oMath>
+                </a14:m>
+                <a:r>
+                  <a:rPr lang="en-US" dirty="0"/>
+                  <a:t> , predictions for the next </a:t>
+                </a:r>
+                <a14:m>
+                  <m:oMath xmlns:m="http://schemas.openxmlformats.org/officeDocument/2006/math">
+                    <m:r>
+                      <a:rPr lang="en-US" b="0" i="1" smtClean="0">
+                        <a:latin typeface="Cambria Math" panose="02040503050406030204" pitchFamily="18" charset="0"/>
+                      </a:rPr>
+                      <m:t>𝑇</m:t>
+                    </m:r>
+                  </m:oMath>
+                </a14:m>
+                <a:r>
+                  <a:rPr lang="en-US" dirty="0"/>
+                  <a:t> time steps from  </a:t>
+                </a:r>
+                <a14:m>
+                  <m:oMath xmlns:m="http://schemas.openxmlformats.org/officeDocument/2006/math">
+                    <m:r>
+                      <a:rPr lang="en-US" b="0" i="1" smtClean="0">
+                        <a:latin typeface="Cambria Math" panose="02040503050406030204" pitchFamily="18" charset="0"/>
+                      </a:rPr>
+                      <m:t>𝑡</m:t>
+                    </m:r>
+                    <m:r>
+                      <a:rPr lang="en-US" b="0" i="1" smtClean="0">
+                        <a:latin typeface="Cambria Math" panose="02040503050406030204" pitchFamily="18" charset="0"/>
+                      </a:rPr>
+                      <m:t>+2 </m:t>
+                    </m:r>
+                  </m:oMath>
+                </a14:m>
+                <a:r>
+                  <a:rPr lang="en-US" dirty="0"/>
+                  <a:t>to </a:t>
+                </a:r>
+                <a14:m>
+                  <m:oMath xmlns:m="http://schemas.openxmlformats.org/officeDocument/2006/math">
+                    <m:r>
+                      <a:rPr lang="en-US" b="0" i="1" smtClean="0">
+                        <a:latin typeface="Cambria Math" panose="02040503050406030204" pitchFamily="18" charset="0"/>
+                      </a:rPr>
+                      <m:t>𝑡</m:t>
+                    </m:r>
+                    <m:r>
+                      <a:rPr lang="en-US" b="0" i="1" smtClean="0">
+                        <a:latin typeface="Cambria Math" panose="02040503050406030204" pitchFamily="18" charset="0"/>
+                      </a:rPr>
+                      <m:t>+</m:t>
+                    </m:r>
+                    <m:r>
+                      <a:rPr lang="en-US" b="0" i="1" smtClean="0">
+                        <a:latin typeface="Cambria Math" panose="02040503050406030204" pitchFamily="18" charset="0"/>
+                      </a:rPr>
+                      <m:t>𝑇</m:t>
+                    </m:r>
+                    <m:r>
+                      <a:rPr lang="en-US" b="0" i="0" smtClean="0">
+                        <a:latin typeface="Cambria Math" panose="02040503050406030204" pitchFamily="18" charset="0"/>
+                      </a:rPr>
+                      <m:t>+1</m:t>
+                    </m:r>
+                  </m:oMath>
+                </a14:m>
+                <a:r>
+                  <a:rPr lang="en-US" dirty="0"/>
+                  <a:t> are once again made.</a:t>
+                </a:r>
+              </a:p>
+              <a:p>
+                <a:pPr lvl="1"/>
+                <a:r>
+                  <a:rPr lang="en-US" dirty="0"/>
+                  <a:t>The cycle goes on.</a:t>
+                </a:r>
+              </a:p>
+              <a:p>
+                <a:pPr lvl="1"/>
+                <a:endParaRPr lang="en-US" dirty="0"/>
+              </a:p>
+              <a:p>
+                <a:pPr marL="182880" lvl="1" indent="0">
+                  <a:buNone/>
+                </a:pPr>
+                <a:endParaRPr lang="en-US" dirty="0"/>
+              </a:p>
+              <a:p>
+                <a:pPr marL="182880" lvl="1" indent="0">
+                  <a:buNone/>
+                </a:pPr>
+                <a:endParaRPr lang="en-US" dirty="0"/>
+              </a:p>
+            </p:txBody>
+          </p:sp>
+        </mc:Choice>
+        <mc:Fallback>
+          <p:sp>
+            <p:nvSpPr>
+              <p:cNvPr id="3" name="Content Placeholder 2">
+                <a:extLst>
+                  <a:ext uri="{FF2B5EF4-FFF2-40B4-BE49-F238E27FC236}">
+                    <a16:creationId xmlns:a16="http://schemas.microsoft.com/office/drawing/2014/main" id="{64BE6767-30AA-41AB-8C0B-29F30741AF76}"/>
+                  </a:ext>
+                </a:extLst>
+              </p:cNvPr>
+              <p:cNvSpPr>
+                <a:spLocks noGrp="1" noRot="1" noChangeAspect="1" noMove="1" noResize="1" noEditPoints="1" noAdjustHandles="1" noChangeArrowheads="1" noChangeShapeType="1" noTextEdit="1"/>
+              </p:cNvSpPr>
+              <p:nvPr>
+                <p:ph idx="1"/>
+              </p:nvPr>
+            </p:nvSpPr>
+            <p:spPr>
+              <a:xfrm>
+                <a:off x="1077687" y="2248664"/>
+                <a:ext cx="7359303" cy="4286531"/>
+              </a:xfrm>
+              <a:blipFill>
+                <a:blip r:embed="rId2"/>
+                <a:stretch>
+                  <a:fillRect l="-414" t="-3262" r="-1902"/>
+                </a:stretch>
+              </a:blipFill>
+              <a:ln>
+                <a:solidFill>
+                  <a:schemeClr val="bg2">
+                    <a:lumMod val="20000"/>
+                    <a:lumOff val="80000"/>
+                  </a:schemeClr>
+                </a:solidFill>
+              </a:ln>
+            </p:spPr>
+            <p:txBody>
+              <a:bodyPr/>
+              <a:lstStyle/>
+              <a:p>
+                <a:r>
+                  <a:rPr lang="en-US">
+                    <a:noFill/>
+                  </a:rPr>
+                  <a:t> </a:t>
+                </a:r>
+              </a:p>
+            </p:txBody>
+          </p:sp>
+        </mc:Fallback>
+      </mc:AlternateContent>
       <p:sp>
         <p:nvSpPr>
           <p:cNvPr id="2" name="Title 1">
             <a:extLst>
               <a:ext uri="{FF2B5EF4-FFF2-40B4-BE49-F238E27FC236}">
-                <a16:creationId xmlns:a16="http://schemas.microsoft.com/office/drawing/2014/main" id="{5F549704-23C4-B094-622E-8880D581DDB1}"/>
+                <a16:creationId xmlns:a16="http://schemas.microsoft.com/office/drawing/2014/main" id="{45DF1785-83CB-4F7A-820B-C600AC43B067}"/>
               </a:ext>
             </a:extLst>
           </p:cNvPr>
@@ -7489,72 +11204,238 @@
             <p:ph type="title"/>
           </p:nvPr>
         </p:nvSpPr>
-        <p:spPr/>
+        <p:spPr>
+          <a:xfrm>
+            <a:off x="1064418" y="376654"/>
+            <a:ext cx="10063163" cy="1015584"/>
+          </a:xfrm>
+          <a:ln w="38100">
+            <a:solidFill>
+              <a:schemeClr val="bg2">
+                <a:lumMod val="40000"/>
+                <a:lumOff val="60000"/>
+              </a:schemeClr>
+            </a:solidFill>
+          </a:ln>
+        </p:spPr>
         <p:txBody>
-          <a:bodyPr/>
+          <a:bodyPr>
+            <a:normAutofit fontScale="90000"/>
+          </a:bodyPr>
           <a:lstStyle/>
           <a:p>
             <a:r>
-              <a:rPr lang="en-IN" dirty="0"/>
-              <a:t>References</a:t>
+              <a:rPr lang="en-US" b="0" dirty="0">
+                <a:latin typeface="Times New Roman" panose="02020603050405020304" pitchFamily="18" charset="0"/>
+                <a:cs typeface="Times New Roman" panose="02020603050405020304" pitchFamily="18" charset="0"/>
+              </a:rPr>
+              <a:t>Optimal Multi-Period Dispatch of Distributed Energy Resources in Unbalanced Distribution Feeders</a:t>
             </a:r>
           </a:p>
         </p:txBody>
       </p:sp>
-      <p:sp>
-        <p:nvSpPr>
-          <p:cNvPr id="3" name="Content Placeholder 2">
+      <p:grpSp>
+        <p:nvGrpSpPr>
+          <p:cNvPr id="8" name="Group 7">
             <a:extLst>
               <a:ext uri="{FF2B5EF4-FFF2-40B4-BE49-F238E27FC236}">
-                <a16:creationId xmlns:a16="http://schemas.microsoft.com/office/drawing/2014/main" id="{1E746B68-8B8A-22C0-9957-1D01E835E282}"/>
+                <a16:creationId xmlns:a16="http://schemas.microsoft.com/office/drawing/2014/main" id="{020B6DA4-6AFC-3029-20D5-7902E391DECE}"/>
               </a:ext>
             </a:extLst>
           </p:cNvPr>
-          <p:cNvSpPr>
-            <a:spLocks noGrp="1"/>
-          </p:cNvSpPr>
-          <p:nvPr>
-            <p:ph idx="1"/>
-          </p:nvPr>
-        </p:nvSpPr>
-        <p:spPr/>
-        <p:txBody>
-          <a:bodyPr/>
-          <a:lstStyle/>
-          <a:p>
-            <a:r>
-              <a:rPr lang="en-IN" dirty="0">
-                <a:hlinkClick r:id="rId2"/>
-              </a:rPr>
-              <a:t>[22]</a:t>
-            </a:r>
-            <a:r>
-              <a:rPr lang="en-IN" dirty="0"/>
-              <a:t> Nazir, N., &amp; </a:t>
-            </a:r>
-            <a:r>
-              <a:rPr lang="en-IN" dirty="0" err="1"/>
-              <a:t>Almassalkhi</a:t>
-            </a:r>
-            <a:r>
-              <a:rPr lang="en-IN" dirty="0"/>
-              <a:t>, M. (2018). Receding-Horizon Optimization of Unbalanced Distribution Systems with Time-Scale Separation for Discrete and Continuous Control Devices. 2018 Power Systems Computation Conference (PSCC). IEEE. </a:t>
-            </a:r>
-            <a:r>
-              <a:rPr lang="en-IN" dirty="0" err="1"/>
-              <a:t>doi</a:t>
-            </a:r>
-            <a:r>
-              <a:rPr lang="en-IN" dirty="0"/>
-              <a:t>: 10.23919/PSCC.2018.8442555</a:t>
-            </a:r>
-          </a:p>
-        </p:txBody>
-      </p:sp>
+          <p:cNvGrpSpPr/>
+          <p:nvPr/>
+        </p:nvGrpSpPr>
+        <p:grpSpPr>
+          <a:xfrm>
+            <a:off x="8644378" y="1690935"/>
+            <a:ext cx="3007151" cy="3448837"/>
+            <a:chOff x="8474695" y="1719215"/>
+            <a:chExt cx="3007151" cy="3448837"/>
+          </a:xfrm>
+        </p:grpSpPr>
+        <p:pic>
+          <p:nvPicPr>
+            <p:cNvPr id="6" name="Picture 5">
+              <a:extLst>
+                <a:ext uri="{FF2B5EF4-FFF2-40B4-BE49-F238E27FC236}">
+                  <a16:creationId xmlns:a16="http://schemas.microsoft.com/office/drawing/2014/main" id="{CDF98BC0-135B-680B-30F4-9C66C6A56AAB}"/>
+                </a:ext>
+              </a:extLst>
+            </p:cNvPr>
+            <p:cNvPicPr>
+              <a:picLocks noChangeAspect="1"/>
+            </p:cNvPicPr>
+            <p:nvPr/>
+          </p:nvPicPr>
+          <p:blipFill>
+            <a:blip r:embed="rId3"/>
+            <a:stretch>
+              <a:fillRect/>
+            </a:stretch>
+          </p:blipFill>
+          <p:spPr>
+            <a:xfrm>
+              <a:off x="8474695" y="1719215"/>
+              <a:ext cx="3007151" cy="2248508"/>
+            </a:xfrm>
+            <a:prstGeom prst="rect">
+              <a:avLst/>
+            </a:prstGeom>
+            <a:ln>
+              <a:solidFill>
+                <a:schemeClr val="bg2">
+                  <a:lumMod val="40000"/>
+                  <a:lumOff val="60000"/>
+                </a:schemeClr>
+              </a:solidFill>
+            </a:ln>
+          </p:spPr>
+        </p:pic>
+        <mc:AlternateContent xmlns:mc="http://schemas.openxmlformats.org/markup-compatibility/2006">
+          <mc:Choice xmlns:a14="http://schemas.microsoft.com/office/drawing/2010/main" Requires="a14">
+            <p:sp>
+              <p:nvSpPr>
+                <p:cNvPr id="7" name="TextBox 6">
+                  <a:extLst>
+                    <a:ext uri="{FF2B5EF4-FFF2-40B4-BE49-F238E27FC236}">
+                      <a16:creationId xmlns:a16="http://schemas.microsoft.com/office/drawing/2014/main" id="{EC862050-EC9B-19B8-02AD-F7435391C1EB}"/>
+                    </a:ext>
+                  </a:extLst>
+                </p:cNvPr>
+                <p:cNvSpPr txBox="1"/>
+                <p:nvPr/>
+              </p:nvSpPr>
+              <p:spPr>
+                <a:xfrm>
+                  <a:off x="8540681" y="3967723"/>
+                  <a:ext cx="2875177" cy="1200329"/>
+                </a:xfrm>
+                <a:prstGeom prst="rect">
+                  <a:avLst/>
+                </a:prstGeom>
+                <a:noFill/>
+                <a:ln>
+                  <a:solidFill>
+                    <a:schemeClr val="bg2">
+                      <a:lumMod val="40000"/>
+                      <a:lumOff val="60000"/>
+                    </a:schemeClr>
+                  </a:solidFill>
+                </a:ln>
+              </p:spPr>
+              <p:txBody>
+                <a:bodyPr wrap="square" rtlCol="0">
+                  <a:spAutoFit/>
+                </a:bodyPr>
+                <a:lstStyle/>
+                <a:p>
+                  <a:r>
+                    <a:rPr lang="en-US" dirty="0">
+                      <a:solidFill>
+                        <a:schemeClr val="bg1"/>
+                      </a:solidFill>
+                    </a:rPr>
+                    <a:t>Fig. Aggregate solar, demand and net-demand profile over a prediction horizon of </a:t>
+                  </a:r>
+                  <a14:m>
+                    <m:oMath xmlns:m="http://schemas.openxmlformats.org/officeDocument/2006/math">
+                      <m:r>
+                        <a:rPr lang="en-US" b="0" i="1" smtClean="0">
+                          <a:solidFill>
+                            <a:schemeClr val="bg1"/>
+                          </a:solidFill>
+                          <a:latin typeface="Cambria Math" panose="02040503050406030204" pitchFamily="18" charset="0"/>
+                        </a:rPr>
+                        <m:t>60 </m:t>
+                      </m:r>
+                      <m:r>
+                        <a:rPr lang="en-US" b="0" i="1" smtClean="0">
+                          <a:solidFill>
+                            <a:schemeClr val="bg1"/>
+                          </a:solidFill>
+                          <a:latin typeface="Cambria Math" panose="02040503050406030204" pitchFamily="18" charset="0"/>
+                        </a:rPr>
+                        <m:t>𝑚𝑖𝑛𝑢𝑡𝑒𝑠</m:t>
+                      </m:r>
+                      <m:r>
+                        <a:rPr lang="en-US" b="0" i="1" smtClean="0">
+                          <a:solidFill>
+                            <a:schemeClr val="bg1"/>
+                          </a:solidFill>
+                          <a:latin typeface="Cambria Math" panose="02040503050406030204" pitchFamily="18" charset="0"/>
+                        </a:rPr>
+                        <m:t>.</m:t>
+                      </m:r>
+                    </m:oMath>
+                  </a14:m>
+                  <a:endParaRPr lang="en-US" dirty="0">
+                    <a:solidFill>
+                      <a:schemeClr val="bg1"/>
+                    </a:solidFill>
+                  </a:endParaRPr>
+                </a:p>
+              </p:txBody>
+            </p:sp>
+          </mc:Choice>
+          <mc:Fallback>
+            <p:sp>
+              <p:nvSpPr>
+                <p:cNvPr id="7" name="TextBox 6">
+                  <a:extLst>
+                    <a:ext uri="{FF2B5EF4-FFF2-40B4-BE49-F238E27FC236}">
+                      <a16:creationId xmlns:a16="http://schemas.microsoft.com/office/drawing/2014/main" id="{EC862050-EC9B-19B8-02AD-F7435391C1EB}"/>
+                    </a:ext>
+                  </a:extLst>
+                </p:cNvPr>
+                <p:cNvSpPr txBox="1">
+                  <a:spLocks noRot="1" noChangeAspect="1" noMove="1" noResize="1" noEditPoints="1" noAdjustHandles="1" noChangeArrowheads="1" noChangeShapeType="1" noTextEdit="1"/>
+                </p:cNvSpPr>
+                <p:nvPr/>
+              </p:nvSpPr>
+              <p:spPr>
+                <a:xfrm>
+                  <a:off x="8540681" y="3967723"/>
+                  <a:ext cx="2875177" cy="1200329"/>
+                </a:xfrm>
+                <a:prstGeom prst="rect">
+                  <a:avLst/>
+                </a:prstGeom>
+                <a:blipFill>
+                  <a:blip r:embed="rId4"/>
+                  <a:stretch>
+                    <a:fillRect l="-1688" t="-2010" b="-6533"/>
+                  </a:stretch>
+                </a:blipFill>
+                <a:ln>
+                  <a:solidFill>
+                    <a:schemeClr val="bg2">
+                      <a:lumMod val="40000"/>
+                      <a:lumOff val="60000"/>
+                    </a:schemeClr>
+                  </a:solidFill>
+                </a:ln>
+              </p:spPr>
+              <p:txBody>
+                <a:bodyPr/>
+                <a:lstStyle/>
+                <a:p>
+                  <a:r>
+                    <a:rPr lang="en-US">
+                      <a:noFill/>
+                    </a:rPr>
+                    <a:t> </a:t>
+                  </a:r>
+                </a:p>
+              </p:txBody>
+            </p:sp>
+          </mc:Fallback>
+        </mc:AlternateContent>
+      </p:grpSp>
     </p:spTree>
     <p:extLst>
       <p:ext uri="{BB962C8B-B14F-4D97-AF65-F5344CB8AC3E}">
-        <p14:creationId xmlns:p14="http://schemas.microsoft.com/office/powerpoint/2010/main" val="2023634528"/>
+        <p14:creationId xmlns:p14="http://schemas.microsoft.com/office/powerpoint/2010/main" val="2516270243"/>
       </p:ext>
     </p:extLst>
   </p:cSld>

</xml_diff>

<commit_message>
process flowchart popped out better
</commit_message>
<xml_diff>
--- a/research_showcase/multiPeriodOptimization_aryan_ritwajeet_jha.pptx
+++ b/research_showcase/multiPeriodOptimization_aryan_ritwajeet_jha.pptx
@@ -904,7 +904,7 @@
       </dgm:t>
     </dgm:pt>
     <dgm:pt modelId="{B0C45C90-45F1-4B34-8E45-E20C6AEA344C}">
-      <dgm:prSet phldrT="[Text]"/>
+      <dgm:prSet phldrT="[Text]" custT="1"/>
       <dgm:spPr>
         <a:solidFill>
           <a:schemeClr val="bg2">
@@ -925,7 +925,7 @@
         <a:lstStyle/>
         <a:p>
           <a:r>
-            <a:rPr lang="en-US" dirty="0">
+            <a:rPr lang="en-US" sz="1800" dirty="0">
               <a:solidFill>
                 <a:schemeClr val="bg1">
                   <a:lumMod val="95000"/>
@@ -960,7 +960,7 @@
       </dgm:t>
     </dgm:pt>
     <dgm:pt modelId="{343CADBF-4DDC-4ED2-8368-6BE57FBC7B38}">
-      <dgm:prSet phldrT="[Text]"/>
+      <dgm:prSet phldrT="[Text]" custT="1"/>
       <dgm:spPr>
         <a:solidFill>
           <a:schemeClr val="bg2">
@@ -981,7 +981,7 @@
         <a:lstStyle/>
         <a:p>
           <a:r>
-            <a:rPr lang="en-US" dirty="0">
+            <a:rPr lang="en-US" sz="1800" dirty="0">
               <a:solidFill>
                 <a:schemeClr val="bg1">
                   <a:lumMod val="95000"/>
@@ -1016,7 +1016,7 @@
       </dgm:t>
     </dgm:pt>
     <dgm:pt modelId="{62EEB961-7EE2-43E7-9E10-CE6AEBA2D905}">
-      <dgm:prSet phldrT="[Text]"/>
+      <dgm:prSet phldrT="[Text]" custT="1"/>
       <dgm:spPr>
         <a:solidFill>
           <a:schemeClr val="bg2">
@@ -1037,7 +1037,7 @@
         <a:lstStyle/>
         <a:p>
           <a:r>
-            <a:rPr lang="en-US" dirty="0">
+            <a:rPr lang="en-US" sz="1800" dirty="0">
               <a:solidFill>
                 <a:schemeClr val="bg1">
                   <a:lumMod val="95000"/>
@@ -1047,7 +1047,7 @@
             <a:t>The physically realizable schedule is implemented by </a:t>
           </a:r>
           <a:r>
-            <a:rPr lang="en-US" dirty="0" err="1">
+            <a:rPr lang="en-US" sz="1800" dirty="0" err="1">
               <a:solidFill>
                 <a:schemeClr val="bg1">
                   <a:lumMod val="95000"/>
@@ -1057,7 +1057,7 @@
             <a:t>GridLab</a:t>
           </a:r>
           <a:r>
-            <a:rPr lang="en-US" dirty="0">
+            <a:rPr lang="en-US" sz="1800" dirty="0">
               <a:solidFill>
                 <a:schemeClr val="bg1">
                   <a:lumMod val="95000"/>
@@ -1092,7 +1092,7 @@
       </dgm:t>
     </dgm:pt>
     <dgm:pt modelId="{A070EE7E-2EC8-43B7-A174-54F76DC9A5C1}">
-      <dgm:prSet phldrT="[Text]"/>
+      <dgm:prSet phldrT="[Text]" custT="1"/>
       <dgm:spPr>
         <a:solidFill>
           <a:schemeClr val="bg2">
@@ -1113,7 +1113,7 @@
         <a:lstStyle/>
         <a:p>
           <a:r>
-            <a:rPr lang="en-US" dirty="0">
+            <a:rPr lang="en-US" sz="1800" dirty="0">
               <a:solidFill>
                 <a:schemeClr val="bg1">
                   <a:lumMod val="95000"/>
@@ -1157,7 +1157,7 @@
       <dgm:spPr/>
     </dgm:pt>
     <dgm:pt modelId="{96FE773E-0D0D-4853-8FC2-C585534B9FA7}" type="pres">
-      <dgm:prSet presAssocID="{B0C45C90-45F1-4B34-8E45-E20C6AEA344C}" presName="node" presStyleLbl="node1" presStyleIdx="0" presStyleCnt="4" custRadScaleRad="83752" custRadScaleInc="-19025">
+      <dgm:prSet presAssocID="{B0C45C90-45F1-4B34-8E45-E20C6AEA344C}" presName="node" presStyleLbl="node1" presStyleIdx="0" presStyleCnt="4" custScaleX="179629" custScaleY="130127" custRadScaleRad="76950" custRadScaleInc="564">
         <dgm:presLayoutVars>
           <dgm:bulletEnabled val="1"/>
         </dgm:presLayoutVars>
@@ -1173,7 +1173,7 @@
       <dgm:spPr/>
     </dgm:pt>
     <dgm:pt modelId="{EBEB4AB3-D801-4615-973A-A003B350B7F7}" type="pres">
-      <dgm:prSet presAssocID="{343CADBF-4DDC-4ED2-8368-6BE57FBC7B38}" presName="node" presStyleLbl="node1" presStyleIdx="1" presStyleCnt="4" custRadScaleRad="121610" custRadScaleInc="12786">
+      <dgm:prSet presAssocID="{343CADBF-4DDC-4ED2-8368-6BE57FBC7B38}" presName="node" presStyleLbl="node1" presStyleIdx="1" presStyleCnt="4" custScaleX="167833" custScaleY="118552" custRadScaleRad="223985" custRadScaleInc="-350">
         <dgm:presLayoutVars>
           <dgm:bulletEnabled val="1"/>
         </dgm:presLayoutVars>
@@ -1189,7 +1189,7 @@
       <dgm:spPr/>
     </dgm:pt>
     <dgm:pt modelId="{4BAE3030-6163-4BB0-A9FC-4D12F88EF28E}" type="pres">
-      <dgm:prSet presAssocID="{62EEB961-7EE2-43E7-9E10-CE6AEBA2D905}" presName="node" presStyleLbl="node1" presStyleIdx="2" presStyleCnt="4" custRadScaleRad="87323" custRadScaleInc="10467">
+      <dgm:prSet presAssocID="{62EEB961-7EE2-43E7-9E10-CE6AEBA2D905}" presName="node" presStyleLbl="node1" presStyleIdx="2" presStyleCnt="4" custScaleX="195230" custScaleY="131298" custRadScaleRad="75881" custRadScaleInc="-4984">
         <dgm:presLayoutVars>
           <dgm:bulletEnabled val="1"/>
         </dgm:presLayoutVars>
@@ -1205,7 +1205,7 @@
       <dgm:spPr/>
     </dgm:pt>
     <dgm:pt modelId="{FC9AEC83-8A34-416E-ADB1-769965C1BE09}" type="pres">
-      <dgm:prSet presAssocID="{A070EE7E-2EC8-43B7-A174-54F76DC9A5C1}" presName="node" presStyleLbl="node1" presStyleIdx="3" presStyleCnt="4" custRadScaleRad="133971" custRadScaleInc="-4729">
+      <dgm:prSet presAssocID="{A070EE7E-2EC8-43B7-A174-54F76DC9A5C1}" presName="node" presStyleLbl="node1" presStyleIdx="3" presStyleCnt="4" custScaleX="138522" custScaleY="106295" custRadScaleRad="226725" custRadScaleInc="-306">
         <dgm:presLayoutVars>
           <dgm:bulletEnabled val="1"/>
         </dgm:presLayoutVars>
@@ -1286,8 +1286,8 @@
       </dsp:nvSpPr>
       <dsp:spPr>
         <a:xfrm>
-          <a:off x="3301445" y="307498"/>
-          <a:ext cx="1681561" cy="1681561"/>
+          <a:off x="4057675" y="153584"/>
+          <a:ext cx="3022210" cy="2189352"/>
         </a:xfrm>
         <a:prstGeom prst="ellipse">
           <a:avLst/>
@@ -1324,12 +1324,12 @@
         </a:fontRef>
       </dsp:style>
       <dsp:txBody>
-        <a:bodyPr spcFirstLastPara="0" vert="horz" wrap="square" lIns="13970" tIns="13970" rIns="13970" bIns="13970" numCol="1" spcCol="1270" anchor="ctr" anchorCtr="0">
+        <a:bodyPr spcFirstLastPara="0" vert="horz" wrap="square" lIns="22860" tIns="22860" rIns="22860" bIns="22860" numCol="1" spcCol="1270" anchor="ctr" anchorCtr="0">
           <a:noAutofit/>
         </a:bodyPr>
         <a:lstStyle/>
         <a:p>
-          <a:pPr marL="0" lvl="0" indent="0" algn="ctr" defTabSz="488950">
+          <a:pPr marL="0" lvl="0" indent="0" algn="ctr" defTabSz="800100">
             <a:lnSpc>
               <a:spcPct val="90000"/>
             </a:lnSpc>
@@ -1342,7 +1342,7 @@
             <a:buNone/>
           </a:pPr>
           <a:r>
-            <a:rPr lang="en-US" sz="1100" kern="1200" dirty="0">
+            <a:rPr lang="en-US" sz="1800" kern="1200" dirty="0">
               <a:solidFill>
                 <a:schemeClr val="bg1">
                   <a:lumMod val="95000"/>
@@ -1354,8 +1354,8 @@
         </a:p>
       </dsp:txBody>
       <dsp:txXfrm>
-        <a:off x="3547704" y="553757"/>
-        <a:ext cx="1189043" cy="1189043"/>
+        <a:off x="4500267" y="474207"/>
+        <a:ext cx="2137026" cy="1548106"/>
       </dsp:txXfrm>
     </dsp:sp>
     <dsp:sp modelId="{F4F227FC-327F-4CAD-9C83-044C14E76999}">
@@ -1364,9 +1364,9 @@
         <dsp:cNvSpPr/>
       </dsp:nvSpPr>
       <dsp:spPr>
-        <a:xfrm rot="2126765">
-          <a:off x="4988938" y="1701803"/>
-          <a:ext cx="658924" cy="567526"/>
+        <a:xfrm rot="1130743">
+          <a:off x="7213331" y="1655073"/>
+          <a:ext cx="758326" cy="567834"/>
         </a:xfrm>
         <a:prstGeom prst="rightArrow">
           <a:avLst>
@@ -1408,7 +1408,7 @@
         </a:bodyPr>
         <a:lstStyle/>
         <a:p>
-          <a:pPr marL="0" lvl="0" indent="0" algn="ctr" defTabSz="400050">
+          <a:pPr marL="0" lvl="0" indent="0" algn="ctr" defTabSz="1066800">
             <a:lnSpc>
               <a:spcPct val="90000"/>
             </a:lnSpc>
@@ -1420,12 +1420,12 @@
             </a:spcAft>
             <a:buNone/>
           </a:pPr>
-          <a:endParaRPr lang="en-US" sz="900" kern="1200"/>
+          <a:endParaRPr lang="en-US" sz="2400" kern="1200"/>
         </a:p>
       </dsp:txBody>
       <dsp:txXfrm>
-        <a:off x="5004716" y="1765939"/>
-        <a:ext cx="488666" cy="340516"/>
+        <a:off x="7217897" y="1741127"/>
+        <a:ext cx="587976" cy="340700"/>
       </dsp:txXfrm>
     </dsp:sp>
     <dsp:sp modelId="{EBEB4AB3-D801-4615-973A-A003B350B7F7}">
@@ -1435,8 +1435,8 @@
       </dsp:nvSpPr>
       <dsp:spPr>
         <a:xfrm>
-          <a:off x="5684179" y="2003705"/>
-          <a:ext cx="1681561" cy="1681561"/>
+          <a:off x="8149229" y="1613609"/>
+          <a:ext cx="2823745" cy="1994605"/>
         </a:xfrm>
         <a:prstGeom prst="ellipse">
           <a:avLst/>
@@ -1473,12 +1473,12 @@
         </a:fontRef>
       </dsp:style>
       <dsp:txBody>
-        <a:bodyPr spcFirstLastPara="0" vert="horz" wrap="square" lIns="13970" tIns="13970" rIns="13970" bIns="13970" numCol="1" spcCol="1270" anchor="ctr" anchorCtr="0">
+        <a:bodyPr spcFirstLastPara="0" vert="horz" wrap="square" lIns="22860" tIns="22860" rIns="22860" bIns="22860" numCol="1" spcCol="1270" anchor="ctr" anchorCtr="0">
           <a:noAutofit/>
         </a:bodyPr>
         <a:lstStyle/>
         <a:p>
-          <a:pPr marL="0" lvl="0" indent="0" algn="ctr" defTabSz="488950">
+          <a:pPr marL="0" lvl="0" indent="0" algn="ctr" defTabSz="800100">
             <a:lnSpc>
               <a:spcPct val="90000"/>
             </a:lnSpc>
@@ -1491,7 +1491,7 @@
             <a:buNone/>
           </a:pPr>
           <a:r>
-            <a:rPr lang="en-US" sz="1100" kern="1200" dirty="0">
+            <a:rPr lang="en-US" sz="1800" kern="1200" dirty="0">
               <a:solidFill>
                 <a:schemeClr val="bg1">
                   <a:lumMod val="95000"/>
@@ -1503,8 +1503,8 @@
         </a:p>
       </dsp:txBody>
       <dsp:txXfrm>
-        <a:off x="5930438" y="2249964"/>
-        <a:ext cx="1189043" cy="1189043"/>
+        <a:off x="8562757" y="1905712"/>
+        <a:ext cx="1996689" cy="1410399"/>
       </dsp:txXfrm>
     </dsp:sp>
     <dsp:sp modelId="{CD633E9B-76DB-461A-BEA8-90588114C834}">
@@ -1513,9 +1513,9 @@
         <dsp:cNvSpPr/>
       </dsp:nvSpPr>
       <dsp:spPr>
-        <a:xfrm rot="8983177">
-          <a:off x="5136873" y="3221421"/>
-          <a:ext cx="513091" cy="567526"/>
+        <a:xfrm rot="9655314">
+          <a:off x="7361706" y="2969658"/>
+          <a:ext cx="682397" cy="567834"/>
         </a:xfrm>
         <a:prstGeom prst="rightArrow">
           <a:avLst>
@@ -1557,7 +1557,7 @@
         </a:bodyPr>
         <a:lstStyle/>
         <a:p>
-          <a:pPr marL="0" lvl="0" indent="0" algn="ctr" defTabSz="400050">
+          <a:pPr marL="0" lvl="0" indent="0" algn="ctr" defTabSz="1066800">
             <a:lnSpc>
               <a:spcPct val="90000"/>
             </a:lnSpc>
@@ -1569,12 +1569,12 @@
             </a:spcAft>
             <a:buNone/>
           </a:pPr>
-          <a:endParaRPr lang="en-US" sz="900" kern="1200"/>
+          <a:endParaRPr lang="en-US" sz="2400" kern="1200"/>
         </a:p>
       </dsp:txBody>
       <dsp:txXfrm rot="10800000">
-        <a:off x="5280300" y="3296119"/>
-        <a:ext cx="359164" cy="340516"/>
+        <a:off x="7527378" y="3055385"/>
+        <a:ext cx="512047" cy="340700"/>
       </dsp:txXfrm>
     </dsp:sp>
     <dsp:sp modelId="{4BAE3030-6163-4BB0-A9FC-4D12F88EF28E}">
@@ -1584,8 +1584,8 @@
       </dsp:nvSpPr>
       <dsp:spPr>
         <a:xfrm>
-          <a:off x="3396017" y="3339748"/>
-          <a:ext cx="1681561" cy="1681561"/>
+          <a:off x="3973359" y="2870913"/>
+          <a:ext cx="3284692" cy="2209054"/>
         </a:xfrm>
         <a:prstGeom prst="ellipse">
           <a:avLst/>
@@ -1622,12 +1622,12 @@
         </a:fontRef>
       </dsp:style>
       <dsp:txBody>
-        <a:bodyPr spcFirstLastPara="0" vert="horz" wrap="square" lIns="13970" tIns="13970" rIns="13970" bIns="13970" numCol="1" spcCol="1270" anchor="ctr" anchorCtr="0">
+        <a:bodyPr spcFirstLastPara="0" vert="horz" wrap="square" lIns="22860" tIns="22860" rIns="22860" bIns="22860" numCol="1" spcCol="1270" anchor="ctr" anchorCtr="0">
           <a:noAutofit/>
         </a:bodyPr>
         <a:lstStyle/>
         <a:p>
-          <a:pPr marL="0" lvl="0" indent="0" algn="ctr" defTabSz="488950">
+          <a:pPr marL="0" lvl="0" indent="0" algn="ctr" defTabSz="800100">
             <a:lnSpc>
               <a:spcPct val="90000"/>
             </a:lnSpc>
@@ -1640,7 +1640,7 @@
             <a:buNone/>
           </a:pPr>
           <a:r>
-            <a:rPr lang="en-US" sz="1100" kern="1200" dirty="0">
+            <a:rPr lang="en-US" sz="1800" kern="1200" dirty="0">
               <a:solidFill>
                 <a:schemeClr val="bg1">
                   <a:lumMod val="95000"/>
@@ -1650,7 +1650,7 @@
             <a:t>The physically realizable schedule is implemented by </a:t>
           </a:r>
           <a:r>
-            <a:rPr lang="en-US" sz="1100" kern="1200" dirty="0" err="1">
+            <a:rPr lang="en-US" sz="1800" kern="1200" dirty="0" err="1">
               <a:solidFill>
                 <a:schemeClr val="bg1">
                   <a:lumMod val="95000"/>
@@ -1660,7 +1660,7 @@
             <a:t>GridLab</a:t>
           </a:r>
           <a:r>
-            <a:rPr lang="en-US" sz="1100" kern="1200" dirty="0">
+            <a:rPr lang="en-US" sz="1800" kern="1200" dirty="0">
               <a:solidFill>
                 <a:schemeClr val="bg1">
                   <a:lumMod val="95000"/>
@@ -1672,8 +1672,8 @@
         </a:p>
       </dsp:txBody>
       <dsp:txXfrm>
-        <a:off x="3642276" y="3586007"/>
-        <a:ext cx="1189043" cy="1189043"/>
+        <a:off x="4454391" y="3194421"/>
+        <a:ext cx="2322628" cy="1562038"/>
       </dsp:txXfrm>
     </dsp:sp>
     <dsp:sp modelId="{67617F40-DA62-4ADF-8E3B-AC4DF870A1B2}">
@@ -1682,9 +1682,9 @@
         <dsp:cNvSpPr/>
       </dsp:nvSpPr>
       <dsp:spPr>
-        <a:xfrm rot="12775572">
-          <a:off x="2849949" y="3172585"/>
-          <a:ext cx="537118" cy="567526"/>
+        <a:xfrm rot="11888737">
+          <a:off x="2953571" y="2960928"/>
+          <a:ext cx="865779" cy="567834"/>
         </a:xfrm>
         <a:prstGeom prst="rightArrow">
           <a:avLst>
@@ -1726,7 +1726,7 @@
         </a:bodyPr>
         <a:lstStyle/>
         <a:p>
-          <a:pPr marL="0" lvl="0" indent="0" algn="ctr" defTabSz="400050">
+          <a:pPr marL="0" lvl="0" indent="0" algn="ctr" defTabSz="1066800">
             <a:lnSpc>
               <a:spcPct val="90000"/>
             </a:lnSpc>
@@ -1738,12 +1738,12 @@
             </a:spcAft>
             <a:buNone/>
           </a:pPr>
-          <a:endParaRPr lang="en-US" sz="900" kern="1200"/>
+          <a:endParaRPr lang="en-US" sz="2400" kern="1200"/>
         </a:p>
       </dsp:txBody>
       <dsp:txXfrm rot="10800000">
-        <a:off x="2998143" y="3329883"/>
-        <a:ext cx="375983" cy="340516"/>
+        <a:off x="3119685" y="3101021"/>
+        <a:ext cx="695429" cy="340700"/>
       </dsp:txXfrm>
     </dsp:sp>
     <dsp:sp modelId="{FC9AEC83-8A34-416E-ADB1-769965C1BE09}">
@@ -1753,8 +1753,8 @@
       </dsp:nvSpPr>
       <dsp:spPr>
         <a:xfrm>
-          <a:off x="1133918" y="1874862"/>
-          <a:ext cx="1681561" cy="1681561"/>
+          <a:off x="350075" y="1737438"/>
+          <a:ext cx="2330595" cy="1788385"/>
         </a:xfrm>
         <a:prstGeom prst="ellipse">
           <a:avLst/>
@@ -1791,12 +1791,12 @@
         </a:fontRef>
       </dsp:style>
       <dsp:txBody>
-        <a:bodyPr spcFirstLastPara="0" vert="horz" wrap="square" lIns="13970" tIns="13970" rIns="13970" bIns="13970" numCol="1" spcCol="1270" anchor="ctr" anchorCtr="0">
+        <a:bodyPr spcFirstLastPara="0" vert="horz" wrap="square" lIns="22860" tIns="22860" rIns="22860" bIns="22860" numCol="1" spcCol="1270" anchor="ctr" anchorCtr="0">
           <a:noAutofit/>
         </a:bodyPr>
         <a:lstStyle/>
         <a:p>
-          <a:pPr marL="0" lvl="0" indent="0" algn="ctr" defTabSz="488950">
+          <a:pPr marL="0" lvl="0" indent="0" algn="ctr" defTabSz="800100">
             <a:lnSpc>
               <a:spcPct val="90000"/>
             </a:lnSpc>
@@ -1809,7 +1809,7 @@
             <a:buNone/>
           </a:pPr>
           <a:r>
-            <a:rPr lang="en-US" sz="1100" kern="1200" dirty="0">
+            <a:rPr lang="en-US" sz="1800" kern="1200" dirty="0">
               <a:solidFill>
                 <a:schemeClr val="bg1">
                   <a:lumMod val="95000"/>
@@ -1821,8 +1821,8 @@
         </a:p>
       </dsp:txBody>
       <dsp:txXfrm>
-        <a:off x="1380177" y="2121121"/>
-        <a:ext cx="1189043" cy="1189043"/>
+        <a:off x="691383" y="1999341"/>
+        <a:ext cx="1647979" cy="1264579"/>
       </dsp:txXfrm>
     </dsp:sp>
     <dsp:sp modelId="{27F7F757-5639-4E8D-B7BC-438DB737CBD6}">
@@ -1831,9 +1831,9 @@
         <dsp:cNvSpPr/>
       </dsp:nvSpPr>
       <dsp:spPr>
-        <a:xfrm rot="19447732">
-          <a:off x="2783168" y="1656927"/>
-          <a:ext cx="526441" cy="567526"/>
+        <a:xfrm rot="20469357">
+          <a:off x="2912541" y="1715908"/>
+          <a:ext cx="908161" cy="567834"/>
         </a:xfrm>
         <a:prstGeom prst="rightArrow">
           <a:avLst>
@@ -1875,7 +1875,7 @@
         </a:bodyPr>
         <a:lstStyle/>
         <a:p>
-          <a:pPr marL="0" lvl="0" indent="0" algn="ctr" defTabSz="400050">
+          <a:pPr marL="0" lvl="0" indent="0" algn="ctr" defTabSz="1066800">
             <a:lnSpc>
               <a:spcPct val="90000"/>
             </a:lnSpc>
@@ -1887,12 +1887,12 @@
             </a:spcAft>
             <a:buNone/>
           </a:pPr>
-          <a:endParaRPr lang="en-US" sz="900" kern="1200"/>
+          <a:endParaRPr lang="en-US" sz="2400" kern="1200"/>
         </a:p>
       </dsp:txBody>
       <dsp:txXfrm>
-        <a:off x="2798145" y="1816703"/>
-        <a:ext cx="368509" cy="340516"/>
+        <a:off x="2917106" y="1856986"/>
+        <a:ext cx="737811" cy="340700"/>
       </dsp:txXfrm>
     </dsp:sp>
   </dsp:spTree>
@@ -9340,14 +9340,14 @@
           <p:nvPr>
             <p:extLst>
               <p:ext uri="{D42A27DB-BD31-4B8C-83A1-F6EECF244321}">
-                <p14:modId xmlns:p14="http://schemas.microsoft.com/office/powerpoint/2010/main" val="601288163"/>
+                <p14:modId xmlns:p14="http://schemas.microsoft.com/office/powerpoint/2010/main" val="2816914712"/>
               </p:ext>
             </p:extLst>
           </p:nvPr>
         </p:nvGraphicFramePr>
         <p:xfrm>
-          <a:off x="3242415" y="1486506"/>
-          <a:ext cx="8729626" cy="5253659"/>
+          <a:off x="600076" y="1486506"/>
+          <a:ext cx="11371966" cy="5253659"/>
         </p:xfrm>
         <a:graphic>
           <a:graphicData uri="http://schemas.openxmlformats.org/drawingml/2006/diagram">
@@ -9369,7 +9369,7 @@
         </p:nvSpPr>
         <p:spPr>
           <a:xfrm>
-            <a:off x="219959" y="1894790"/>
+            <a:off x="867659" y="1828115"/>
             <a:ext cx="2640316" cy="523220"/>
           </a:xfrm>
           <a:prstGeom prst="rect">
@@ -9729,6 +9729,294 @@
           </a:p>
         </p:txBody>
       </p:sp>
+      <p:sp>
+        <p:nvSpPr>
+          <p:cNvPr id="3" name="TextBox 2">
+            <a:extLst>
+              <a:ext uri="{FF2B5EF4-FFF2-40B4-BE49-F238E27FC236}">
+                <a16:creationId xmlns:a16="http://schemas.microsoft.com/office/drawing/2014/main" id="{54CE4A4E-4F0A-4A57-07B2-2D7E8CBED98A}"/>
+              </a:ext>
+            </a:extLst>
+          </p:cNvPr>
+          <p:cNvSpPr txBox="1"/>
+          <p:nvPr/>
+        </p:nvSpPr>
+        <p:spPr>
+          <a:xfrm>
+            <a:off x="1885950" y="5212316"/>
+            <a:ext cx="2371725" cy="646331"/>
+          </a:xfrm>
+          <a:prstGeom prst="rect">
+            <a:avLst/>
+          </a:prstGeom>
+          <a:noFill/>
+          <a:ln>
+            <a:solidFill>
+              <a:schemeClr val="bg2">
+                <a:lumMod val="20000"/>
+                <a:lumOff val="80000"/>
+              </a:schemeClr>
+            </a:solidFill>
+          </a:ln>
+        </p:spPr>
+        <p:txBody>
+          <a:bodyPr wrap="square" rtlCol="0">
+            <a:spAutoFit/>
+          </a:bodyPr>
+          <a:lstStyle/>
+          <a:p>
+            <a:r>
+              <a:rPr lang="en-US" dirty="0">
+                <a:solidFill>
+                  <a:schemeClr val="bg1"/>
+                </a:solidFill>
+              </a:rPr>
+              <a:t>Currently at PNNL</a:t>
+            </a:r>
+            <a:br>
+              <a:rPr lang="en-US" dirty="0">
+                <a:solidFill>
+                  <a:schemeClr val="bg1"/>
+                </a:solidFill>
+              </a:rPr>
+            </a:br>
+            <a:r>
+              <a:rPr lang="en-US" dirty="0">
+                <a:solidFill>
+                  <a:schemeClr val="bg1"/>
+                </a:solidFill>
+              </a:rPr>
+              <a:t>PhD at UVM</a:t>
+            </a:r>
+          </a:p>
+        </p:txBody>
+      </p:sp>
+      <p:sp>
+        <p:nvSpPr>
+          <p:cNvPr id="4" name="TextBox 3">
+            <a:extLst>
+              <a:ext uri="{FF2B5EF4-FFF2-40B4-BE49-F238E27FC236}">
+                <a16:creationId xmlns:a16="http://schemas.microsoft.com/office/drawing/2014/main" id="{887F690A-7D87-BB6B-CC58-AEFD5893A9B5}"/>
+              </a:ext>
+            </a:extLst>
+          </p:cNvPr>
+          <p:cNvSpPr txBox="1"/>
+          <p:nvPr/>
+        </p:nvSpPr>
+        <p:spPr>
+          <a:xfrm>
+            <a:off x="4910136" y="5193266"/>
+            <a:ext cx="2371725" cy="646331"/>
+          </a:xfrm>
+          <a:prstGeom prst="rect">
+            <a:avLst/>
+          </a:prstGeom>
+          <a:noFill/>
+          <a:ln>
+            <a:solidFill>
+              <a:schemeClr val="bg2">
+                <a:lumMod val="20000"/>
+                <a:lumOff val="80000"/>
+              </a:schemeClr>
+            </a:solidFill>
+          </a:ln>
+        </p:spPr>
+        <p:txBody>
+          <a:bodyPr wrap="square" rtlCol="0">
+            <a:spAutoFit/>
+          </a:bodyPr>
+          <a:lstStyle/>
+          <a:p>
+            <a:r>
+              <a:rPr lang="en-US" dirty="0">
+                <a:solidFill>
+                  <a:schemeClr val="bg1"/>
+                </a:solidFill>
+              </a:rPr>
+              <a:t>Currently Asst. Prof. at UVM</a:t>
+            </a:r>
+          </a:p>
+        </p:txBody>
+      </p:sp>
+      <p:sp>
+        <p:nvSpPr>
+          <p:cNvPr id="7" name="TextBox 6">
+            <a:extLst>
+              <a:ext uri="{FF2B5EF4-FFF2-40B4-BE49-F238E27FC236}">
+                <a16:creationId xmlns:a16="http://schemas.microsoft.com/office/drawing/2014/main" id="{A2DED524-45D5-DC85-C0DA-028FBD970E1F}"/>
+              </a:ext>
+            </a:extLst>
+          </p:cNvPr>
+          <p:cNvSpPr txBox="1"/>
+          <p:nvPr/>
+        </p:nvSpPr>
+        <p:spPr>
+          <a:xfrm>
+            <a:off x="8210550" y="5193265"/>
+            <a:ext cx="2371725" cy="646331"/>
+          </a:xfrm>
+          <a:prstGeom prst="rect">
+            <a:avLst/>
+          </a:prstGeom>
+          <a:noFill/>
+          <a:ln>
+            <a:solidFill>
+              <a:schemeClr val="bg2">
+                <a:lumMod val="20000"/>
+                <a:lumOff val="80000"/>
+              </a:schemeClr>
+            </a:solidFill>
+          </a:ln>
+        </p:spPr>
+        <p:txBody>
+          <a:bodyPr wrap="square" rtlCol="0">
+            <a:spAutoFit/>
+          </a:bodyPr>
+          <a:lstStyle/>
+          <a:p>
+            <a:r>
+              <a:rPr lang="en-US" dirty="0">
+                <a:solidFill>
+                  <a:schemeClr val="bg1"/>
+                </a:solidFill>
+              </a:rPr>
+              <a:t>Currently Assoc. Prof. at UVM</a:t>
+            </a:r>
+          </a:p>
+        </p:txBody>
+      </p:sp>
+      <p:cxnSp>
+        <p:nvCxnSpPr>
+          <p:cNvPr id="9" name="Straight Arrow Connector 8">
+            <a:extLst>
+              <a:ext uri="{FF2B5EF4-FFF2-40B4-BE49-F238E27FC236}">
+                <a16:creationId xmlns:a16="http://schemas.microsoft.com/office/drawing/2014/main" id="{09E2C2EA-CA0F-7418-6264-E0C918F10F77}"/>
+              </a:ext>
+            </a:extLst>
+          </p:cNvPr>
+          <p:cNvCxnSpPr/>
+          <p:nvPr/>
+        </p:nvCxnSpPr>
+        <p:spPr>
+          <a:xfrm flipH="1">
+            <a:off x="2743200" y="4105275"/>
+            <a:ext cx="1304925" cy="1107041"/>
+          </a:xfrm>
+          <a:prstGeom prst="straightConnector1">
+            <a:avLst/>
+          </a:prstGeom>
+          <a:ln w="3175">
+            <a:solidFill>
+              <a:schemeClr val="bg1">
+                <a:lumMod val="75000"/>
+              </a:schemeClr>
+            </a:solidFill>
+            <a:tailEnd type="triangle"/>
+          </a:ln>
+        </p:spPr>
+        <p:style>
+          <a:lnRef idx="1">
+            <a:schemeClr val="accent1"/>
+          </a:lnRef>
+          <a:fillRef idx="0">
+            <a:schemeClr val="accent1"/>
+          </a:fillRef>
+          <a:effectRef idx="0">
+            <a:schemeClr val="accent1"/>
+          </a:effectRef>
+          <a:fontRef idx="minor">
+            <a:schemeClr val="tx1"/>
+          </a:fontRef>
+        </p:style>
+      </p:cxnSp>
+      <p:cxnSp>
+        <p:nvCxnSpPr>
+          <p:cNvPr id="11" name="Straight Arrow Connector 10">
+            <a:extLst>
+              <a:ext uri="{FF2B5EF4-FFF2-40B4-BE49-F238E27FC236}">
+                <a16:creationId xmlns:a16="http://schemas.microsoft.com/office/drawing/2014/main" id="{028B3E19-B169-BEA8-941F-EF06AA784A19}"/>
+              </a:ext>
+            </a:extLst>
+          </p:cNvPr>
+          <p:cNvCxnSpPr/>
+          <p:nvPr/>
+        </p:nvCxnSpPr>
+        <p:spPr>
+          <a:xfrm>
+            <a:off x="5629275" y="4105275"/>
+            <a:ext cx="133350" cy="1087990"/>
+          </a:xfrm>
+          <a:prstGeom prst="straightConnector1">
+            <a:avLst/>
+          </a:prstGeom>
+          <a:ln w="3175">
+            <a:solidFill>
+              <a:schemeClr val="bg1">
+                <a:lumMod val="75000"/>
+              </a:schemeClr>
+            </a:solidFill>
+            <a:tailEnd type="triangle"/>
+          </a:ln>
+        </p:spPr>
+        <p:style>
+          <a:lnRef idx="1">
+            <a:schemeClr val="accent1"/>
+          </a:lnRef>
+          <a:fillRef idx="0">
+            <a:schemeClr val="accent1"/>
+          </a:fillRef>
+          <a:effectRef idx="0">
+            <a:schemeClr val="accent1"/>
+          </a:effectRef>
+          <a:fontRef idx="minor">
+            <a:schemeClr val="tx1"/>
+          </a:fontRef>
+        </p:style>
+      </p:cxnSp>
+      <p:cxnSp>
+        <p:nvCxnSpPr>
+          <p:cNvPr id="13" name="Straight Arrow Connector 12">
+            <a:extLst>
+              <a:ext uri="{FF2B5EF4-FFF2-40B4-BE49-F238E27FC236}">
+                <a16:creationId xmlns:a16="http://schemas.microsoft.com/office/drawing/2014/main" id="{DE6DC399-63BA-2B63-5D63-22924541F2D2}"/>
+              </a:ext>
+            </a:extLst>
+          </p:cNvPr>
+          <p:cNvCxnSpPr/>
+          <p:nvPr/>
+        </p:nvCxnSpPr>
+        <p:spPr>
+          <a:xfrm>
+            <a:off x="7696200" y="4105275"/>
+            <a:ext cx="1238250" cy="1087990"/>
+          </a:xfrm>
+          <a:prstGeom prst="straightConnector1">
+            <a:avLst/>
+          </a:prstGeom>
+          <a:ln w="3175">
+            <a:solidFill>
+              <a:schemeClr val="bg1">
+                <a:lumMod val="75000"/>
+              </a:schemeClr>
+            </a:solidFill>
+            <a:tailEnd type="triangle"/>
+          </a:ln>
+        </p:spPr>
+        <p:style>
+          <a:lnRef idx="1">
+            <a:schemeClr val="accent1"/>
+          </a:lnRef>
+          <a:fillRef idx="0">
+            <a:schemeClr val="accent1"/>
+          </a:fillRef>
+          <a:effectRef idx="0">
+            <a:schemeClr val="accent1"/>
+          </a:effectRef>
+          <a:fontRef idx="minor">
+            <a:schemeClr val="tx1"/>
+          </a:fontRef>
+        </p:style>
+      </p:cxnSp>
     </p:spTree>
     <p:extLst>
       <p:ext uri="{BB962C8B-B14F-4D97-AF65-F5344CB8AC3E}">
@@ -10758,8 +11046,8 @@
           <a:chExt cx="0" cy="0"/>
         </a:xfrm>
       </p:grpSpPr>
-      <mc:AlternateContent xmlns:mc="http://schemas.openxmlformats.org/markup-compatibility/2006">
-        <mc:Choice xmlns:a14="http://schemas.microsoft.com/office/drawing/2010/main" Requires="a14">
+      <mc:AlternateContent xmlns:mc="http://schemas.openxmlformats.org/markup-compatibility/2006" xmlns:a14="http://schemas.microsoft.com/office/drawing/2010/main">
+        <mc:Choice Requires="a14">
           <p:sp>
             <p:nvSpPr>
               <p:cNvPr id="3" name="Content Placeholder 2">
@@ -11136,7 +11424,7 @@
             </p:txBody>
           </p:sp>
         </mc:Choice>
-        <mc:Fallback>
+        <mc:Fallback xmlns="">
           <p:sp>
             <p:nvSpPr>
               <p:cNvPr id="3" name="Content Placeholder 2">
@@ -11292,8 +11580,8 @@
             </a:ln>
           </p:spPr>
         </p:pic>
-        <mc:AlternateContent xmlns:mc="http://schemas.openxmlformats.org/markup-compatibility/2006">
-          <mc:Choice xmlns:a14="http://schemas.microsoft.com/office/drawing/2010/main" Requires="a14">
+        <mc:AlternateContent xmlns:mc="http://schemas.openxmlformats.org/markup-compatibility/2006" xmlns:a14="http://schemas.microsoft.com/office/drawing/2010/main">
+          <mc:Choice Requires="a14">
             <p:sp>
               <p:nvSpPr>
                 <p:cNvPr id="7" name="TextBox 6">
@@ -11378,7 +11666,7 @@
               </p:txBody>
             </p:sp>
           </mc:Choice>
-          <mc:Fallback>
+          <mc:Fallback xmlns="">
             <p:sp>
               <p:nvSpPr>
                 <p:cNvPr id="7" name="TextBox 6">

</xml_diff>

<commit_message>
test scenarios added to slides.
</commit_message>
<xml_diff>
--- a/research_showcase/multiPeriodOptimization_aryan_ritwajeet_jha.pptx
+++ b/research_showcase/multiPeriodOptimization_aryan_ritwajeet_jha.pptx
@@ -2,26 +2,32 @@
 <file path=ppt/presentation.xml><?xml version="1.0" encoding="utf-8"?>
 <p:presentation xmlns:a="http://schemas.openxmlformats.org/drawingml/2006/main" xmlns:r="http://schemas.openxmlformats.org/officeDocument/2006/relationships" xmlns:p="http://schemas.openxmlformats.org/presentationml/2006/main" saveSubsetFonts="1">
   <p:sldMasterIdLst>
-    <p:sldMasterId id="2147483686" r:id="rId1"/>
+    <p:sldMasterId id="2147483686" r:id="rId4"/>
   </p:sldMasterIdLst>
   <p:notesMasterIdLst>
-    <p:notesMasterId r:id="rId13"/>
+    <p:notesMasterId r:id="rId22"/>
   </p:notesMasterIdLst>
   <p:handoutMasterIdLst>
-    <p:handoutMasterId r:id="rId14"/>
+    <p:handoutMasterId r:id="rId23"/>
   </p:handoutMasterIdLst>
   <p:sldIdLst>
-    <p:sldId id="257" r:id="rId2"/>
-    <p:sldId id="258" r:id="rId3"/>
-    <p:sldId id="282" r:id="rId4"/>
-    <p:sldId id="283" r:id="rId5"/>
-    <p:sldId id="284" r:id="rId6"/>
-    <p:sldId id="285" r:id="rId7"/>
-    <p:sldId id="286" r:id="rId8"/>
-    <p:sldId id="288" r:id="rId9"/>
-    <p:sldId id="289" r:id="rId10"/>
-    <p:sldId id="290" r:id="rId11"/>
-    <p:sldId id="287" r:id="rId12"/>
+    <p:sldId id="257" r:id="rId5"/>
+    <p:sldId id="258" r:id="rId6"/>
+    <p:sldId id="282" r:id="rId7"/>
+    <p:sldId id="283" r:id="rId8"/>
+    <p:sldId id="284" r:id="rId9"/>
+    <p:sldId id="285" r:id="rId10"/>
+    <p:sldId id="286" r:id="rId11"/>
+    <p:sldId id="288" r:id="rId12"/>
+    <p:sldId id="289" r:id="rId13"/>
+    <p:sldId id="290" r:id="rId14"/>
+    <p:sldId id="292" r:id="rId15"/>
+    <p:sldId id="291" r:id="rId16"/>
+    <p:sldId id="294" r:id="rId17"/>
+    <p:sldId id="293" r:id="rId18"/>
+    <p:sldId id="295" r:id="rId19"/>
+    <p:sldId id="296" r:id="rId20"/>
+    <p:sldId id="287" r:id="rId21"/>
   </p:sldIdLst>
   <p:sldSz cx="12192000" cy="6858000"/>
   <p:notesSz cx="6858000" cy="9144000"/>
@@ -3783,6 +3789,342 @@
 </p:notes>
 </file>
 
+<file path=ppt/notesSlides/notesSlide2.xml><?xml version="1.0" encoding="utf-8"?>
+<p:notes xmlns:a="http://schemas.openxmlformats.org/drawingml/2006/main" xmlns:r="http://schemas.openxmlformats.org/officeDocument/2006/relationships" xmlns:p="http://schemas.openxmlformats.org/presentationml/2006/main">
+  <p:cSld>
+    <p:spTree>
+      <p:nvGrpSpPr>
+        <p:cNvPr id="1" name=""/>
+        <p:cNvGrpSpPr/>
+        <p:nvPr/>
+      </p:nvGrpSpPr>
+      <p:grpSpPr>
+        <a:xfrm>
+          <a:off x="0" y="0"/>
+          <a:ext cx="0" cy="0"/>
+          <a:chOff x="0" y="0"/>
+          <a:chExt cx="0" cy="0"/>
+        </a:xfrm>
+      </p:grpSpPr>
+      <p:sp>
+        <p:nvSpPr>
+          <p:cNvPr id="2" name="Slide Image Placeholder 1"/>
+          <p:cNvSpPr>
+            <a:spLocks noGrp="1" noRot="1" noChangeAspect="1"/>
+          </p:cNvSpPr>
+          <p:nvPr>
+            <p:ph type="sldImg"/>
+          </p:nvPr>
+        </p:nvSpPr>
+        <p:spPr/>
+      </p:sp>
+      <p:sp>
+        <p:nvSpPr>
+          <p:cNvPr id="3" name="Notes Placeholder 2"/>
+          <p:cNvSpPr>
+            <a:spLocks noGrp="1"/>
+          </p:cNvSpPr>
+          <p:nvPr>
+            <p:ph type="body" idx="1"/>
+          </p:nvPr>
+        </p:nvSpPr>
+        <p:spPr/>
+        <p:txBody>
+          <a:bodyPr/>
+          <a:lstStyle/>
+          <a:p>
+            <a:endParaRPr lang="en-US" dirty="0"/>
+          </a:p>
+        </p:txBody>
+      </p:sp>
+      <p:sp>
+        <p:nvSpPr>
+          <p:cNvPr id="4" name="Slide Number Placeholder 3"/>
+          <p:cNvSpPr>
+            <a:spLocks noGrp="1"/>
+          </p:cNvSpPr>
+          <p:nvPr>
+            <p:ph type="sldNum" sz="quarter" idx="5"/>
+          </p:nvPr>
+        </p:nvSpPr>
+        <p:spPr/>
+        <p:txBody>
+          <a:bodyPr/>
+          <a:lstStyle/>
+          <a:p>
+            <a:fld id="{85CEC689-B63F-4B6D-AF6D-31DA368AC821}" type="slidenum">
+              <a:rPr lang="en-US" smtClean="0"/>
+              <a:t>13</a:t>
+            </a:fld>
+            <a:endParaRPr lang="en-US"/>
+          </a:p>
+        </p:txBody>
+      </p:sp>
+    </p:spTree>
+    <p:extLst>
+      <p:ext uri="{BB962C8B-B14F-4D97-AF65-F5344CB8AC3E}">
+        <p14:creationId xmlns:p14="http://schemas.microsoft.com/office/powerpoint/2010/main" val="2994929415"/>
+      </p:ext>
+    </p:extLst>
+  </p:cSld>
+  <p:clrMapOvr>
+    <a:masterClrMapping/>
+  </p:clrMapOvr>
+</p:notes>
+</file>
+
+<file path=ppt/notesSlides/notesSlide3.xml><?xml version="1.0" encoding="utf-8"?>
+<p:notes xmlns:a="http://schemas.openxmlformats.org/drawingml/2006/main" xmlns:r="http://schemas.openxmlformats.org/officeDocument/2006/relationships" xmlns:p="http://schemas.openxmlformats.org/presentationml/2006/main">
+  <p:cSld>
+    <p:spTree>
+      <p:nvGrpSpPr>
+        <p:cNvPr id="1" name=""/>
+        <p:cNvGrpSpPr/>
+        <p:nvPr/>
+      </p:nvGrpSpPr>
+      <p:grpSpPr>
+        <a:xfrm>
+          <a:off x="0" y="0"/>
+          <a:ext cx="0" cy="0"/>
+          <a:chOff x="0" y="0"/>
+          <a:chExt cx="0" cy="0"/>
+        </a:xfrm>
+      </p:grpSpPr>
+      <p:sp>
+        <p:nvSpPr>
+          <p:cNvPr id="2" name="Slide Image Placeholder 1"/>
+          <p:cNvSpPr>
+            <a:spLocks noGrp="1" noRot="1" noChangeAspect="1"/>
+          </p:cNvSpPr>
+          <p:nvPr>
+            <p:ph type="sldImg"/>
+          </p:nvPr>
+        </p:nvSpPr>
+        <p:spPr/>
+      </p:sp>
+      <p:sp>
+        <p:nvSpPr>
+          <p:cNvPr id="3" name="Notes Placeholder 2"/>
+          <p:cNvSpPr>
+            <a:spLocks noGrp="1"/>
+          </p:cNvSpPr>
+          <p:nvPr>
+            <p:ph type="body" idx="1"/>
+          </p:nvPr>
+        </p:nvSpPr>
+        <p:spPr/>
+        <p:txBody>
+          <a:bodyPr/>
+          <a:lstStyle/>
+          <a:p>
+            <a:endParaRPr lang="en-US" dirty="0"/>
+          </a:p>
+        </p:txBody>
+      </p:sp>
+      <p:sp>
+        <p:nvSpPr>
+          <p:cNvPr id="4" name="Slide Number Placeholder 3"/>
+          <p:cNvSpPr>
+            <a:spLocks noGrp="1"/>
+          </p:cNvSpPr>
+          <p:nvPr>
+            <p:ph type="sldNum" sz="quarter" idx="5"/>
+          </p:nvPr>
+        </p:nvSpPr>
+        <p:spPr/>
+        <p:txBody>
+          <a:bodyPr/>
+          <a:lstStyle/>
+          <a:p>
+            <a:fld id="{85CEC689-B63F-4B6D-AF6D-31DA368AC821}" type="slidenum">
+              <a:rPr lang="en-US" smtClean="0"/>
+              <a:t>14</a:t>
+            </a:fld>
+            <a:endParaRPr lang="en-US"/>
+          </a:p>
+        </p:txBody>
+      </p:sp>
+    </p:spTree>
+    <p:extLst>
+      <p:ext uri="{BB962C8B-B14F-4D97-AF65-F5344CB8AC3E}">
+        <p14:creationId xmlns:p14="http://schemas.microsoft.com/office/powerpoint/2010/main" val="2024275638"/>
+      </p:ext>
+    </p:extLst>
+  </p:cSld>
+  <p:clrMapOvr>
+    <a:masterClrMapping/>
+  </p:clrMapOvr>
+</p:notes>
+</file>
+
+<file path=ppt/notesSlides/notesSlide4.xml><?xml version="1.0" encoding="utf-8"?>
+<p:notes xmlns:a="http://schemas.openxmlformats.org/drawingml/2006/main" xmlns:r="http://schemas.openxmlformats.org/officeDocument/2006/relationships" xmlns:p="http://schemas.openxmlformats.org/presentationml/2006/main">
+  <p:cSld>
+    <p:spTree>
+      <p:nvGrpSpPr>
+        <p:cNvPr id="1" name=""/>
+        <p:cNvGrpSpPr/>
+        <p:nvPr/>
+      </p:nvGrpSpPr>
+      <p:grpSpPr>
+        <a:xfrm>
+          <a:off x="0" y="0"/>
+          <a:ext cx="0" cy="0"/>
+          <a:chOff x="0" y="0"/>
+          <a:chExt cx="0" cy="0"/>
+        </a:xfrm>
+      </p:grpSpPr>
+      <p:sp>
+        <p:nvSpPr>
+          <p:cNvPr id="2" name="Slide Image Placeholder 1"/>
+          <p:cNvSpPr>
+            <a:spLocks noGrp="1" noRot="1" noChangeAspect="1"/>
+          </p:cNvSpPr>
+          <p:nvPr>
+            <p:ph type="sldImg"/>
+          </p:nvPr>
+        </p:nvSpPr>
+        <p:spPr/>
+      </p:sp>
+      <p:sp>
+        <p:nvSpPr>
+          <p:cNvPr id="3" name="Notes Placeholder 2"/>
+          <p:cNvSpPr>
+            <a:spLocks noGrp="1"/>
+          </p:cNvSpPr>
+          <p:nvPr>
+            <p:ph type="body" idx="1"/>
+          </p:nvPr>
+        </p:nvSpPr>
+        <p:spPr/>
+        <p:txBody>
+          <a:bodyPr/>
+          <a:lstStyle/>
+          <a:p>
+            <a:endParaRPr lang="en-US" dirty="0"/>
+          </a:p>
+        </p:txBody>
+      </p:sp>
+      <p:sp>
+        <p:nvSpPr>
+          <p:cNvPr id="4" name="Slide Number Placeholder 3"/>
+          <p:cNvSpPr>
+            <a:spLocks noGrp="1"/>
+          </p:cNvSpPr>
+          <p:nvPr>
+            <p:ph type="sldNum" sz="quarter" idx="5"/>
+          </p:nvPr>
+        </p:nvSpPr>
+        <p:spPr/>
+        <p:txBody>
+          <a:bodyPr/>
+          <a:lstStyle/>
+          <a:p>
+            <a:fld id="{85CEC689-B63F-4B6D-AF6D-31DA368AC821}" type="slidenum">
+              <a:rPr lang="en-US" smtClean="0"/>
+              <a:t>15</a:t>
+            </a:fld>
+            <a:endParaRPr lang="en-US"/>
+          </a:p>
+        </p:txBody>
+      </p:sp>
+    </p:spTree>
+    <p:extLst>
+      <p:ext uri="{BB962C8B-B14F-4D97-AF65-F5344CB8AC3E}">
+        <p14:creationId xmlns:p14="http://schemas.microsoft.com/office/powerpoint/2010/main" val="2583151057"/>
+      </p:ext>
+    </p:extLst>
+  </p:cSld>
+  <p:clrMapOvr>
+    <a:masterClrMapping/>
+  </p:clrMapOvr>
+</p:notes>
+</file>
+
+<file path=ppt/notesSlides/notesSlide5.xml><?xml version="1.0" encoding="utf-8"?>
+<p:notes xmlns:a="http://schemas.openxmlformats.org/drawingml/2006/main" xmlns:r="http://schemas.openxmlformats.org/officeDocument/2006/relationships" xmlns:p="http://schemas.openxmlformats.org/presentationml/2006/main">
+  <p:cSld>
+    <p:spTree>
+      <p:nvGrpSpPr>
+        <p:cNvPr id="1" name=""/>
+        <p:cNvGrpSpPr/>
+        <p:nvPr/>
+      </p:nvGrpSpPr>
+      <p:grpSpPr>
+        <a:xfrm>
+          <a:off x="0" y="0"/>
+          <a:ext cx="0" cy="0"/>
+          <a:chOff x="0" y="0"/>
+          <a:chExt cx="0" cy="0"/>
+        </a:xfrm>
+      </p:grpSpPr>
+      <p:sp>
+        <p:nvSpPr>
+          <p:cNvPr id="2" name="Slide Image Placeholder 1"/>
+          <p:cNvSpPr>
+            <a:spLocks noGrp="1" noRot="1" noChangeAspect="1"/>
+          </p:cNvSpPr>
+          <p:nvPr>
+            <p:ph type="sldImg"/>
+          </p:nvPr>
+        </p:nvSpPr>
+        <p:spPr/>
+      </p:sp>
+      <p:sp>
+        <p:nvSpPr>
+          <p:cNvPr id="3" name="Notes Placeholder 2"/>
+          <p:cNvSpPr>
+            <a:spLocks noGrp="1"/>
+          </p:cNvSpPr>
+          <p:nvPr>
+            <p:ph type="body" idx="1"/>
+          </p:nvPr>
+        </p:nvSpPr>
+        <p:spPr/>
+        <p:txBody>
+          <a:bodyPr/>
+          <a:lstStyle/>
+          <a:p>
+            <a:endParaRPr lang="en-US" dirty="0"/>
+          </a:p>
+        </p:txBody>
+      </p:sp>
+      <p:sp>
+        <p:nvSpPr>
+          <p:cNvPr id="4" name="Slide Number Placeholder 3"/>
+          <p:cNvSpPr>
+            <a:spLocks noGrp="1"/>
+          </p:cNvSpPr>
+          <p:nvPr>
+            <p:ph type="sldNum" sz="quarter" idx="5"/>
+          </p:nvPr>
+        </p:nvSpPr>
+        <p:spPr/>
+        <p:txBody>
+          <a:bodyPr/>
+          <a:lstStyle/>
+          <a:p>
+            <a:fld id="{85CEC689-B63F-4B6D-AF6D-31DA368AC821}" type="slidenum">
+              <a:rPr lang="en-US" smtClean="0"/>
+              <a:t>16</a:t>
+            </a:fld>
+            <a:endParaRPr lang="en-US"/>
+          </a:p>
+        </p:txBody>
+      </p:sp>
+    </p:spTree>
+    <p:extLst>
+      <p:ext uri="{BB962C8B-B14F-4D97-AF65-F5344CB8AC3E}">
+        <p14:creationId xmlns:p14="http://schemas.microsoft.com/office/powerpoint/2010/main" val="3793774432"/>
+      </p:ext>
+    </p:extLst>
+  </p:cSld>
+  <p:clrMapOvr>
+    <a:masterClrMapping/>
+  </p:clrMapOvr>
+</p:notes>
+</file>
+
 <file path=ppt/slideLayouts/slideLayout1.xml><?xml version="1.0" encoding="utf-8"?>
 <p:sldLayout xmlns:a="http://schemas.openxmlformats.org/drawingml/2006/main" xmlns:r="http://schemas.openxmlformats.org/officeDocument/2006/relationships" xmlns:p="http://schemas.openxmlformats.org/presentationml/2006/main" showMasterSp="0" type="title" preserve="1">
   <p:cSld name="1 Title Slide">
@@ -9437,6 +9779,1933 @@
           <p:cNvPr id="2" name="Title 1">
             <a:extLst>
               <a:ext uri="{FF2B5EF4-FFF2-40B4-BE49-F238E27FC236}">
+                <a16:creationId xmlns:a16="http://schemas.microsoft.com/office/drawing/2014/main" id="{45DF1785-83CB-4F7A-820B-C600AC43B067}"/>
+              </a:ext>
+            </a:extLst>
+          </p:cNvPr>
+          <p:cNvSpPr>
+            <a:spLocks noGrp="1"/>
+          </p:cNvSpPr>
+          <p:nvPr>
+            <p:ph type="title"/>
+          </p:nvPr>
+        </p:nvSpPr>
+        <p:spPr>
+          <a:xfrm>
+            <a:off x="1064418" y="376654"/>
+            <a:ext cx="10063163" cy="1015584"/>
+          </a:xfrm>
+          <a:ln w="38100">
+            <a:solidFill>
+              <a:schemeClr val="bg2">
+                <a:lumMod val="40000"/>
+                <a:lumOff val="60000"/>
+              </a:schemeClr>
+            </a:solidFill>
+          </a:ln>
+        </p:spPr>
+        <p:txBody>
+          <a:bodyPr>
+            <a:normAutofit fontScale="90000"/>
+          </a:bodyPr>
+          <a:lstStyle/>
+          <a:p>
+            <a:r>
+              <a:rPr lang="en-US" b="0" dirty="0">
+                <a:latin typeface="Times New Roman" panose="02020603050405020304" pitchFamily="18" charset="0"/>
+                <a:cs typeface="Times New Roman" panose="02020603050405020304" pitchFamily="18" charset="0"/>
+              </a:rPr>
+              <a:t>Optimal Multi-Period Dispatch of Distributed Energy Resources in Unbalanced Distribution Feeders</a:t>
+            </a:r>
+          </a:p>
+        </p:txBody>
+      </p:sp>
+      <p:sp>
+        <p:nvSpPr>
+          <p:cNvPr id="11" name="TextBox 10">
+            <a:extLst>
+              <a:ext uri="{FF2B5EF4-FFF2-40B4-BE49-F238E27FC236}">
+                <a16:creationId xmlns:a16="http://schemas.microsoft.com/office/drawing/2014/main" id="{7C9DD76A-A77D-5721-DDB8-8503776FF432}"/>
+              </a:ext>
+            </a:extLst>
+          </p:cNvPr>
+          <p:cNvSpPr txBox="1"/>
+          <p:nvPr/>
+        </p:nvSpPr>
+        <p:spPr>
+          <a:xfrm>
+            <a:off x="867659" y="1828115"/>
+            <a:ext cx="2640316" cy="523220"/>
+          </a:xfrm>
+          <a:prstGeom prst="rect">
+            <a:avLst/>
+          </a:prstGeom>
+          <a:noFill/>
+          <a:ln>
+            <a:solidFill>
+              <a:schemeClr val="bg2">
+                <a:lumMod val="40000"/>
+                <a:lumOff val="60000"/>
+              </a:schemeClr>
+            </a:solidFill>
+          </a:ln>
+        </p:spPr>
+        <p:txBody>
+          <a:bodyPr wrap="square" rtlCol="0">
+            <a:spAutoFit/>
+          </a:bodyPr>
+          <a:lstStyle/>
+          <a:p>
+            <a:r>
+              <a:rPr lang="en-US" sz="2800" dirty="0">
+                <a:solidFill>
+                  <a:schemeClr val="bg1"/>
+                </a:solidFill>
+              </a:rPr>
+              <a:t>The Process</a:t>
+            </a:r>
+          </a:p>
+        </p:txBody>
+      </p:sp>
+      <p:pic>
+        <p:nvPicPr>
+          <p:cNvPr id="5" name="Picture 4">
+            <a:extLst>
+              <a:ext uri="{FF2B5EF4-FFF2-40B4-BE49-F238E27FC236}">
+                <a16:creationId xmlns:a16="http://schemas.microsoft.com/office/drawing/2014/main" id="{0AC97D59-505B-282A-F887-E99C53706F78}"/>
+              </a:ext>
+            </a:extLst>
+          </p:cNvPr>
+          <p:cNvPicPr>
+            <a:picLocks noChangeAspect="1"/>
+          </p:cNvPicPr>
+          <p:nvPr/>
+        </p:nvPicPr>
+        <p:blipFill>
+          <a:blip r:embed="rId2"/>
+          <a:stretch>
+            <a:fillRect/>
+          </a:stretch>
+        </p:blipFill>
+        <p:spPr>
+          <a:xfrm>
+            <a:off x="390057" y="2442940"/>
+            <a:ext cx="6687483" cy="3191320"/>
+          </a:xfrm>
+          <a:prstGeom prst="rect">
+            <a:avLst/>
+          </a:prstGeom>
+          <a:ln>
+            <a:solidFill>
+              <a:schemeClr val="bg2">
+                <a:lumMod val="40000"/>
+                <a:lumOff val="60000"/>
+              </a:schemeClr>
+            </a:solidFill>
+          </a:ln>
+        </p:spPr>
+      </p:pic>
+      <p:sp>
+        <p:nvSpPr>
+          <p:cNvPr id="6" name="TextBox 5">
+            <a:extLst>
+              <a:ext uri="{FF2B5EF4-FFF2-40B4-BE49-F238E27FC236}">
+                <a16:creationId xmlns:a16="http://schemas.microsoft.com/office/drawing/2014/main" id="{72680ED8-9532-1377-C217-167F8DDE1E40}"/>
+              </a:ext>
+            </a:extLst>
+          </p:cNvPr>
+          <p:cNvSpPr txBox="1"/>
+          <p:nvPr/>
+        </p:nvSpPr>
+        <p:spPr>
+          <a:xfrm>
+            <a:off x="390057" y="5743922"/>
+            <a:ext cx="6687484" cy="923330"/>
+          </a:xfrm>
+          <a:prstGeom prst="rect">
+            <a:avLst/>
+          </a:prstGeom>
+          <a:noFill/>
+          <a:ln>
+            <a:solidFill>
+              <a:schemeClr val="bg2">
+                <a:lumMod val="40000"/>
+                <a:lumOff val="60000"/>
+              </a:schemeClr>
+            </a:solidFill>
+          </a:ln>
+        </p:spPr>
+        <p:txBody>
+          <a:bodyPr wrap="square" rtlCol="0">
+            <a:spAutoFit/>
+          </a:bodyPr>
+          <a:lstStyle/>
+          <a:p>
+            <a:r>
+              <a:rPr lang="en-US" dirty="0">
+                <a:solidFill>
+                  <a:schemeClr val="bg1"/>
+                </a:solidFill>
+              </a:rPr>
+              <a:t>Fig. Coupling of SOCP with NLP by fixing real power solutions from SOCP and hence decoupling the NLP to obtain a feasible solution. </a:t>
+            </a:r>
+            <a:r>
+              <a:rPr lang="en-US" b="1" i="1" dirty="0">
+                <a:solidFill>
+                  <a:schemeClr val="bg1"/>
+                </a:solidFill>
+              </a:rPr>
+              <a:t>(What? How?)</a:t>
+            </a:r>
+          </a:p>
+        </p:txBody>
+      </p:sp>
+      <p:pic>
+        <p:nvPicPr>
+          <p:cNvPr id="8" name="Picture 7">
+            <a:extLst>
+              <a:ext uri="{FF2B5EF4-FFF2-40B4-BE49-F238E27FC236}">
+                <a16:creationId xmlns:a16="http://schemas.microsoft.com/office/drawing/2014/main" id="{38759294-2182-23C6-E864-8EDE879C67C8}"/>
+              </a:ext>
+            </a:extLst>
+          </p:cNvPr>
+          <p:cNvPicPr>
+            <a:picLocks noChangeAspect="1"/>
+          </p:cNvPicPr>
+          <p:nvPr/>
+        </p:nvPicPr>
+        <p:blipFill>
+          <a:blip r:embed="rId3"/>
+          <a:stretch>
+            <a:fillRect/>
+          </a:stretch>
+        </p:blipFill>
+        <p:spPr>
+          <a:xfrm>
+            <a:off x="7258515" y="2442940"/>
+            <a:ext cx="4751086" cy="3191320"/>
+          </a:xfrm>
+          <a:prstGeom prst="rect">
+            <a:avLst/>
+          </a:prstGeom>
+          <a:ln>
+            <a:solidFill>
+              <a:schemeClr val="bg2">
+                <a:lumMod val="40000"/>
+                <a:lumOff val="60000"/>
+              </a:schemeClr>
+            </a:solidFill>
+          </a:ln>
+        </p:spPr>
+      </p:pic>
+      <p:sp>
+        <p:nvSpPr>
+          <p:cNvPr id="12" name="TextBox 11">
+            <a:extLst>
+              <a:ext uri="{FF2B5EF4-FFF2-40B4-BE49-F238E27FC236}">
+                <a16:creationId xmlns:a16="http://schemas.microsoft.com/office/drawing/2014/main" id="{635779B3-FFB5-C54A-2480-54ECABAD79A1}"/>
+              </a:ext>
+            </a:extLst>
+          </p:cNvPr>
+          <p:cNvSpPr txBox="1"/>
+          <p:nvPr/>
+        </p:nvSpPr>
+        <p:spPr>
+          <a:xfrm>
+            <a:off x="7258515" y="5743922"/>
+            <a:ext cx="4751086" cy="923330"/>
+          </a:xfrm>
+          <a:prstGeom prst="rect">
+            <a:avLst/>
+          </a:prstGeom>
+          <a:noFill/>
+          <a:ln>
+            <a:solidFill>
+              <a:schemeClr val="bg2">
+                <a:lumMod val="40000"/>
+                <a:lumOff val="60000"/>
+              </a:schemeClr>
+            </a:solidFill>
+          </a:ln>
+        </p:spPr>
+        <p:txBody>
+          <a:bodyPr wrap="square" rtlCol="0">
+            <a:spAutoFit/>
+          </a:bodyPr>
+          <a:lstStyle/>
+          <a:p>
+            <a:r>
+              <a:rPr lang="en-US" dirty="0">
+                <a:solidFill>
+                  <a:schemeClr val="bg1"/>
+                </a:solidFill>
+              </a:rPr>
+              <a:t>Fig. Available reactive power variation range for NLP across multiple time-steps based on the active power trajectory provided by the SOCP.</a:t>
+            </a:r>
+            <a:endParaRPr lang="en-US" b="1" i="1" dirty="0">
+              <a:solidFill>
+                <a:schemeClr val="bg1"/>
+              </a:solidFill>
+            </a:endParaRPr>
+          </a:p>
+        </p:txBody>
+      </p:sp>
+    </p:spTree>
+    <p:extLst>
+      <p:ext uri="{BB962C8B-B14F-4D97-AF65-F5344CB8AC3E}">
+        <p14:creationId xmlns:p14="http://schemas.microsoft.com/office/powerpoint/2010/main" val="60217219"/>
+      </p:ext>
+    </p:extLst>
+  </p:cSld>
+  <p:clrMapOvr>
+    <a:masterClrMapping/>
+  </p:clrMapOvr>
+</p:sld>
+</file>
+
+<file path=ppt/slides/slide12.xml><?xml version="1.0" encoding="utf-8"?>
+<p:sld xmlns:a="http://schemas.openxmlformats.org/drawingml/2006/main" xmlns:r="http://schemas.openxmlformats.org/officeDocument/2006/relationships" xmlns:p="http://schemas.openxmlformats.org/presentationml/2006/main">
+  <p:cSld>
+    <p:spTree>
+      <p:nvGrpSpPr>
+        <p:cNvPr id="1" name=""/>
+        <p:cNvGrpSpPr/>
+        <p:nvPr/>
+      </p:nvGrpSpPr>
+      <p:grpSpPr>
+        <a:xfrm>
+          <a:off x="0" y="0"/>
+          <a:ext cx="0" cy="0"/>
+          <a:chOff x="0" y="0"/>
+          <a:chExt cx="0" cy="0"/>
+        </a:xfrm>
+      </p:grpSpPr>
+      <mc:AlternateContent xmlns:mc="http://schemas.openxmlformats.org/markup-compatibility/2006" xmlns:a14="http://schemas.microsoft.com/office/drawing/2010/main">
+        <mc:Choice Requires="a14">
+          <p:sp>
+            <p:nvSpPr>
+              <p:cNvPr id="3" name="Content Placeholder 2">
+                <a:extLst>
+                  <a:ext uri="{FF2B5EF4-FFF2-40B4-BE49-F238E27FC236}">
+                    <a16:creationId xmlns:a16="http://schemas.microsoft.com/office/drawing/2014/main" id="{64BE6767-30AA-41AB-8C0B-29F30741AF76}"/>
+                  </a:ext>
+                </a:extLst>
+              </p:cNvPr>
+              <p:cNvSpPr>
+                <a:spLocks noGrp="1"/>
+              </p:cNvSpPr>
+              <p:nvPr>
+                <p:ph idx="1"/>
+              </p:nvPr>
+            </p:nvSpPr>
+            <p:spPr>
+              <a:xfrm>
+                <a:off x="1077687" y="2248664"/>
+                <a:ext cx="10418988" cy="4286531"/>
+              </a:xfrm>
+              <a:ln>
+                <a:solidFill>
+                  <a:schemeClr val="bg2">
+                    <a:lumMod val="20000"/>
+                    <a:lumOff val="80000"/>
+                  </a:schemeClr>
+                </a:solidFill>
+              </a:ln>
+            </p:spPr>
+            <p:txBody>
+              <a:bodyPr>
+                <a:normAutofit/>
+              </a:bodyPr>
+              <a:lstStyle/>
+              <a:p>
+                <a:pPr marL="182880" lvl="1" indent="0">
+                  <a:buNone/>
+                </a:pPr>
+                <a:r>
+                  <a:rPr lang="en-US" sz="2800" dirty="0"/>
+                  <a:t>Case Study Description</a:t>
+                </a:r>
+              </a:p>
+              <a:p>
+                <a:pPr lvl="1"/>
+                <a:r>
+                  <a:rPr lang="en-US" dirty="0"/>
+                  <a:t>Distributed Storage and Solar PV Units randomly added to </a:t>
+                </a:r>
+                <a14:m>
+                  <m:oMath xmlns:m="http://schemas.openxmlformats.org/officeDocument/2006/math">
+                    <m:r>
+                      <a:rPr lang="en-US" b="0" i="1" smtClean="0">
+                        <a:latin typeface="Cambria Math" panose="02040503050406030204" pitchFamily="18" charset="0"/>
+                      </a:rPr>
+                      <m:t>16</m:t>
+                    </m:r>
+                  </m:oMath>
+                </a14:m>
+                <a:r>
+                  <a:rPr lang="en-US" b="0" dirty="0"/>
+                  <a:t> nodes</a:t>
+                </a:r>
+              </a:p>
+              <a:p>
+                <a:pPr lvl="2"/>
+                <a:r>
+                  <a:rPr lang="en-US" dirty="0"/>
+                  <a:t>They can supply active and reactive power through four quadrant operation.</a:t>
+                </a:r>
+              </a:p>
+              <a:p>
+                <a:pPr lvl="2"/>
+                <a:r>
+                  <a:rPr lang="en-US" dirty="0"/>
+                  <a:t>Each storage unit has capacity </a:t>
+                </a:r>
+                <a14:m>
+                  <m:oMath xmlns:m="http://schemas.openxmlformats.org/officeDocument/2006/math">
+                    <m:r>
+                      <a:rPr lang="en-US" b="0" i="1" smtClean="0">
+                        <a:latin typeface="Cambria Math" panose="02040503050406030204" pitchFamily="18" charset="0"/>
+                      </a:rPr>
+                      <m:t>=40</m:t>
+                    </m:r>
+                    <m:r>
+                      <a:rPr lang="en-US" b="0" i="1" smtClean="0">
+                        <a:latin typeface="Cambria Math" panose="02040503050406030204" pitchFamily="18" charset="0"/>
+                      </a:rPr>
+                      <m:t>𝑘𝑊h</m:t>
+                    </m:r>
+                  </m:oMath>
+                </a14:m>
+                <a:r>
+                  <a:rPr lang="en-US" dirty="0"/>
+                  <a:t> and apparent power rating </a:t>
+                </a:r>
+                <a14:m>
+                  <m:oMath xmlns:m="http://schemas.openxmlformats.org/officeDocument/2006/math">
+                    <m:r>
+                      <a:rPr lang="en-US" b="0" i="1" smtClean="0">
+                        <a:latin typeface="Cambria Math" panose="02040503050406030204" pitchFamily="18" charset="0"/>
+                      </a:rPr>
+                      <m:t>=50</m:t>
+                    </m:r>
+                    <m:r>
+                      <a:rPr lang="en-US" b="0" i="1" smtClean="0">
+                        <a:latin typeface="Cambria Math" panose="02040503050406030204" pitchFamily="18" charset="0"/>
+                      </a:rPr>
+                      <m:t>𝑘𝑉𝐴</m:t>
+                    </m:r>
+                  </m:oMath>
+                </a14:m>
+                <a:endParaRPr lang="en-US" dirty="0"/>
+              </a:p>
+              <a:p>
+                <a:pPr lvl="2"/>
+                <a:r>
+                  <a:rPr lang="en-US" dirty="0"/>
+                  <a:t>Each solar PV unit has a rating </a:t>
+                </a:r>
+                <a14:m>
+                  <m:oMath xmlns:m="http://schemas.openxmlformats.org/officeDocument/2006/math">
+                    <m:r>
+                      <a:rPr lang="en-US" b="0" i="1" smtClean="0">
+                        <a:latin typeface="Cambria Math" panose="02040503050406030204" pitchFamily="18" charset="0"/>
+                      </a:rPr>
+                      <m:t>=100</m:t>
+                    </m:r>
+                    <m:r>
+                      <a:rPr lang="en-US" b="0" i="1" smtClean="0">
+                        <a:latin typeface="Cambria Math" panose="02040503050406030204" pitchFamily="18" charset="0"/>
+                      </a:rPr>
+                      <m:t>𝑘𝑉𝐴</m:t>
+                    </m:r>
+                  </m:oMath>
+                </a14:m>
+                <a:endParaRPr lang="en-US" dirty="0"/>
+              </a:p>
+              <a:p>
+                <a:pPr lvl="1"/>
+                <a:endParaRPr lang="en-US" dirty="0"/>
+              </a:p>
+              <a:p>
+                <a:pPr lvl="1"/>
+                <a:r>
+                  <a:rPr lang="en-US" dirty="0"/>
+                  <a:t>Solar and Load Profile prediction horizon </a:t>
+                </a:r>
+                <a14:m>
+                  <m:oMath xmlns:m="http://schemas.openxmlformats.org/officeDocument/2006/math">
+                    <m:r>
+                      <a:rPr lang="en-US" b="0" i="1" smtClean="0">
+                        <a:latin typeface="Cambria Math" panose="02040503050406030204" pitchFamily="18" charset="0"/>
+                      </a:rPr>
+                      <m:t>30 </m:t>
+                    </m:r>
+                    <m:r>
+                      <a:rPr lang="en-US" b="0" i="1" smtClean="0">
+                        <a:latin typeface="Cambria Math" panose="02040503050406030204" pitchFamily="18" charset="0"/>
+                      </a:rPr>
+                      <m:t>𝑠𝑡𝑒𝑝𝑠</m:t>
+                    </m:r>
+                    <m:r>
+                      <a:rPr lang="en-US" b="0" i="0" smtClean="0">
+                        <a:latin typeface="Cambria Math" panose="02040503050406030204" pitchFamily="18" charset="0"/>
+                      </a:rPr>
+                      <m:t>=30 </m:t>
+                    </m:r>
+                    <m:r>
+                      <a:rPr lang="en-US" b="0" i="1" smtClean="0">
+                        <a:latin typeface="Cambria Math" panose="02040503050406030204" pitchFamily="18" charset="0"/>
+                      </a:rPr>
+                      <m:t>𝑚𝑖𝑛</m:t>
+                    </m:r>
+                    <m:r>
+                      <a:rPr lang="en-US" b="0" i="0" smtClean="0">
+                        <a:latin typeface="Cambria Math" panose="02040503050406030204" pitchFamily="18" charset="0"/>
+                      </a:rPr>
+                      <m:t>.</m:t>
+                    </m:r>
+                  </m:oMath>
+                </a14:m>
+                <a:endParaRPr lang="en-US" dirty="0"/>
+              </a:p>
+              <a:p>
+                <a:pPr lvl="2"/>
+                <a:r>
+                  <a:rPr lang="en-US" dirty="0"/>
+                  <a:t>Each step </a:t>
+                </a:r>
+                <a14:m>
+                  <m:oMath xmlns:m="http://schemas.openxmlformats.org/officeDocument/2006/math">
+                    <m:r>
+                      <a:rPr lang="en-US" b="0" i="1" smtClean="0">
+                        <a:latin typeface="Cambria Math" panose="02040503050406030204" pitchFamily="18" charset="0"/>
+                      </a:rPr>
+                      <m:t>=1 </m:t>
+                    </m:r>
+                    <m:r>
+                      <a:rPr lang="en-US" b="0" i="1" smtClean="0">
+                        <a:latin typeface="Cambria Math" panose="02040503050406030204" pitchFamily="18" charset="0"/>
+                      </a:rPr>
+                      <m:t>𝑚𝑖𝑛</m:t>
+                    </m:r>
+                    <m:r>
+                      <a:rPr lang="en-US" b="0" i="1" smtClean="0">
+                        <a:latin typeface="Cambria Math" panose="02040503050406030204" pitchFamily="18" charset="0"/>
+                      </a:rPr>
+                      <m:t>.</m:t>
+                    </m:r>
+                  </m:oMath>
+                </a14:m>
+                <a:endParaRPr lang="en-US" dirty="0"/>
+              </a:p>
+              <a:p>
+                <a:pPr marL="182880" lvl="1" indent="0">
+                  <a:buNone/>
+                </a:pPr>
+                <a:endParaRPr lang="en-US" dirty="0"/>
+              </a:p>
+              <a:p>
+                <a:pPr marL="182880" lvl="1" indent="0">
+                  <a:buNone/>
+                </a:pPr>
+                <a:endParaRPr lang="en-US" dirty="0"/>
+              </a:p>
+            </p:txBody>
+          </p:sp>
+        </mc:Choice>
+        <mc:Fallback xmlns="">
+          <p:sp>
+            <p:nvSpPr>
+              <p:cNvPr id="3" name="Content Placeholder 2">
+                <a:extLst>
+                  <a:ext uri="{FF2B5EF4-FFF2-40B4-BE49-F238E27FC236}">
+                    <a16:creationId xmlns:a16="http://schemas.microsoft.com/office/drawing/2014/main" id="{64BE6767-30AA-41AB-8C0B-29F30741AF76}"/>
+                  </a:ext>
+                </a:extLst>
+              </p:cNvPr>
+              <p:cNvSpPr>
+                <a:spLocks noGrp="1" noRot="1" noChangeAspect="1" noMove="1" noResize="1" noEditPoints="1" noAdjustHandles="1" noChangeArrowheads="1" noChangeShapeType="1" noTextEdit="1"/>
+              </p:cNvSpPr>
+              <p:nvPr>
+                <p:ph idx="1"/>
+              </p:nvPr>
+            </p:nvSpPr>
+            <p:spPr>
+              <a:xfrm>
+                <a:off x="1077687" y="2248664"/>
+                <a:ext cx="10418988" cy="4286531"/>
+              </a:xfrm>
+              <a:blipFill>
+                <a:blip r:embed="rId2"/>
+                <a:stretch>
+                  <a:fillRect l="-292" t="-3262"/>
+                </a:stretch>
+              </a:blipFill>
+              <a:ln>
+                <a:solidFill>
+                  <a:schemeClr val="bg2">
+                    <a:lumMod val="20000"/>
+                    <a:lumOff val="80000"/>
+                  </a:schemeClr>
+                </a:solidFill>
+              </a:ln>
+            </p:spPr>
+            <p:txBody>
+              <a:bodyPr/>
+              <a:lstStyle/>
+              <a:p>
+                <a:r>
+                  <a:rPr lang="en-US">
+                    <a:noFill/>
+                  </a:rPr>
+                  <a:t> </a:t>
+                </a:r>
+              </a:p>
+            </p:txBody>
+          </p:sp>
+        </mc:Fallback>
+      </mc:AlternateContent>
+      <p:sp>
+        <p:nvSpPr>
+          <p:cNvPr id="2" name="Title 1">
+            <a:extLst>
+              <a:ext uri="{FF2B5EF4-FFF2-40B4-BE49-F238E27FC236}">
+                <a16:creationId xmlns:a16="http://schemas.microsoft.com/office/drawing/2014/main" id="{45DF1785-83CB-4F7A-820B-C600AC43B067}"/>
+              </a:ext>
+            </a:extLst>
+          </p:cNvPr>
+          <p:cNvSpPr>
+            <a:spLocks noGrp="1"/>
+          </p:cNvSpPr>
+          <p:nvPr>
+            <p:ph type="title"/>
+          </p:nvPr>
+        </p:nvSpPr>
+        <p:spPr>
+          <a:xfrm>
+            <a:off x="1064418" y="376654"/>
+            <a:ext cx="10063163" cy="1015584"/>
+          </a:xfrm>
+          <a:ln w="38100">
+            <a:solidFill>
+              <a:schemeClr val="bg2">
+                <a:lumMod val="40000"/>
+                <a:lumOff val="60000"/>
+              </a:schemeClr>
+            </a:solidFill>
+          </a:ln>
+        </p:spPr>
+        <p:txBody>
+          <a:bodyPr>
+            <a:normAutofit fontScale="90000"/>
+          </a:bodyPr>
+          <a:lstStyle/>
+          <a:p>
+            <a:r>
+              <a:rPr lang="en-US" b="0" dirty="0">
+                <a:latin typeface="Times New Roman" panose="02020603050405020304" pitchFamily="18" charset="0"/>
+                <a:cs typeface="Times New Roman" panose="02020603050405020304" pitchFamily="18" charset="0"/>
+              </a:rPr>
+              <a:t>Optimal Multi-Period Dispatch of Distributed Energy Resources in Unbalanced Distribution Feeders</a:t>
+            </a:r>
+          </a:p>
+        </p:txBody>
+      </p:sp>
+    </p:spTree>
+    <p:extLst>
+      <p:ext uri="{BB962C8B-B14F-4D97-AF65-F5344CB8AC3E}">
+        <p14:creationId xmlns:p14="http://schemas.microsoft.com/office/powerpoint/2010/main" val="3721111440"/>
+      </p:ext>
+    </p:extLst>
+  </p:cSld>
+  <p:clrMapOvr>
+    <a:masterClrMapping/>
+  </p:clrMapOvr>
+</p:sld>
+</file>
+
+<file path=ppt/slides/slide13.xml><?xml version="1.0" encoding="utf-8"?>
+<p:sld xmlns:a="http://schemas.openxmlformats.org/drawingml/2006/main" xmlns:r="http://schemas.openxmlformats.org/officeDocument/2006/relationships" xmlns:p="http://schemas.openxmlformats.org/presentationml/2006/main">
+  <p:cSld>
+    <p:spTree>
+      <p:nvGrpSpPr>
+        <p:cNvPr id="1" name=""/>
+        <p:cNvGrpSpPr/>
+        <p:nvPr/>
+      </p:nvGrpSpPr>
+      <p:grpSpPr>
+        <a:xfrm>
+          <a:off x="0" y="0"/>
+          <a:ext cx="0" cy="0"/>
+          <a:chOff x="0" y="0"/>
+          <a:chExt cx="0" cy="0"/>
+        </a:xfrm>
+      </p:grpSpPr>
+      <mc:AlternateContent xmlns:mc="http://schemas.openxmlformats.org/markup-compatibility/2006" xmlns:a14="http://schemas.microsoft.com/office/drawing/2010/main">
+        <mc:Choice Requires="a14">
+          <p:sp>
+            <p:nvSpPr>
+              <p:cNvPr id="3" name="Content Placeholder 2">
+                <a:extLst>
+                  <a:ext uri="{FF2B5EF4-FFF2-40B4-BE49-F238E27FC236}">
+                    <a16:creationId xmlns:a16="http://schemas.microsoft.com/office/drawing/2014/main" id="{64BE6767-30AA-41AB-8C0B-29F30741AF76}"/>
+                  </a:ext>
+                </a:extLst>
+              </p:cNvPr>
+              <p:cNvSpPr>
+                <a:spLocks noGrp="1"/>
+              </p:cNvSpPr>
+              <p:nvPr>
+                <p:ph idx="1"/>
+              </p:nvPr>
+            </p:nvSpPr>
+            <p:spPr>
+              <a:xfrm>
+                <a:off x="1077687" y="2248664"/>
+                <a:ext cx="10418988" cy="4286531"/>
+              </a:xfrm>
+              <a:ln>
+                <a:solidFill>
+                  <a:schemeClr val="bg2">
+                    <a:lumMod val="20000"/>
+                    <a:lumOff val="80000"/>
+                  </a:schemeClr>
+                </a:solidFill>
+              </a:ln>
+            </p:spPr>
+            <p:txBody>
+              <a:bodyPr>
+                <a:normAutofit/>
+              </a:bodyPr>
+              <a:lstStyle/>
+              <a:p>
+                <a:pPr marL="182880" lvl="1" indent="0">
+                  <a:buNone/>
+                </a:pPr>
+                <a:r>
+                  <a:rPr lang="en-US" sz="2800" dirty="0"/>
+                  <a:t>Case Study Description</a:t>
+                </a:r>
+              </a:p>
+              <a:p>
+                <a:pPr lvl="1"/>
+                <a:r>
+                  <a:rPr lang="en-US" dirty="0"/>
+                  <a:t>Three-phase OPF is run in a receding horizon fashion with prediction horizon of </a:t>
+                </a:r>
+                <a14:m>
+                  <m:oMath xmlns:m="http://schemas.openxmlformats.org/officeDocument/2006/math">
+                    <m:r>
+                      <a:rPr lang="en-US" b="0" i="1" smtClean="0">
+                        <a:latin typeface="Cambria Math" panose="02040503050406030204" pitchFamily="18" charset="0"/>
+                      </a:rPr>
+                      <m:t>30</m:t>
+                    </m:r>
+                  </m:oMath>
+                </a14:m>
+                <a:r>
+                  <a:rPr lang="en-US" dirty="0"/>
+                  <a:t> time-steps, for the dispatch of controllable assets of the network to </a:t>
+                </a:r>
+                <a:r>
+                  <a:rPr lang="en-US" b="1" dirty="0"/>
+                  <a:t>minimize network losses.</a:t>
+                </a:r>
+              </a:p>
+              <a:p>
+                <a:pPr lvl="1"/>
+                <a:endParaRPr lang="en-US" b="1" dirty="0"/>
+              </a:p>
+              <a:p>
+                <a:pPr lvl="1"/>
+                <a:r>
+                  <a:rPr lang="en-US" dirty="0"/>
+                  <a:t>Set-points provided by the solutions of the SOCP are used to initialize an NLP to provide a feasible solution.</a:t>
+                </a:r>
+              </a:p>
+              <a:p>
+                <a:pPr lvl="2"/>
+                <a:r>
+                  <a:rPr lang="en-US" dirty="0"/>
+                  <a:t>SOCP modeled in </a:t>
+                </a:r>
+                <a:r>
+                  <a:rPr lang="en-US" dirty="0" err="1">
+                    <a:solidFill>
+                      <a:srgbClr val="C2A1D3"/>
+                    </a:solidFill>
+                  </a:rPr>
+                  <a:t>JuMP</a:t>
+                </a:r>
+                <a:r>
+                  <a:rPr lang="en-US" dirty="0"/>
+                  <a:t>, with </a:t>
+                </a:r>
+                <a:r>
+                  <a:rPr lang="en-US" dirty="0">
+                    <a:solidFill>
+                      <a:srgbClr val="C2A1D3"/>
+                    </a:solidFill>
+                  </a:rPr>
+                  <a:t>Julia</a:t>
+                </a:r>
+                <a:r>
+                  <a:rPr lang="en-US" dirty="0"/>
+                  <a:t> and solved using GUROBI.</a:t>
+                </a:r>
+              </a:p>
+              <a:p>
+                <a:pPr lvl="3"/>
+                <a:r>
+                  <a:rPr lang="en-US" dirty="0"/>
+                  <a:t>Multi-period SOCP has</a:t>
+                </a:r>
+              </a:p>
+              <a:p>
+                <a:pPr lvl="4"/>
+                <a14:m>
+                  <m:oMath xmlns:m="http://schemas.openxmlformats.org/officeDocument/2006/math">
+                    <m:r>
+                      <a:rPr lang="en-US" i="1" dirty="0" smtClean="0">
+                        <a:latin typeface="Cambria Math" panose="02040503050406030204" pitchFamily="18" charset="0"/>
+                      </a:rPr>
+                      <m:t>108</m:t>
+                    </m:r>
+                  </m:oMath>
+                </a14:m>
+                <a:r>
+                  <a:rPr lang="en-US" i="0" dirty="0">
+                    <a:latin typeface="+mj-lt"/>
+                  </a:rPr>
+                  <a:t>k</a:t>
+                </a:r>
+                <a14:m>
+                  <m:oMath xmlns:m="http://schemas.openxmlformats.org/officeDocument/2006/math">
+                    <m:r>
+                      <a:rPr lang="en-US" i="1" dirty="0">
+                        <a:latin typeface="Cambria Math" panose="02040503050406030204" pitchFamily="18" charset="0"/>
+                      </a:rPr>
+                      <m:t> </m:t>
+                    </m:r>
+                  </m:oMath>
+                </a14:m>
+                <a:r>
+                  <a:rPr lang="en-US" dirty="0"/>
+                  <a:t>variables (k as in thousand)</a:t>
+                </a:r>
+              </a:p>
+              <a:p>
+                <a:pPr lvl="4"/>
+                <a14:m>
+                  <m:oMath xmlns:m="http://schemas.openxmlformats.org/officeDocument/2006/math">
+                    <m:r>
+                      <a:rPr lang="en-US" i="1" dirty="0" smtClean="0">
+                        <a:latin typeface="Cambria Math" panose="02040503050406030204" pitchFamily="18" charset="0"/>
+                      </a:rPr>
+                      <m:t>48</m:t>
+                    </m:r>
+                  </m:oMath>
+                </a14:m>
+                <a:r>
+                  <a:rPr lang="en-US" i="0" dirty="0">
+                    <a:latin typeface="+mj-lt"/>
+                  </a:rPr>
+                  <a:t>k</a:t>
+                </a:r>
+                <a:r>
+                  <a:rPr lang="en-US" dirty="0"/>
+                  <a:t> linear constraints</a:t>
+                </a:r>
+              </a:p>
+              <a:p>
+                <a:pPr lvl="4"/>
+                <a14:m>
+                  <m:oMath xmlns:m="http://schemas.openxmlformats.org/officeDocument/2006/math">
+                    <m:r>
+                      <a:rPr lang="en-US" i="1" dirty="0" smtClean="0">
+                        <a:latin typeface="Cambria Math" panose="02040503050406030204" pitchFamily="18" charset="0"/>
+                      </a:rPr>
+                      <m:t>81</m:t>
+                    </m:r>
+                  </m:oMath>
+                </a14:m>
+                <a:r>
+                  <a:rPr lang="en-US" i="0" dirty="0">
+                    <a:latin typeface="+mj-lt"/>
+                  </a:rPr>
+                  <a:t>k</a:t>
+                </a:r>
+                <a:r>
+                  <a:rPr lang="en-US" dirty="0"/>
+                  <a:t> SOC constraints</a:t>
+                </a:r>
+              </a:p>
+              <a:p>
+                <a:pPr marL="182880" lvl="1" indent="0">
+                  <a:buNone/>
+                </a:pPr>
+                <a:endParaRPr lang="en-US" dirty="0"/>
+              </a:p>
+              <a:p>
+                <a:pPr marL="182880" lvl="1" indent="0">
+                  <a:buNone/>
+                </a:pPr>
+                <a:endParaRPr lang="en-US" dirty="0"/>
+              </a:p>
+            </p:txBody>
+          </p:sp>
+        </mc:Choice>
+        <mc:Fallback xmlns="">
+          <p:sp>
+            <p:nvSpPr>
+              <p:cNvPr id="3" name="Content Placeholder 2">
+                <a:extLst>
+                  <a:ext uri="{FF2B5EF4-FFF2-40B4-BE49-F238E27FC236}">
+                    <a16:creationId xmlns:a16="http://schemas.microsoft.com/office/drawing/2014/main" id="{64BE6767-30AA-41AB-8C0B-29F30741AF76}"/>
+                  </a:ext>
+                </a:extLst>
+              </p:cNvPr>
+              <p:cNvSpPr>
+                <a:spLocks noGrp="1" noRot="1" noChangeAspect="1" noMove="1" noResize="1" noEditPoints="1" noAdjustHandles="1" noChangeArrowheads="1" noChangeShapeType="1" noTextEdit="1"/>
+              </p:cNvSpPr>
+              <p:nvPr>
+                <p:ph idx="1"/>
+              </p:nvPr>
+            </p:nvSpPr>
+            <p:spPr>
+              <a:xfrm>
+                <a:off x="1077687" y="2248664"/>
+                <a:ext cx="10418988" cy="4286531"/>
+              </a:xfrm>
+              <a:blipFill>
+                <a:blip r:embed="rId3"/>
+                <a:stretch>
+                  <a:fillRect l="-292" t="-3262" r="-1227"/>
+                </a:stretch>
+              </a:blipFill>
+              <a:ln>
+                <a:solidFill>
+                  <a:schemeClr val="bg2">
+                    <a:lumMod val="20000"/>
+                    <a:lumOff val="80000"/>
+                  </a:schemeClr>
+                </a:solidFill>
+              </a:ln>
+            </p:spPr>
+            <p:txBody>
+              <a:bodyPr/>
+              <a:lstStyle/>
+              <a:p>
+                <a:r>
+                  <a:rPr lang="en-US">
+                    <a:noFill/>
+                  </a:rPr>
+                  <a:t> </a:t>
+                </a:r>
+              </a:p>
+            </p:txBody>
+          </p:sp>
+        </mc:Fallback>
+      </mc:AlternateContent>
+      <p:sp>
+        <p:nvSpPr>
+          <p:cNvPr id="2" name="Title 1">
+            <a:extLst>
+              <a:ext uri="{FF2B5EF4-FFF2-40B4-BE49-F238E27FC236}">
+                <a16:creationId xmlns:a16="http://schemas.microsoft.com/office/drawing/2014/main" id="{45DF1785-83CB-4F7A-820B-C600AC43B067}"/>
+              </a:ext>
+            </a:extLst>
+          </p:cNvPr>
+          <p:cNvSpPr>
+            <a:spLocks noGrp="1"/>
+          </p:cNvSpPr>
+          <p:nvPr>
+            <p:ph type="title"/>
+          </p:nvPr>
+        </p:nvSpPr>
+        <p:spPr>
+          <a:xfrm>
+            <a:off x="1064418" y="376654"/>
+            <a:ext cx="10063163" cy="1015584"/>
+          </a:xfrm>
+          <a:ln w="38100">
+            <a:solidFill>
+              <a:schemeClr val="bg2">
+                <a:lumMod val="40000"/>
+                <a:lumOff val="60000"/>
+              </a:schemeClr>
+            </a:solidFill>
+          </a:ln>
+        </p:spPr>
+        <p:txBody>
+          <a:bodyPr>
+            <a:normAutofit fontScale="90000"/>
+          </a:bodyPr>
+          <a:lstStyle/>
+          <a:p>
+            <a:r>
+              <a:rPr lang="en-US" b="0" dirty="0">
+                <a:latin typeface="Times New Roman" panose="02020603050405020304" pitchFamily="18" charset="0"/>
+                <a:cs typeface="Times New Roman" panose="02020603050405020304" pitchFamily="18" charset="0"/>
+              </a:rPr>
+              <a:t>Optimal Multi-Period Dispatch of Distributed Energy Resources in Unbalanced Distribution Feeders</a:t>
+            </a:r>
+          </a:p>
+        </p:txBody>
+      </p:sp>
+    </p:spTree>
+    <p:extLst>
+      <p:ext uri="{BB962C8B-B14F-4D97-AF65-F5344CB8AC3E}">
+        <p14:creationId xmlns:p14="http://schemas.microsoft.com/office/powerpoint/2010/main" val="3718739487"/>
+      </p:ext>
+    </p:extLst>
+  </p:cSld>
+  <p:clrMapOvr>
+    <a:masterClrMapping/>
+  </p:clrMapOvr>
+</p:sld>
+</file>
+
+<file path=ppt/slides/slide14.xml><?xml version="1.0" encoding="utf-8"?>
+<p:sld xmlns:a="http://schemas.openxmlformats.org/drawingml/2006/main" xmlns:r="http://schemas.openxmlformats.org/officeDocument/2006/relationships" xmlns:p="http://schemas.openxmlformats.org/presentationml/2006/main">
+  <p:cSld>
+    <p:spTree>
+      <p:nvGrpSpPr>
+        <p:cNvPr id="1" name=""/>
+        <p:cNvGrpSpPr/>
+        <p:nvPr/>
+      </p:nvGrpSpPr>
+      <p:grpSpPr>
+        <a:xfrm>
+          <a:off x="0" y="0"/>
+          <a:ext cx="0" cy="0"/>
+          <a:chOff x="0" y="0"/>
+          <a:chExt cx="0" cy="0"/>
+        </a:xfrm>
+      </p:grpSpPr>
+      <mc:AlternateContent xmlns:mc="http://schemas.openxmlformats.org/markup-compatibility/2006" xmlns:a14="http://schemas.microsoft.com/office/drawing/2010/main">
+        <mc:Choice Requires="a14">
+          <p:sp>
+            <p:nvSpPr>
+              <p:cNvPr id="3" name="Content Placeholder 2">
+                <a:extLst>
+                  <a:ext uri="{FF2B5EF4-FFF2-40B4-BE49-F238E27FC236}">
+                    <a16:creationId xmlns:a16="http://schemas.microsoft.com/office/drawing/2014/main" id="{64BE6767-30AA-41AB-8C0B-29F30741AF76}"/>
+                  </a:ext>
+                </a:extLst>
+              </p:cNvPr>
+              <p:cNvSpPr>
+                <a:spLocks noGrp="1"/>
+              </p:cNvSpPr>
+              <p:nvPr>
+                <p:ph idx="1"/>
+              </p:nvPr>
+            </p:nvSpPr>
+            <p:spPr>
+              <a:xfrm>
+                <a:off x="1077687" y="2248664"/>
+                <a:ext cx="10418988" cy="4286531"/>
+              </a:xfrm>
+              <a:ln>
+                <a:solidFill>
+                  <a:schemeClr val="bg2">
+                    <a:lumMod val="20000"/>
+                    <a:lumOff val="80000"/>
+                  </a:schemeClr>
+                </a:solidFill>
+              </a:ln>
+            </p:spPr>
+            <p:txBody>
+              <a:bodyPr>
+                <a:normAutofit/>
+              </a:bodyPr>
+              <a:lstStyle/>
+              <a:p>
+                <a:pPr marL="182880" lvl="1" indent="0">
+                  <a:buNone/>
+                </a:pPr>
+                <a:r>
+                  <a:rPr lang="en-US" sz="2800" dirty="0"/>
+                  <a:t>Case Study Description</a:t>
+                </a:r>
+              </a:p>
+              <a:p>
+                <a:pPr lvl="2"/>
+                <a:r>
+                  <a:rPr lang="en-US" dirty="0"/>
+                  <a:t>NLP also modeled in </a:t>
+                </a:r>
+                <a:r>
+                  <a:rPr lang="en-US" dirty="0" err="1">
+                    <a:solidFill>
+                      <a:srgbClr val="C2A1D3"/>
+                    </a:solidFill>
+                  </a:rPr>
+                  <a:t>JuMP</a:t>
+                </a:r>
+                <a:r>
+                  <a:rPr lang="en-US" dirty="0"/>
+                  <a:t>, but solved using IPOPT </a:t>
+                </a:r>
+                <a:r>
+                  <a:rPr lang="en-US" dirty="0">
+                    <a:hlinkClick r:id="rId3" action="ppaction://hlinksldjump"/>
+                  </a:rPr>
+                  <a:t>[36] </a:t>
+                </a:r>
+                <a:r>
+                  <a:rPr lang="en-US" dirty="0"/>
+                  <a:t>using the HSL_MA86 solver </a:t>
+                </a:r>
+                <a:r>
+                  <a:rPr lang="en-US" dirty="0">
+                    <a:hlinkClick r:id="rId3" action="ppaction://hlinksldjump"/>
+                  </a:rPr>
+                  <a:t>[37]</a:t>
+                </a:r>
+                <a:endParaRPr lang="en-US" dirty="0"/>
+              </a:p>
+              <a:p>
+                <a:pPr lvl="3"/>
+                <a:r>
+                  <a:rPr lang="en-US" dirty="0"/>
+                  <a:t>A single-period of the Multi-period SOCP has</a:t>
+                </a:r>
+              </a:p>
+              <a:p>
+                <a:pPr lvl="4"/>
+                <a14:m>
+                  <m:oMath xmlns:m="http://schemas.openxmlformats.org/officeDocument/2006/math">
+                    <m:r>
+                      <a:rPr lang="en-US" b="0" i="1" dirty="0" smtClean="0">
+                        <a:latin typeface="Cambria Math" panose="02040503050406030204" pitchFamily="18" charset="0"/>
+                      </a:rPr>
+                      <m:t>3.6</m:t>
+                    </m:r>
+                  </m:oMath>
+                </a14:m>
+                <a:r>
+                  <a:rPr lang="en-US" i="0" dirty="0">
+                    <a:latin typeface="+mj-lt"/>
+                  </a:rPr>
+                  <a:t>k</a:t>
+                </a:r>
+                <a14:m>
+                  <m:oMath xmlns:m="http://schemas.openxmlformats.org/officeDocument/2006/math">
+                    <m:r>
+                      <a:rPr lang="en-US" i="1" dirty="0">
+                        <a:latin typeface="Cambria Math" panose="02040503050406030204" pitchFamily="18" charset="0"/>
+                      </a:rPr>
+                      <m:t> </m:t>
+                    </m:r>
+                  </m:oMath>
+                </a14:m>
+                <a:r>
+                  <a:rPr lang="en-US" dirty="0"/>
+                  <a:t>variables </a:t>
+                </a:r>
+              </a:p>
+              <a:p>
+                <a:pPr lvl="4"/>
+                <a14:m>
+                  <m:oMath xmlns:m="http://schemas.openxmlformats.org/officeDocument/2006/math">
+                    <m:r>
+                      <a:rPr lang="en-US" b="0" i="1" dirty="0" smtClean="0">
+                        <a:latin typeface="Cambria Math" panose="02040503050406030204" pitchFamily="18" charset="0"/>
+                      </a:rPr>
+                      <m:t>1.6</m:t>
+                    </m:r>
+                  </m:oMath>
+                </a14:m>
+                <a:r>
+                  <a:rPr lang="en-US" i="0" dirty="0">
+                    <a:latin typeface="+mj-lt"/>
+                  </a:rPr>
+                  <a:t>k</a:t>
+                </a:r>
+                <a:r>
+                  <a:rPr lang="en-US" dirty="0"/>
+                  <a:t> linear constraints</a:t>
+                </a:r>
+              </a:p>
+              <a:p>
+                <a:pPr lvl="4"/>
+                <a14:m>
+                  <m:oMath xmlns:m="http://schemas.openxmlformats.org/officeDocument/2006/math">
+                    <m:r>
+                      <a:rPr lang="en-US" b="0" i="1" dirty="0" smtClean="0">
+                        <a:latin typeface="Cambria Math" panose="02040503050406030204" pitchFamily="18" charset="0"/>
+                      </a:rPr>
+                      <m:t>0.7</m:t>
+                    </m:r>
+                  </m:oMath>
+                </a14:m>
+                <a:r>
+                  <a:rPr lang="en-US" i="0" dirty="0">
+                    <a:latin typeface="+mj-lt"/>
+                  </a:rPr>
+                  <a:t>k</a:t>
+                </a:r>
+                <a:r>
+                  <a:rPr lang="en-US" dirty="0"/>
+                  <a:t> SOC constraints</a:t>
+                </a:r>
+              </a:p>
+              <a:p>
+                <a:pPr lvl="4"/>
+                <a14:m>
+                  <m:oMath xmlns:m="http://schemas.openxmlformats.org/officeDocument/2006/math">
+                    <m:r>
+                      <a:rPr lang="en-US" b="0" i="1" smtClean="0">
+                        <a:latin typeface="Cambria Math" panose="02040503050406030204" pitchFamily="18" charset="0"/>
+                      </a:rPr>
+                      <m:t>2</m:t>
+                    </m:r>
+                  </m:oMath>
+                </a14:m>
+                <a:r>
+                  <a:rPr lang="en-US" dirty="0"/>
+                  <a:t>k non-linear constraints</a:t>
+                </a:r>
+              </a:p>
+              <a:p>
+                <a:pPr marL="182880" lvl="1" indent="0">
+                  <a:buNone/>
+                </a:pPr>
+                <a:endParaRPr lang="en-US" dirty="0"/>
+              </a:p>
+              <a:p>
+                <a:pPr marL="182880" lvl="1" indent="0">
+                  <a:buNone/>
+                </a:pPr>
+                <a:endParaRPr lang="en-US" dirty="0"/>
+              </a:p>
+            </p:txBody>
+          </p:sp>
+        </mc:Choice>
+        <mc:Fallback xmlns="">
+          <p:sp>
+            <p:nvSpPr>
+              <p:cNvPr id="3" name="Content Placeholder 2">
+                <a:extLst>
+                  <a:ext uri="{FF2B5EF4-FFF2-40B4-BE49-F238E27FC236}">
+                    <a16:creationId xmlns:a16="http://schemas.microsoft.com/office/drawing/2014/main" id="{64BE6767-30AA-41AB-8C0B-29F30741AF76}"/>
+                  </a:ext>
+                </a:extLst>
+              </p:cNvPr>
+              <p:cNvSpPr>
+                <a:spLocks noGrp="1" noRot="1" noChangeAspect="1" noMove="1" noResize="1" noEditPoints="1" noAdjustHandles="1" noChangeArrowheads="1" noChangeShapeType="1" noTextEdit="1"/>
+              </p:cNvSpPr>
+              <p:nvPr>
+                <p:ph idx="1"/>
+              </p:nvPr>
+            </p:nvSpPr>
+            <p:spPr>
+              <a:xfrm>
+                <a:off x="1077687" y="2248664"/>
+                <a:ext cx="10418988" cy="4286531"/>
+              </a:xfrm>
+              <a:blipFill>
+                <a:blip r:embed="rId4"/>
+                <a:stretch>
+                  <a:fillRect l="-292" t="-3262"/>
+                </a:stretch>
+              </a:blipFill>
+              <a:ln>
+                <a:solidFill>
+                  <a:schemeClr val="bg2">
+                    <a:lumMod val="20000"/>
+                    <a:lumOff val="80000"/>
+                  </a:schemeClr>
+                </a:solidFill>
+              </a:ln>
+            </p:spPr>
+            <p:txBody>
+              <a:bodyPr/>
+              <a:lstStyle/>
+              <a:p>
+                <a:r>
+                  <a:rPr lang="en-US">
+                    <a:noFill/>
+                  </a:rPr>
+                  <a:t> </a:t>
+                </a:r>
+              </a:p>
+            </p:txBody>
+          </p:sp>
+        </mc:Fallback>
+      </mc:AlternateContent>
+      <p:sp>
+        <p:nvSpPr>
+          <p:cNvPr id="2" name="Title 1">
+            <a:extLst>
+              <a:ext uri="{FF2B5EF4-FFF2-40B4-BE49-F238E27FC236}">
+                <a16:creationId xmlns:a16="http://schemas.microsoft.com/office/drawing/2014/main" id="{45DF1785-83CB-4F7A-820B-C600AC43B067}"/>
+              </a:ext>
+            </a:extLst>
+          </p:cNvPr>
+          <p:cNvSpPr>
+            <a:spLocks noGrp="1"/>
+          </p:cNvSpPr>
+          <p:nvPr>
+            <p:ph type="title"/>
+          </p:nvPr>
+        </p:nvSpPr>
+        <p:spPr>
+          <a:xfrm>
+            <a:off x="1064418" y="376654"/>
+            <a:ext cx="10063163" cy="1015584"/>
+          </a:xfrm>
+          <a:ln w="38100">
+            <a:solidFill>
+              <a:schemeClr val="bg2">
+                <a:lumMod val="40000"/>
+                <a:lumOff val="60000"/>
+              </a:schemeClr>
+            </a:solidFill>
+          </a:ln>
+        </p:spPr>
+        <p:txBody>
+          <a:bodyPr>
+            <a:normAutofit fontScale="90000"/>
+          </a:bodyPr>
+          <a:lstStyle/>
+          <a:p>
+            <a:r>
+              <a:rPr lang="en-US" b="0" dirty="0">
+                <a:latin typeface="Times New Roman" panose="02020603050405020304" pitchFamily="18" charset="0"/>
+                <a:cs typeface="Times New Roman" panose="02020603050405020304" pitchFamily="18" charset="0"/>
+              </a:rPr>
+              <a:t>Optimal Multi-Period Dispatch of Distributed Energy Resources in Unbalanced Distribution Feeders</a:t>
+            </a:r>
+          </a:p>
+        </p:txBody>
+      </p:sp>
+    </p:spTree>
+    <p:extLst>
+      <p:ext uri="{BB962C8B-B14F-4D97-AF65-F5344CB8AC3E}">
+        <p14:creationId xmlns:p14="http://schemas.microsoft.com/office/powerpoint/2010/main" val="585967064"/>
+      </p:ext>
+    </p:extLst>
+  </p:cSld>
+  <p:clrMapOvr>
+    <a:masterClrMapping/>
+  </p:clrMapOvr>
+</p:sld>
+</file>
+
+<file path=ppt/slides/slide15.xml><?xml version="1.0" encoding="utf-8"?>
+<p:sld xmlns:a="http://schemas.openxmlformats.org/drawingml/2006/main" xmlns:r="http://schemas.openxmlformats.org/officeDocument/2006/relationships" xmlns:p="http://schemas.openxmlformats.org/presentationml/2006/main">
+  <p:cSld>
+    <p:spTree>
+      <p:nvGrpSpPr>
+        <p:cNvPr id="1" name=""/>
+        <p:cNvGrpSpPr/>
+        <p:nvPr/>
+      </p:nvGrpSpPr>
+      <p:grpSpPr>
+        <a:xfrm>
+          <a:off x="0" y="0"/>
+          <a:ext cx="0" cy="0"/>
+          <a:chOff x="0" y="0"/>
+          <a:chExt cx="0" cy="0"/>
+        </a:xfrm>
+      </p:grpSpPr>
+      <mc:AlternateContent xmlns:mc="http://schemas.openxmlformats.org/markup-compatibility/2006">
+        <mc:Choice xmlns:a14="http://schemas.microsoft.com/office/drawing/2010/main" Requires="a14">
+          <p:sp>
+            <p:nvSpPr>
+              <p:cNvPr id="3" name="Content Placeholder 2">
+                <a:extLst>
+                  <a:ext uri="{FF2B5EF4-FFF2-40B4-BE49-F238E27FC236}">
+                    <a16:creationId xmlns:a16="http://schemas.microsoft.com/office/drawing/2014/main" id="{64BE6767-30AA-41AB-8C0B-29F30741AF76}"/>
+                  </a:ext>
+                </a:extLst>
+              </p:cNvPr>
+              <p:cNvSpPr>
+                <a:spLocks noGrp="1"/>
+              </p:cNvSpPr>
+              <p:nvPr>
+                <p:ph idx="1"/>
+              </p:nvPr>
+            </p:nvSpPr>
+            <p:spPr>
+              <a:xfrm>
+                <a:off x="1077687" y="2248664"/>
+                <a:ext cx="10418988" cy="4286531"/>
+              </a:xfrm>
+              <a:ln>
+                <a:solidFill>
+                  <a:schemeClr val="bg2">
+                    <a:lumMod val="20000"/>
+                    <a:lumOff val="80000"/>
+                  </a:schemeClr>
+                </a:solidFill>
+              </a:ln>
+            </p:spPr>
+            <p:txBody>
+              <a:bodyPr>
+                <a:normAutofit/>
+              </a:bodyPr>
+              <a:lstStyle/>
+              <a:p>
+                <a:pPr marL="182880" lvl="1" indent="0">
+                  <a:buNone/>
+                </a:pPr>
+                <a:r>
+                  <a:rPr lang="en-US" sz="2800" dirty="0"/>
+                  <a:t>Results</a:t>
+                </a:r>
+              </a:p>
+              <a:p>
+                <a:pPr lvl="2"/>
+                <a14:m>
+                  <m:oMath xmlns:m="http://schemas.openxmlformats.org/officeDocument/2006/math">
+                    <m:r>
+                      <a:rPr lang="en-US" b="0" i="1" smtClean="0">
+                        <a:latin typeface="Cambria Math" panose="02040503050406030204" pitchFamily="18" charset="0"/>
+                      </a:rPr>
+                      <m:t>2</m:t>
+                    </m:r>
+                  </m:oMath>
+                </a14:m>
+                <a:r>
+                  <a:rPr lang="en-US" dirty="0"/>
+                  <a:t> levels for both loads (low and high) and solar PV generation (low and high)</a:t>
+                </a:r>
+              </a:p>
+              <a:p>
+                <a:pPr lvl="2"/>
+                <a:endParaRPr lang="en-US" dirty="0"/>
+              </a:p>
+              <a:p>
+                <a:pPr lvl="2"/>
+                <a:r>
+                  <a:rPr lang="en-US" dirty="0"/>
+                  <a:t>‘High’ implies Base Values for both Loads as well as solar PV</a:t>
+                </a:r>
+              </a:p>
+              <a:p>
+                <a:pPr lvl="2"/>
+                <a:endParaRPr lang="en-US" dirty="0"/>
+              </a:p>
+              <a:p>
+                <a:pPr lvl="2"/>
+                <a:r>
+                  <a:rPr lang="en-US" dirty="0"/>
+                  <a:t>‘Low’ implies </a:t>
+                </a:r>
+                <a14:m>
+                  <m:oMath xmlns:m="http://schemas.openxmlformats.org/officeDocument/2006/math">
+                    <m:r>
+                      <a:rPr lang="en-US" b="0" i="1" smtClean="0">
+                        <a:latin typeface="Cambria Math" panose="02040503050406030204" pitchFamily="18" charset="0"/>
+                      </a:rPr>
+                      <m:t>50%</m:t>
+                    </m:r>
+                  </m:oMath>
+                </a14:m>
+                <a:r>
+                  <a:rPr lang="en-US" dirty="0"/>
+                  <a:t> of the base values in both cases.</a:t>
+                </a:r>
+              </a:p>
+              <a:p>
+                <a:pPr lvl="2"/>
+                <a:endParaRPr lang="en-US" dirty="0"/>
+              </a:p>
+              <a:p>
+                <a:pPr lvl="2"/>
+                <a:r>
+                  <a:rPr lang="en-US" dirty="0"/>
+                  <a:t>Thus </a:t>
+                </a:r>
+                <a14:m>
+                  <m:oMath xmlns:m="http://schemas.openxmlformats.org/officeDocument/2006/math">
+                    <m:r>
+                      <a:rPr lang="en-US" b="0" i="1" smtClean="0">
+                        <a:latin typeface="Cambria Math" panose="02040503050406030204" pitchFamily="18" charset="0"/>
+                      </a:rPr>
+                      <m:t>4</m:t>
+                    </m:r>
+                  </m:oMath>
+                </a14:m>
+                <a:r>
+                  <a:rPr lang="en-US" dirty="0"/>
+                  <a:t> scenarios are modeled:</a:t>
+                </a:r>
+              </a:p>
+              <a:p>
+                <a:pPr lvl="3"/>
+                <a:r>
+                  <a:rPr lang="en-US" dirty="0"/>
+                  <a:t>LL (Low Loads, Low Solar)</a:t>
+                </a:r>
+              </a:p>
+              <a:p>
+                <a:pPr lvl="3"/>
+                <a:r>
+                  <a:rPr lang="en-US" dirty="0"/>
+                  <a:t>LH (Low Loads, High Solar)</a:t>
+                </a:r>
+              </a:p>
+              <a:p>
+                <a:pPr lvl="3"/>
+                <a:r>
+                  <a:rPr lang="en-US" dirty="0"/>
+                  <a:t>HL (High Loads, Low Solar)</a:t>
+                </a:r>
+              </a:p>
+              <a:p>
+                <a:pPr lvl="3"/>
+                <a:r>
+                  <a:rPr lang="en-US" dirty="0"/>
+                  <a:t>HH (High Loads, High Solar)</a:t>
+                </a:r>
+              </a:p>
+              <a:p>
+                <a:pPr marL="182880" lvl="1" indent="0">
+                  <a:buNone/>
+                </a:pPr>
+                <a:endParaRPr lang="en-US" dirty="0"/>
+              </a:p>
+              <a:p>
+                <a:pPr marL="182880" lvl="1" indent="0">
+                  <a:buNone/>
+                </a:pPr>
+                <a:endParaRPr lang="en-US" dirty="0"/>
+              </a:p>
+            </p:txBody>
+          </p:sp>
+        </mc:Choice>
+        <mc:Fallback>
+          <p:sp>
+            <p:nvSpPr>
+              <p:cNvPr id="3" name="Content Placeholder 2">
+                <a:extLst>
+                  <a:ext uri="{FF2B5EF4-FFF2-40B4-BE49-F238E27FC236}">
+                    <a16:creationId xmlns:a16="http://schemas.microsoft.com/office/drawing/2014/main" id="{64BE6767-30AA-41AB-8C0B-29F30741AF76}"/>
+                  </a:ext>
+                </a:extLst>
+              </p:cNvPr>
+              <p:cNvSpPr>
+                <a:spLocks noGrp="1" noRot="1" noChangeAspect="1" noMove="1" noResize="1" noEditPoints="1" noAdjustHandles="1" noChangeArrowheads="1" noChangeShapeType="1" noTextEdit="1"/>
+              </p:cNvSpPr>
+              <p:nvPr>
+                <p:ph idx="1"/>
+              </p:nvPr>
+            </p:nvSpPr>
+            <p:spPr>
+              <a:xfrm>
+                <a:off x="1077687" y="2248664"/>
+                <a:ext cx="10418988" cy="4286531"/>
+              </a:xfrm>
+              <a:blipFill>
+                <a:blip r:embed="rId3"/>
+                <a:stretch>
+                  <a:fillRect l="-292" t="-3262"/>
+                </a:stretch>
+              </a:blipFill>
+              <a:ln>
+                <a:solidFill>
+                  <a:schemeClr val="bg2">
+                    <a:lumMod val="20000"/>
+                    <a:lumOff val="80000"/>
+                  </a:schemeClr>
+                </a:solidFill>
+              </a:ln>
+            </p:spPr>
+            <p:txBody>
+              <a:bodyPr/>
+              <a:lstStyle/>
+              <a:p>
+                <a:r>
+                  <a:rPr lang="en-US">
+                    <a:noFill/>
+                  </a:rPr>
+                  <a:t> </a:t>
+                </a:r>
+              </a:p>
+            </p:txBody>
+          </p:sp>
+        </mc:Fallback>
+      </mc:AlternateContent>
+      <p:sp>
+        <p:nvSpPr>
+          <p:cNvPr id="2" name="Title 1">
+            <a:extLst>
+              <a:ext uri="{FF2B5EF4-FFF2-40B4-BE49-F238E27FC236}">
+                <a16:creationId xmlns:a16="http://schemas.microsoft.com/office/drawing/2014/main" id="{45DF1785-83CB-4F7A-820B-C600AC43B067}"/>
+              </a:ext>
+            </a:extLst>
+          </p:cNvPr>
+          <p:cNvSpPr>
+            <a:spLocks noGrp="1"/>
+          </p:cNvSpPr>
+          <p:nvPr>
+            <p:ph type="title"/>
+          </p:nvPr>
+        </p:nvSpPr>
+        <p:spPr>
+          <a:xfrm>
+            <a:off x="1064418" y="376654"/>
+            <a:ext cx="10063163" cy="1015584"/>
+          </a:xfrm>
+          <a:ln w="38100">
+            <a:solidFill>
+              <a:schemeClr val="bg2">
+                <a:lumMod val="40000"/>
+                <a:lumOff val="60000"/>
+              </a:schemeClr>
+            </a:solidFill>
+          </a:ln>
+        </p:spPr>
+        <p:txBody>
+          <a:bodyPr>
+            <a:normAutofit fontScale="90000"/>
+          </a:bodyPr>
+          <a:lstStyle/>
+          <a:p>
+            <a:r>
+              <a:rPr lang="en-US" b="0" dirty="0">
+                <a:latin typeface="Times New Roman" panose="02020603050405020304" pitchFamily="18" charset="0"/>
+                <a:cs typeface="Times New Roman" panose="02020603050405020304" pitchFamily="18" charset="0"/>
+              </a:rPr>
+              <a:t>Optimal Multi-Period Dispatch of Distributed Energy Resources in Unbalanced Distribution Feeders</a:t>
+            </a:r>
+          </a:p>
+        </p:txBody>
+      </p:sp>
+    </p:spTree>
+    <p:extLst>
+      <p:ext uri="{BB962C8B-B14F-4D97-AF65-F5344CB8AC3E}">
+        <p14:creationId xmlns:p14="http://schemas.microsoft.com/office/powerpoint/2010/main" val="3175041386"/>
+      </p:ext>
+    </p:extLst>
+  </p:cSld>
+  <p:clrMapOvr>
+    <a:masterClrMapping/>
+  </p:clrMapOvr>
+</p:sld>
+</file>
+
+<file path=ppt/slides/slide16.xml><?xml version="1.0" encoding="utf-8"?>
+<p:sld xmlns:a="http://schemas.openxmlformats.org/drawingml/2006/main" xmlns:r="http://schemas.openxmlformats.org/officeDocument/2006/relationships" xmlns:p="http://schemas.openxmlformats.org/presentationml/2006/main">
+  <p:cSld>
+    <p:spTree>
+      <p:nvGrpSpPr>
+        <p:cNvPr id="1" name=""/>
+        <p:cNvGrpSpPr/>
+        <p:nvPr/>
+      </p:nvGrpSpPr>
+      <p:grpSpPr>
+        <a:xfrm>
+          <a:off x="0" y="0"/>
+          <a:ext cx="0" cy="0"/>
+          <a:chOff x="0" y="0"/>
+          <a:chExt cx="0" cy="0"/>
+        </a:xfrm>
+      </p:grpSpPr>
+      <mc:AlternateContent xmlns:mc="http://schemas.openxmlformats.org/markup-compatibility/2006">
+        <mc:Choice xmlns:a14="http://schemas.microsoft.com/office/drawing/2010/main" Requires="a14">
+          <p:sp>
+            <p:nvSpPr>
+              <p:cNvPr id="3" name="Content Placeholder 2">
+                <a:extLst>
+                  <a:ext uri="{FF2B5EF4-FFF2-40B4-BE49-F238E27FC236}">
+                    <a16:creationId xmlns:a16="http://schemas.microsoft.com/office/drawing/2014/main" id="{64BE6767-30AA-41AB-8C0B-29F30741AF76}"/>
+                  </a:ext>
+                </a:extLst>
+              </p:cNvPr>
+              <p:cNvSpPr>
+                <a:spLocks noGrp="1"/>
+              </p:cNvSpPr>
+              <p:nvPr>
+                <p:ph idx="1"/>
+              </p:nvPr>
+            </p:nvSpPr>
+            <p:spPr>
+              <a:xfrm>
+                <a:off x="1077687" y="2248664"/>
+                <a:ext cx="10418988" cy="4286531"/>
+              </a:xfrm>
+              <a:ln>
+                <a:solidFill>
+                  <a:schemeClr val="bg2">
+                    <a:lumMod val="20000"/>
+                    <a:lumOff val="80000"/>
+                  </a:schemeClr>
+                </a:solidFill>
+              </a:ln>
+            </p:spPr>
+            <p:txBody>
+              <a:bodyPr>
+                <a:normAutofit/>
+              </a:bodyPr>
+              <a:lstStyle/>
+              <a:p>
+                <a:pPr marL="182880" lvl="1" indent="0">
+                  <a:buNone/>
+                </a:pPr>
+                <a:r>
+                  <a:rPr lang="en-US" sz="2800" dirty="0"/>
+                  <a:t>Results</a:t>
+                </a:r>
+              </a:p>
+              <a:p>
+                <a:pPr lvl="2"/>
+                <a14:m>
+                  <m:oMath xmlns:m="http://schemas.openxmlformats.org/officeDocument/2006/math">
+                    <m:r>
+                      <a:rPr lang="en-US" b="0" i="1" smtClean="0">
+                        <a:latin typeface="Cambria Math" panose="02040503050406030204" pitchFamily="18" charset="0"/>
+                      </a:rPr>
+                      <m:t>2</m:t>
+                    </m:r>
+                  </m:oMath>
+                </a14:m>
+                <a:r>
+                  <a:rPr lang="en-US" dirty="0"/>
+                  <a:t> levels for both loads (low and high) and solar PV generation (low and high)</a:t>
+                </a:r>
+              </a:p>
+              <a:p>
+                <a:pPr lvl="2"/>
+                <a:endParaRPr lang="en-US" dirty="0"/>
+              </a:p>
+              <a:p>
+                <a:pPr lvl="2"/>
+                <a:r>
+                  <a:rPr lang="en-US" dirty="0"/>
+                  <a:t>‘High’ implies Base Values for both Loads as well as solar PV</a:t>
+                </a:r>
+              </a:p>
+              <a:p>
+                <a:pPr lvl="2"/>
+                <a:endParaRPr lang="en-US" dirty="0"/>
+              </a:p>
+              <a:p>
+                <a:pPr lvl="2"/>
+                <a:r>
+                  <a:rPr lang="en-US" dirty="0"/>
+                  <a:t>‘Low’ implies </a:t>
+                </a:r>
+                <a14:m>
+                  <m:oMath xmlns:m="http://schemas.openxmlformats.org/officeDocument/2006/math">
+                    <m:r>
+                      <a:rPr lang="en-US" b="0" i="1" smtClean="0">
+                        <a:latin typeface="Cambria Math" panose="02040503050406030204" pitchFamily="18" charset="0"/>
+                      </a:rPr>
+                      <m:t>50%</m:t>
+                    </m:r>
+                  </m:oMath>
+                </a14:m>
+                <a:r>
+                  <a:rPr lang="en-US" dirty="0"/>
+                  <a:t> of the base values in both cases.</a:t>
+                </a:r>
+              </a:p>
+              <a:p>
+                <a:pPr lvl="2"/>
+                <a:endParaRPr lang="en-US" dirty="0"/>
+              </a:p>
+              <a:p>
+                <a:pPr lvl="2"/>
+                <a:r>
+                  <a:rPr lang="en-US" dirty="0"/>
+                  <a:t>Thus </a:t>
+                </a:r>
+                <a14:m>
+                  <m:oMath xmlns:m="http://schemas.openxmlformats.org/officeDocument/2006/math">
+                    <m:r>
+                      <a:rPr lang="en-US" b="0" i="1" smtClean="0">
+                        <a:latin typeface="Cambria Math" panose="02040503050406030204" pitchFamily="18" charset="0"/>
+                      </a:rPr>
+                      <m:t>4</m:t>
+                    </m:r>
+                  </m:oMath>
+                </a14:m>
+                <a:r>
+                  <a:rPr lang="en-US" dirty="0"/>
+                  <a:t> scenarios are modeled:</a:t>
+                </a:r>
+              </a:p>
+              <a:p>
+                <a:pPr lvl="3"/>
+                <a:r>
+                  <a:rPr lang="en-US" dirty="0"/>
+                  <a:t>LL (Low Loads, Low Solar)</a:t>
+                </a:r>
+              </a:p>
+              <a:p>
+                <a:pPr lvl="3"/>
+                <a:r>
+                  <a:rPr lang="en-US" dirty="0"/>
+                  <a:t>LH (Low Loads, High Solar)</a:t>
+                </a:r>
+              </a:p>
+              <a:p>
+                <a:pPr lvl="3"/>
+                <a:r>
+                  <a:rPr lang="en-US" dirty="0"/>
+                  <a:t>HL (High Loads, Low Solar)</a:t>
+                </a:r>
+              </a:p>
+              <a:p>
+                <a:pPr lvl="3"/>
+                <a:r>
+                  <a:rPr lang="en-US" dirty="0"/>
+                  <a:t>HH (High Loads, High Solar)</a:t>
+                </a:r>
+              </a:p>
+              <a:p>
+                <a:pPr marL="182880" lvl="1" indent="0">
+                  <a:buNone/>
+                </a:pPr>
+                <a:endParaRPr lang="en-US" dirty="0"/>
+              </a:p>
+              <a:p>
+                <a:pPr marL="182880" lvl="1" indent="0">
+                  <a:buNone/>
+                </a:pPr>
+                <a:endParaRPr lang="en-US" dirty="0"/>
+              </a:p>
+            </p:txBody>
+          </p:sp>
+        </mc:Choice>
+        <mc:Fallback>
+          <p:sp>
+            <p:nvSpPr>
+              <p:cNvPr id="3" name="Content Placeholder 2">
+                <a:extLst>
+                  <a:ext uri="{FF2B5EF4-FFF2-40B4-BE49-F238E27FC236}">
+                    <a16:creationId xmlns:a16="http://schemas.microsoft.com/office/drawing/2014/main" id="{64BE6767-30AA-41AB-8C0B-29F30741AF76}"/>
+                  </a:ext>
+                </a:extLst>
+              </p:cNvPr>
+              <p:cNvSpPr>
+                <a:spLocks noGrp="1" noRot="1" noChangeAspect="1" noMove="1" noResize="1" noEditPoints="1" noAdjustHandles="1" noChangeArrowheads="1" noChangeShapeType="1" noTextEdit="1"/>
+              </p:cNvSpPr>
+              <p:nvPr>
+                <p:ph idx="1"/>
+              </p:nvPr>
+            </p:nvSpPr>
+            <p:spPr>
+              <a:xfrm>
+                <a:off x="1077687" y="2248664"/>
+                <a:ext cx="10418988" cy="4286531"/>
+              </a:xfrm>
+              <a:blipFill>
+                <a:blip r:embed="rId3"/>
+                <a:stretch>
+                  <a:fillRect l="-292" t="-3262"/>
+                </a:stretch>
+              </a:blipFill>
+              <a:ln>
+                <a:solidFill>
+                  <a:schemeClr val="bg2">
+                    <a:lumMod val="20000"/>
+                    <a:lumOff val="80000"/>
+                  </a:schemeClr>
+                </a:solidFill>
+              </a:ln>
+            </p:spPr>
+            <p:txBody>
+              <a:bodyPr/>
+              <a:lstStyle/>
+              <a:p>
+                <a:r>
+                  <a:rPr lang="en-US">
+                    <a:noFill/>
+                  </a:rPr>
+                  <a:t> </a:t>
+                </a:r>
+              </a:p>
+            </p:txBody>
+          </p:sp>
+        </mc:Fallback>
+      </mc:AlternateContent>
+      <p:sp>
+        <p:nvSpPr>
+          <p:cNvPr id="2" name="Title 1">
+            <a:extLst>
+              <a:ext uri="{FF2B5EF4-FFF2-40B4-BE49-F238E27FC236}">
+                <a16:creationId xmlns:a16="http://schemas.microsoft.com/office/drawing/2014/main" id="{45DF1785-83CB-4F7A-820B-C600AC43B067}"/>
+              </a:ext>
+            </a:extLst>
+          </p:cNvPr>
+          <p:cNvSpPr>
+            <a:spLocks noGrp="1"/>
+          </p:cNvSpPr>
+          <p:nvPr>
+            <p:ph type="title"/>
+          </p:nvPr>
+        </p:nvSpPr>
+        <p:spPr>
+          <a:xfrm>
+            <a:off x="1064418" y="376654"/>
+            <a:ext cx="10063163" cy="1015584"/>
+          </a:xfrm>
+          <a:ln w="38100">
+            <a:solidFill>
+              <a:schemeClr val="bg2">
+                <a:lumMod val="40000"/>
+                <a:lumOff val="60000"/>
+              </a:schemeClr>
+            </a:solidFill>
+          </a:ln>
+        </p:spPr>
+        <p:txBody>
+          <a:bodyPr>
+            <a:normAutofit fontScale="90000"/>
+          </a:bodyPr>
+          <a:lstStyle/>
+          <a:p>
+            <a:r>
+              <a:rPr lang="en-US" b="0" dirty="0">
+                <a:latin typeface="Times New Roman" panose="02020603050405020304" pitchFamily="18" charset="0"/>
+                <a:cs typeface="Times New Roman" panose="02020603050405020304" pitchFamily="18" charset="0"/>
+              </a:rPr>
+              <a:t>Optimal Multi-Period Dispatch of Distributed Energy Resources in Unbalanced Distribution Feeders</a:t>
+            </a:r>
+          </a:p>
+        </p:txBody>
+      </p:sp>
+    </p:spTree>
+    <p:extLst>
+      <p:ext uri="{BB962C8B-B14F-4D97-AF65-F5344CB8AC3E}">
+        <p14:creationId xmlns:p14="http://schemas.microsoft.com/office/powerpoint/2010/main" val="2665280293"/>
+      </p:ext>
+    </p:extLst>
+  </p:cSld>
+  <p:clrMapOvr>
+    <a:masterClrMapping/>
+  </p:clrMapOvr>
+</p:sld>
+</file>
+
+<file path=ppt/slides/slide17.xml><?xml version="1.0" encoding="utf-8"?>
+<p:sld xmlns:a="http://schemas.openxmlformats.org/drawingml/2006/main" xmlns:r="http://schemas.openxmlformats.org/officeDocument/2006/relationships" xmlns:p="http://schemas.openxmlformats.org/presentationml/2006/main">
+  <p:cSld>
+    <p:spTree>
+      <p:nvGrpSpPr>
+        <p:cNvPr id="1" name=""/>
+        <p:cNvGrpSpPr/>
+        <p:nvPr/>
+      </p:nvGrpSpPr>
+      <p:grpSpPr>
+        <a:xfrm>
+          <a:off x="0" y="0"/>
+          <a:ext cx="0" cy="0"/>
+          <a:chOff x="0" y="0"/>
+          <a:chExt cx="0" cy="0"/>
+        </a:xfrm>
+      </p:grpSpPr>
+      <p:sp>
+        <p:nvSpPr>
+          <p:cNvPr id="2" name="Title 1">
+            <a:extLst>
+              <a:ext uri="{FF2B5EF4-FFF2-40B4-BE49-F238E27FC236}">
                 <a16:creationId xmlns:a16="http://schemas.microsoft.com/office/drawing/2014/main" id="{5F549704-23C4-B094-622E-8880D581DDB1}"/>
               </a:ext>
             </a:extLst>
@@ -9507,6 +11776,55 @@
               <a:rPr lang="en-IN" dirty="0"/>
               <a:t>: 10.23919/PSCC.2018.8442555</a:t>
             </a:r>
+          </a:p>
+          <a:p>
+            <a:r>
+              <a:rPr lang="en-IN" dirty="0">
+                <a:hlinkClick r:id="rId3"/>
+              </a:rPr>
+              <a:t>[36] </a:t>
+            </a:r>
+            <a:r>
+              <a:rPr lang="en-IN" dirty="0"/>
+              <a:t> </a:t>
+            </a:r>
+            <a:r>
+              <a:rPr lang="en-US" dirty="0" err="1"/>
+              <a:t>Wächter</a:t>
+            </a:r>
+            <a:r>
+              <a:rPr lang="en-US" dirty="0"/>
+              <a:t>, A., &amp; </a:t>
+            </a:r>
+            <a:r>
+              <a:rPr lang="en-US" dirty="0" err="1"/>
+              <a:t>Biegler</a:t>
+            </a:r>
+            <a:r>
+              <a:rPr lang="en-US" dirty="0"/>
+              <a:t>, L. T. (2006). On the implementation of an interior-point filter line-search algorithm for large-scale nonlinear programming. Math. Program., 106(1), 25–57. </a:t>
+            </a:r>
+            <a:r>
+              <a:rPr lang="en-US" dirty="0" err="1"/>
+              <a:t>doi</a:t>
+            </a:r>
+            <a:r>
+              <a:rPr lang="en-US" dirty="0"/>
+              <a:t>: 10.1007/s10107-004-0559-y</a:t>
+            </a:r>
+          </a:p>
+          <a:p>
+            <a:r>
+              <a:rPr lang="en-US" dirty="0">
+                <a:hlinkClick r:id="rId4"/>
+              </a:rPr>
+              <a:t>[37] </a:t>
+            </a:r>
+            <a:r>
+              <a:rPr lang="en-US" dirty="0"/>
+              <a:t>HSL - Home Page. (2023, May 24). Retrieved from https://www.hsl.rl.ac.uk</a:t>
+            </a:r>
+            <a:endParaRPr lang="en-IN" dirty="0"/>
           </a:p>
         </p:txBody>
       </p:sp>
@@ -9744,7 +12062,7 @@
         <p:spPr>
           <a:xfrm>
             <a:off x="1885950" y="5212316"/>
-            <a:ext cx="2371725" cy="646331"/>
+            <a:ext cx="2371725" cy="923330"/>
           </a:xfrm>
           <a:prstGeom prst="rect">
             <a:avLst/>
@@ -9786,7 +12104,7 @@
                   <a:schemeClr val="bg1"/>
                 </a:solidFill>
               </a:rPr>
-              <a:t>PhD at UVM</a:t>
+              <a:t>PhD at University of Vermont (UVM)</a:t>
             </a:r>
           </a:p>
         </p:txBody>
@@ -10426,8 +12744,8 @@
         </p:nvSpPr>
         <p:spPr>
           <a:xfrm>
-            <a:off x="1077686" y="2248664"/>
-            <a:ext cx="10063163" cy="4286531"/>
+            <a:off x="1077686" y="2248665"/>
+            <a:ext cx="10063163" cy="3256786"/>
           </a:xfrm>
         </p:spPr>
         <p:txBody>
@@ -10439,6 +12757,10 @@
             <a:r>
               <a:rPr lang="en-US" dirty="0" err="1"/>
               <a:t>ConEd</a:t>
+            </a:r>
+            <a:r>
+              <a:rPr lang="en-US" baseline="30000" dirty="0"/>
+              <a:t>*</a:t>
             </a:r>
             <a:r>
               <a:rPr lang="en-US" dirty="0"/>
@@ -10529,6 +12851,69 @@
                 <a:cs typeface="Times New Roman" panose="02020603050405020304" pitchFamily="18" charset="0"/>
               </a:rPr>
               <a:t>Optimal Multi-Period Dispatch of Distributed Energy Resources in Unbalanced Distribution Feeders</a:t>
+            </a:r>
+          </a:p>
+        </p:txBody>
+      </p:sp>
+      <p:sp>
+        <p:nvSpPr>
+          <p:cNvPr id="4" name="TextBox 3">
+            <a:extLst>
+              <a:ext uri="{FF2B5EF4-FFF2-40B4-BE49-F238E27FC236}">
+                <a16:creationId xmlns:a16="http://schemas.microsoft.com/office/drawing/2014/main" id="{8EFEBC6E-AF86-6BC5-4CB0-6803F1624DA1}"/>
+              </a:ext>
+            </a:extLst>
+          </p:cNvPr>
+          <p:cNvSpPr txBox="1"/>
+          <p:nvPr/>
+        </p:nvSpPr>
+        <p:spPr>
+          <a:xfrm>
+            <a:off x="1238250" y="5505451"/>
+            <a:ext cx="3838575" cy="1200329"/>
+          </a:xfrm>
+          <a:prstGeom prst="rect">
+            <a:avLst/>
+          </a:prstGeom>
+          <a:noFill/>
+          <a:ln>
+            <a:solidFill>
+              <a:schemeClr val="bg2">
+                <a:lumMod val="40000"/>
+                <a:lumOff val="60000"/>
+              </a:schemeClr>
+            </a:solidFill>
+          </a:ln>
+        </p:spPr>
+        <p:txBody>
+          <a:bodyPr wrap="square" rtlCol="0">
+            <a:spAutoFit/>
+          </a:bodyPr>
+          <a:lstStyle/>
+          <a:p>
+            <a:r>
+              <a:rPr lang="en-US" dirty="0">
+                <a:solidFill>
+                  <a:schemeClr val="bg1"/>
+                </a:solidFill>
+              </a:rPr>
+              <a:t>* Consolidated Edison, electric utility in NY and NOT </a:t>
+            </a:r>
+            <a:r>
+              <a:rPr lang="en-US" dirty="0" err="1">
+                <a:solidFill>
+                  <a:schemeClr val="bg1"/>
+                </a:solidFill>
+              </a:rPr>
+              <a:t>ComEd</a:t>
+            </a:r>
+            <a:r>
+              <a:rPr lang="en-US" dirty="0">
+                <a:solidFill>
+                  <a:schemeClr val="bg1"/>
+                </a:solidFill>
+              </a:rPr>
+              <a:t>, Commonwealth Edison, electric utility in IL</a:t>
             </a:r>
           </a:p>
         </p:txBody>
@@ -12522,4 +14907,254 @@
     </a:ext>
   </a:extLst>
 </a:theme>
+</file>
+
+<file path=customXml/item1.xml><?xml version="1.0" encoding="utf-8"?>
+<?mso-contentType ?>
+<FormTemplates xmlns="http://schemas.microsoft.com/sharepoint/v3/contenttype/forms">
+  <Display>DocumentLibraryForm</Display>
+  <Edit>DocumentLibraryForm</Edit>
+  <New>DocumentLibraryForm</New>
+</FormTemplates>
+</file>
+
+<file path=customXml/item2.xml><?xml version="1.0" encoding="utf-8"?>
+<ct:contentTypeSchema xmlns:ct="http://schemas.microsoft.com/office/2006/metadata/contentType" xmlns:ma="http://schemas.microsoft.com/office/2006/metadata/properties/metaAttributes" ct:_="" ma:_="" ma:contentTypeName="Document" ma:contentTypeID="0x0101008EDD631CF16A9D4597B7910261C15C8D" ma:contentTypeVersion="8" ma:contentTypeDescription="Create a new document." ma:contentTypeScope="" ma:versionID="6df697ab8c469b327c4ca0ad6150b4d8">
+  <xsd:schema xmlns:xsd="http://www.w3.org/2001/XMLSchema" xmlns:xs="http://www.w3.org/2001/XMLSchema" xmlns:p="http://schemas.microsoft.com/office/2006/metadata/properties" xmlns:ns3="07b86a79-a0e0-4fae-97d8-d960552457a2" xmlns:ns4="40f16175-07f6-4179-a7d3-44240c48c007" targetNamespace="http://schemas.microsoft.com/office/2006/metadata/properties" ma:root="true" ma:fieldsID="82c1df116234835aaac4f6705de5e513" ns3:_="" ns4:_="">
+    <xsd:import namespace="07b86a79-a0e0-4fae-97d8-d960552457a2"/>
+    <xsd:import namespace="40f16175-07f6-4179-a7d3-44240c48c007"/>
+    <xsd:element name="properties">
+      <xsd:complexType>
+        <xsd:sequence>
+          <xsd:element name="documentManagement">
+            <xsd:complexType>
+              <xsd:all>
+                <xsd:element ref="ns3:MediaServiceMetadata" minOccurs="0"/>
+                <xsd:element ref="ns3:MediaServiceFastMetadata" minOccurs="0"/>
+                <xsd:element ref="ns4:SharedWithUsers" minOccurs="0"/>
+                <xsd:element ref="ns4:SharedWithDetails" minOccurs="0"/>
+                <xsd:element ref="ns4:SharingHintHash" minOccurs="0"/>
+                <xsd:element ref="ns3:MediaServiceDateTaken" minOccurs="0"/>
+                <xsd:element ref="ns3:MediaLengthInSeconds" minOccurs="0"/>
+                <xsd:element ref="ns3:_activity" minOccurs="0"/>
+              </xsd:all>
+            </xsd:complexType>
+          </xsd:element>
+        </xsd:sequence>
+      </xsd:complexType>
+    </xsd:element>
+  </xsd:schema>
+  <xsd:schema xmlns:xsd="http://www.w3.org/2001/XMLSchema" xmlns:xs="http://www.w3.org/2001/XMLSchema" xmlns:dms="http://schemas.microsoft.com/office/2006/documentManagement/types" xmlns:pc="http://schemas.microsoft.com/office/infopath/2007/PartnerControls" targetNamespace="07b86a79-a0e0-4fae-97d8-d960552457a2" elementFormDefault="qualified">
+    <xsd:import namespace="http://schemas.microsoft.com/office/2006/documentManagement/types"/>
+    <xsd:import namespace="http://schemas.microsoft.com/office/infopath/2007/PartnerControls"/>
+    <xsd:element name="MediaServiceMetadata" ma:index="8" nillable="true" ma:displayName="MediaServiceMetadata" ma:hidden="true" ma:internalName="MediaServiceMetadata" ma:readOnly="true">
+      <xsd:simpleType>
+        <xsd:restriction base="dms:Note"/>
+      </xsd:simpleType>
+    </xsd:element>
+    <xsd:element name="MediaServiceFastMetadata" ma:index="9" nillable="true" ma:displayName="MediaServiceFastMetadata" ma:hidden="true" ma:internalName="MediaServiceFastMetadata" ma:readOnly="true">
+      <xsd:simpleType>
+        <xsd:restriction base="dms:Note"/>
+      </xsd:simpleType>
+    </xsd:element>
+    <xsd:element name="MediaServiceDateTaken" ma:index="13" nillable="true" ma:displayName="MediaServiceDateTaken" ma:hidden="true" ma:indexed="true" ma:internalName="MediaServiceDateTaken" ma:readOnly="true">
+      <xsd:simpleType>
+        <xsd:restriction base="dms:Text"/>
+      </xsd:simpleType>
+    </xsd:element>
+    <xsd:element name="MediaLengthInSeconds" ma:index="14" nillable="true" ma:displayName="MediaLengthInSeconds" ma:hidden="true" ma:internalName="MediaLengthInSeconds" ma:readOnly="true">
+      <xsd:simpleType>
+        <xsd:restriction base="dms:Unknown"/>
+      </xsd:simpleType>
+    </xsd:element>
+    <xsd:element name="_activity" ma:index="15" nillable="true" ma:displayName="_activity" ma:hidden="true" ma:internalName="_activity">
+      <xsd:simpleType>
+        <xsd:restriction base="dms:Note"/>
+      </xsd:simpleType>
+    </xsd:element>
+  </xsd:schema>
+  <xsd:schema xmlns:xsd="http://www.w3.org/2001/XMLSchema" xmlns:xs="http://www.w3.org/2001/XMLSchema" xmlns:dms="http://schemas.microsoft.com/office/2006/documentManagement/types" xmlns:pc="http://schemas.microsoft.com/office/infopath/2007/PartnerControls" targetNamespace="40f16175-07f6-4179-a7d3-44240c48c007" elementFormDefault="qualified">
+    <xsd:import namespace="http://schemas.microsoft.com/office/2006/documentManagement/types"/>
+    <xsd:import namespace="http://schemas.microsoft.com/office/infopath/2007/PartnerControls"/>
+    <xsd:element name="SharedWithUsers" ma:index="10" nillable="true" ma:displayName="Shared With" ma:internalName="SharedWithUsers" ma:readOnly="true">
+      <xsd:complexType>
+        <xsd:complexContent>
+          <xsd:extension base="dms:UserMulti">
+            <xsd:sequence>
+              <xsd:element name="UserInfo" minOccurs="0" maxOccurs="unbounded">
+                <xsd:complexType>
+                  <xsd:sequence>
+                    <xsd:element name="DisplayName" type="xsd:string" minOccurs="0"/>
+                    <xsd:element name="AccountId" type="dms:UserId" minOccurs="0" nillable="true"/>
+                    <xsd:element name="AccountType" type="xsd:string" minOccurs="0"/>
+                  </xsd:sequence>
+                </xsd:complexType>
+              </xsd:element>
+            </xsd:sequence>
+          </xsd:extension>
+        </xsd:complexContent>
+      </xsd:complexType>
+    </xsd:element>
+    <xsd:element name="SharedWithDetails" ma:index="11" nillable="true" ma:displayName="Shared With Details" ma:internalName="SharedWithDetails" ma:readOnly="true">
+      <xsd:simpleType>
+        <xsd:restriction base="dms:Note">
+          <xsd:maxLength value="255"/>
+        </xsd:restriction>
+      </xsd:simpleType>
+    </xsd:element>
+    <xsd:element name="SharingHintHash" ma:index="12" nillable="true" ma:displayName="Sharing Hint Hash" ma:hidden="true" ma:internalName="SharingHintHash" ma:readOnly="true">
+      <xsd:simpleType>
+        <xsd:restriction base="dms:Text"/>
+      </xsd:simpleType>
+    </xsd:element>
+  </xsd:schema>
+  <xsd:schema xmlns="http://schemas.openxmlformats.org/package/2006/metadata/core-properties" xmlns:xsd="http://www.w3.org/2001/XMLSchema" xmlns:xsi="http://www.w3.org/2001/XMLSchema-instance" xmlns:dc="http://purl.org/dc/elements/1.1/" xmlns:dcterms="http://purl.org/dc/terms/" xmlns:odoc="http://schemas.microsoft.com/internal/obd" targetNamespace="http://schemas.openxmlformats.org/package/2006/metadata/core-properties" elementFormDefault="qualified" attributeFormDefault="unqualified" blockDefault="#all">
+    <xsd:import namespace="http://purl.org/dc/elements/1.1/" schemaLocation="http://dublincore.org/schemas/xmls/qdc/2003/04/02/dc.xsd"/>
+    <xsd:import namespace="http://purl.org/dc/terms/" schemaLocation="http://dublincore.org/schemas/xmls/qdc/2003/04/02/dcterms.xsd"/>
+    <xsd:element name="coreProperties" type="CT_coreProperties"/>
+    <xsd:complexType name="CT_coreProperties">
+      <xsd:all>
+        <xsd:element ref="dc:creator" minOccurs="0" maxOccurs="1"/>
+        <xsd:element ref="dcterms:created" minOccurs="0" maxOccurs="1"/>
+        <xsd:element ref="dc:identifier" minOccurs="0" maxOccurs="1"/>
+        <xsd:element name="contentType" minOccurs="0" maxOccurs="1" type="xsd:string" ma:index="0" ma:displayName="Content Type"/>
+        <xsd:element ref="dc:title" minOccurs="0" maxOccurs="1" ma:index="4" ma:displayName="Title"/>
+        <xsd:element ref="dc:subject" minOccurs="0" maxOccurs="1"/>
+        <xsd:element ref="dc:description" minOccurs="0" maxOccurs="1"/>
+        <xsd:element name="keywords" minOccurs="0" maxOccurs="1" type="xsd:string"/>
+        <xsd:element ref="dc:language" minOccurs="0" maxOccurs="1"/>
+        <xsd:element name="category" minOccurs="0" maxOccurs="1" type="xsd:string"/>
+        <xsd:element name="version" minOccurs="0" maxOccurs="1" type="xsd:string"/>
+        <xsd:element name="revision" minOccurs="0" maxOccurs="1" type="xsd:string">
+          <xsd:annotation>
+            <xsd:documentation>
+                        This value indicates the number of saves or revisions. The application is responsible for updating this value after each revision.
+                    </xsd:documentation>
+          </xsd:annotation>
+        </xsd:element>
+        <xsd:element name="lastModifiedBy" minOccurs="0" maxOccurs="1" type="xsd:string"/>
+        <xsd:element ref="dcterms:modified" minOccurs="0" maxOccurs="1"/>
+        <xsd:element name="contentStatus" minOccurs="0" maxOccurs="1" type="xsd:string"/>
+      </xsd:all>
+    </xsd:complexType>
+  </xsd:schema>
+  <xs:schema xmlns:pc="http://schemas.microsoft.com/office/infopath/2007/PartnerControls" xmlns:xs="http://www.w3.org/2001/XMLSchema" targetNamespace="http://schemas.microsoft.com/office/infopath/2007/PartnerControls" elementFormDefault="qualified" attributeFormDefault="unqualified">
+    <xs:element name="Person">
+      <xs:complexType>
+        <xs:sequence>
+          <xs:element ref="pc:DisplayName" minOccurs="0"/>
+          <xs:element ref="pc:AccountId" minOccurs="0"/>
+          <xs:element ref="pc:AccountType" minOccurs="0"/>
+        </xs:sequence>
+      </xs:complexType>
+    </xs:element>
+    <xs:element name="DisplayName" type="xs:string"/>
+    <xs:element name="AccountId" type="xs:string"/>
+    <xs:element name="AccountType" type="xs:string"/>
+    <xs:element name="BDCAssociatedEntity">
+      <xs:complexType>
+        <xs:sequence>
+          <xs:element ref="pc:BDCEntity" minOccurs="0" maxOccurs="unbounded"/>
+        </xs:sequence>
+        <xs:attribute ref="pc:EntityNamespace"/>
+        <xs:attribute ref="pc:EntityName"/>
+        <xs:attribute ref="pc:SystemInstanceName"/>
+        <xs:attribute ref="pc:AssociationName"/>
+      </xs:complexType>
+    </xs:element>
+    <xs:attribute name="EntityNamespace" type="xs:string"/>
+    <xs:attribute name="EntityName" type="xs:string"/>
+    <xs:attribute name="SystemInstanceName" type="xs:string"/>
+    <xs:attribute name="AssociationName" type="xs:string"/>
+    <xs:element name="BDCEntity">
+      <xs:complexType>
+        <xs:sequence>
+          <xs:element ref="pc:EntityDisplayName" minOccurs="0"/>
+          <xs:element ref="pc:EntityInstanceReference" minOccurs="0"/>
+          <xs:element ref="pc:EntityId1" minOccurs="0"/>
+          <xs:element ref="pc:EntityId2" minOccurs="0"/>
+          <xs:element ref="pc:EntityId3" minOccurs="0"/>
+          <xs:element ref="pc:EntityId4" minOccurs="0"/>
+          <xs:element ref="pc:EntityId5" minOccurs="0"/>
+        </xs:sequence>
+      </xs:complexType>
+    </xs:element>
+    <xs:element name="EntityDisplayName" type="xs:string"/>
+    <xs:element name="EntityInstanceReference" type="xs:string"/>
+    <xs:element name="EntityId1" type="xs:string"/>
+    <xs:element name="EntityId2" type="xs:string"/>
+    <xs:element name="EntityId3" type="xs:string"/>
+    <xs:element name="EntityId4" type="xs:string"/>
+    <xs:element name="EntityId5" type="xs:string"/>
+    <xs:element name="Terms">
+      <xs:complexType>
+        <xs:sequence>
+          <xs:element ref="pc:TermInfo" minOccurs="0" maxOccurs="unbounded"/>
+        </xs:sequence>
+      </xs:complexType>
+    </xs:element>
+    <xs:element name="TermInfo">
+      <xs:complexType>
+        <xs:sequence>
+          <xs:element ref="pc:TermName" minOccurs="0"/>
+          <xs:element ref="pc:TermId" minOccurs="0"/>
+        </xs:sequence>
+      </xs:complexType>
+    </xs:element>
+    <xs:element name="TermName" type="xs:string"/>
+    <xs:element name="TermId" type="xs:string"/>
+  </xs:schema>
+</ct:contentTypeSchema>
+</file>
+
+<file path=customXml/item3.xml><?xml version="1.0" encoding="utf-8"?>
+<p:properties xmlns:p="http://schemas.microsoft.com/office/2006/metadata/properties" xmlns:xsi="http://www.w3.org/2001/XMLSchema-instance" xmlns:pc="http://schemas.microsoft.com/office/infopath/2007/PartnerControls">
+  <documentManagement>
+    <_activity xmlns="07b86a79-a0e0-4fae-97d8-d960552457a2" xsi:nil="true"/>
+  </documentManagement>
+</p:properties>
+</file>
+
+<file path=customXml/itemProps1.xml><?xml version="1.0" encoding="utf-8"?>
+<ds:datastoreItem xmlns:ds="http://schemas.openxmlformats.org/officeDocument/2006/customXml" ds:itemID="{7EFD9054-912F-4B88-91C1-59322474C238}">
+  <ds:schemaRefs>
+    <ds:schemaRef ds:uri="http://schemas.microsoft.com/sharepoint/v3/contenttype/forms"/>
+  </ds:schemaRefs>
+</ds:datastoreItem>
+</file>
+
+<file path=customXml/itemProps2.xml><?xml version="1.0" encoding="utf-8"?>
+<ds:datastoreItem xmlns:ds="http://schemas.openxmlformats.org/officeDocument/2006/customXml" ds:itemID="{C18629C6-1239-43B0-A562-8FCFB8E53B3F}">
+  <ds:schemaRefs>
+    <ds:schemaRef ds:uri="http://schemas.microsoft.com/office/2006/metadata/contentType"/>
+    <ds:schemaRef ds:uri="http://schemas.microsoft.com/office/2006/metadata/properties/metaAttributes"/>
+    <ds:schemaRef ds:uri="http://www.w3.org/2001/XMLSchema"/>
+    <ds:schemaRef ds:uri="http://schemas.microsoft.com/office/2006/metadata/properties"/>
+    <ds:schemaRef ds:uri="07b86a79-a0e0-4fae-97d8-d960552457a2"/>
+    <ds:schemaRef ds:uri="40f16175-07f6-4179-a7d3-44240c48c007"/>
+    <ds:schemaRef ds:uri="http://schemas.microsoft.com/office/2006/documentManagement/types"/>
+    <ds:schemaRef ds:uri="http://schemas.microsoft.com/office/infopath/2007/PartnerControls"/>
+    <ds:schemaRef ds:uri="http://schemas.openxmlformats.org/package/2006/metadata/core-properties"/>
+    <ds:schemaRef ds:uri="http://purl.org/dc/elements/1.1/"/>
+    <ds:schemaRef ds:uri="http://purl.org/dc/terms/"/>
+    <ds:schemaRef ds:uri="http://schemas.microsoft.com/internal/obd"/>
+  </ds:schemaRefs>
+</ds:datastoreItem>
+</file>
+
+<file path=customXml/itemProps3.xml><?xml version="1.0" encoding="utf-8"?>
+<ds:datastoreItem xmlns:ds="http://schemas.openxmlformats.org/officeDocument/2006/customXml" ds:itemID="{5F4FE37C-59E4-4EF4-8795-42EF570B5A85}">
+  <ds:schemaRefs>
+    <ds:schemaRef ds:uri="http://schemas.microsoft.com/office/2006/documentManagement/types"/>
+    <ds:schemaRef ds:uri="http://schemas.microsoft.com/office/infopath/2007/PartnerControls"/>
+    <ds:schemaRef ds:uri="07b86a79-a0e0-4fae-97d8-d960552457a2"/>
+    <ds:schemaRef ds:uri="http://schemas.microsoft.com/office/2006/metadata/properties"/>
+    <ds:schemaRef ds:uri="http://purl.org/dc/elements/1.1/"/>
+    <ds:schemaRef ds:uri="http://purl.org/dc/dcmitype/"/>
+    <ds:schemaRef ds:uri="http://schemas.openxmlformats.org/package/2006/metadata/core-properties"/>
+    <ds:schemaRef ds:uri="40f16175-07f6-4179-a7d3-44240c48c007"/>
+    <ds:schemaRef ds:uri="http://www.w3.org/XML/1998/namespace"/>
+    <ds:schemaRef ds:uri="http://purl.org/dc/terms/"/>
+  </ds:schemaRefs>
+</ds:datastoreItem>
 </file>
</xml_diff>